<commit_message>
I'm isa not isabella
</commit_message>
<xml_diff>
--- a/docs/media/presentations/Progress Report.pptx
+++ b/docs/media/presentations/Progress Report.pptx
@@ -119,7 +119,7 @@
   </p:defaultTextStyle>
   <p:extLst>
     <p:ext uri="{EFAFB233-063F-42B5-8137-9DF3F51BA10A}">
-      <p15:sldGuideLst xmlns:p15="http://schemas.microsoft.com/office/powerpoint/2012/main">
+      <p15:sldGuideLst xmlns:p15="http://schemas.microsoft.com/office/powerpoint/2012/main" xmlns="">
         <p15:guide id="1" orient="horz" pos="2160" userDrawn="1">
           <p15:clr>
             <a:srgbClr val="A4A3A4"/>
@@ -218,6 +218,7 @@
           <a:p>
             <a:fld id="{DABACB24-01F3-44EF-B8FD-6CD37C5459D1}" type="datetimeFigureOut">
               <a:rPr lang="de-CH" smtClean="0"/>
+              <a:pPr/>
               <a:t>04.11.2016</a:t>
             </a:fld>
             <a:endParaRPr lang="de-CH"/>
@@ -284,7 +285,8 @@
           <a:p>
             <a:fld id="{8848A6CC-12DB-4F0C-BAE6-2FF8A80C7FF7}" type="slidenum">
               <a:rPr lang="de-CH" smtClean="0"/>
-              <a:t>‹#›</a:t>
+              <a:pPr/>
+              <a:t>‹Nr.›</a:t>
             </a:fld>
             <a:endParaRPr lang="de-CH"/>
           </a:p>
@@ -293,7 +295,7 @@
     </p:spTree>
     <p:extLst>
       <p:ext uri="{BB962C8B-B14F-4D97-AF65-F5344CB8AC3E}">
-        <p14:creationId xmlns:p14="http://schemas.microsoft.com/office/powerpoint/2010/main" val="2222135000"/>
+        <p14:creationId xmlns:p14="http://schemas.microsoft.com/office/powerpoint/2010/main" xmlns="" val="2222135000"/>
       </p:ext>
     </p:extLst>
   </p:cSld>
@@ -383,6 +385,7 @@
           <a:p>
             <a:fld id="{F9472E8F-40B5-4B0B-902F-B3E73EB16C6F}" type="datetimeFigureOut">
               <a:rPr lang="de-CH" smtClean="0"/>
+              <a:pPr/>
               <a:t>04.11.2016</a:t>
             </a:fld>
             <a:endParaRPr lang="de-CH"/>
@@ -542,7 +545,8 @@
           <a:p>
             <a:fld id="{4EC65EE1-0FFA-4547-B1E6-E12ECED6D811}" type="slidenum">
               <a:rPr lang="de-CH" smtClean="0"/>
-              <a:t>‹#›</a:t>
+              <a:pPr/>
+              <a:t>‹Nr.›</a:t>
             </a:fld>
             <a:endParaRPr lang="de-CH"/>
           </a:p>
@@ -551,7 +555,7 @@
     </p:spTree>
     <p:extLst>
       <p:ext uri="{BB962C8B-B14F-4D97-AF65-F5344CB8AC3E}">
-        <p14:creationId xmlns:p14="http://schemas.microsoft.com/office/powerpoint/2010/main" val="164638833"/>
+        <p14:creationId xmlns:p14="http://schemas.microsoft.com/office/powerpoint/2010/main" xmlns="" val="164638833"/>
       </p:ext>
     </p:extLst>
   </p:cSld>
@@ -782,6 +786,7 @@
           <a:p>
             <a:fld id="{021BCA1A-8260-4C99-B39A-B43CAA439B87}" type="datetimeFigureOut">
               <a:rPr lang="de-CH" smtClean="0"/>
+              <a:pPr/>
               <a:t>04.11.2016</a:t>
             </a:fld>
             <a:endParaRPr lang="de-CH"/>
@@ -824,7 +829,8 @@
           <a:p>
             <a:fld id="{631FC4A0-0520-44E0-B489-E0DB3391F3AE}" type="slidenum">
               <a:rPr lang="de-CH" smtClean="0"/>
-              <a:t>‹#›</a:t>
+              <a:pPr/>
+              <a:t>‹Nr.›</a:t>
             </a:fld>
             <a:endParaRPr lang="de-CH"/>
           </a:p>
@@ -833,7 +839,7 @@
     </p:spTree>
     <p:extLst>
       <p:ext uri="{BB962C8B-B14F-4D97-AF65-F5344CB8AC3E}">
-        <p14:creationId xmlns:p14="http://schemas.microsoft.com/office/powerpoint/2010/main" val="1200742964"/>
+        <p14:creationId xmlns:p14="http://schemas.microsoft.com/office/powerpoint/2010/main" xmlns="" val="1200742964"/>
       </p:ext>
     </p:extLst>
   </p:cSld>
@@ -959,6 +965,7 @@
           <a:p>
             <a:fld id="{021BCA1A-8260-4C99-B39A-B43CAA439B87}" type="datetimeFigureOut">
               <a:rPr lang="de-CH" smtClean="0"/>
+              <a:pPr/>
               <a:t>04.11.2016</a:t>
             </a:fld>
             <a:endParaRPr lang="de-CH"/>
@@ -1001,7 +1008,8 @@
           <a:p>
             <a:fld id="{631FC4A0-0520-44E0-B489-E0DB3391F3AE}" type="slidenum">
               <a:rPr lang="de-CH" smtClean="0"/>
-              <a:t>‹#›</a:t>
+              <a:pPr/>
+              <a:t>‹Nr.›</a:t>
             </a:fld>
             <a:endParaRPr lang="de-CH"/>
           </a:p>
@@ -1010,7 +1018,7 @@
     </p:spTree>
     <p:extLst>
       <p:ext uri="{BB962C8B-B14F-4D97-AF65-F5344CB8AC3E}">
-        <p14:creationId xmlns:p14="http://schemas.microsoft.com/office/powerpoint/2010/main" val="3743155127"/>
+        <p14:creationId xmlns:p14="http://schemas.microsoft.com/office/powerpoint/2010/main" xmlns="" val="3743155127"/>
       </p:ext>
     </p:extLst>
   </p:cSld>
@@ -1139,6 +1147,7 @@
           <a:p>
             <a:fld id="{021BCA1A-8260-4C99-B39A-B43CAA439B87}" type="datetimeFigureOut">
               <a:rPr lang="de-CH" smtClean="0"/>
+              <a:pPr/>
               <a:t>04.11.2016</a:t>
             </a:fld>
             <a:endParaRPr lang="de-CH"/>
@@ -1181,7 +1190,8 @@
           <a:p>
             <a:fld id="{631FC4A0-0520-44E0-B489-E0DB3391F3AE}" type="slidenum">
               <a:rPr lang="de-CH" smtClean="0"/>
-              <a:t>‹#›</a:t>
+              <a:pPr/>
+              <a:t>‹Nr.›</a:t>
             </a:fld>
             <a:endParaRPr lang="de-CH"/>
           </a:p>
@@ -1190,7 +1200,7 @@
     </p:spTree>
     <p:extLst>
       <p:ext uri="{BB962C8B-B14F-4D97-AF65-F5344CB8AC3E}">
-        <p14:creationId xmlns:p14="http://schemas.microsoft.com/office/powerpoint/2010/main" val="2158136055"/>
+        <p14:creationId xmlns:p14="http://schemas.microsoft.com/office/powerpoint/2010/main" xmlns="" val="2158136055"/>
       </p:ext>
     </p:extLst>
   </p:cSld>
@@ -1313,6 +1323,7 @@
           <a:p>
             <a:fld id="{021BCA1A-8260-4C99-B39A-B43CAA439B87}" type="datetimeFigureOut">
               <a:rPr lang="de-CH" smtClean="0"/>
+              <a:pPr/>
               <a:t>04.11.2016</a:t>
             </a:fld>
             <a:endParaRPr lang="de-CH"/>
@@ -1355,7 +1366,8 @@
           <a:p>
             <a:fld id="{631FC4A0-0520-44E0-B489-E0DB3391F3AE}" type="slidenum">
               <a:rPr lang="de-CH" smtClean="0"/>
-              <a:t>‹#›</a:t>
+              <a:pPr/>
+              <a:t>‹Nr.›</a:t>
             </a:fld>
             <a:endParaRPr lang="de-CH"/>
           </a:p>
@@ -1364,7 +1376,7 @@
     </p:spTree>
     <p:extLst>
       <p:ext uri="{BB962C8B-B14F-4D97-AF65-F5344CB8AC3E}">
-        <p14:creationId xmlns:p14="http://schemas.microsoft.com/office/powerpoint/2010/main" val="3707560489"/>
+        <p14:creationId xmlns:p14="http://schemas.microsoft.com/office/powerpoint/2010/main" xmlns="" val="3707560489"/>
       </p:ext>
     </p:extLst>
   </p:cSld>
@@ -1564,6 +1576,7 @@
           <a:p>
             <a:fld id="{021BCA1A-8260-4C99-B39A-B43CAA439B87}" type="datetimeFigureOut">
               <a:rPr lang="de-CH" smtClean="0"/>
+              <a:pPr/>
               <a:t>04.11.2016</a:t>
             </a:fld>
             <a:endParaRPr lang="de-CH"/>
@@ -1606,7 +1619,8 @@
           <a:p>
             <a:fld id="{631FC4A0-0520-44E0-B489-E0DB3391F3AE}" type="slidenum">
               <a:rPr lang="de-CH" smtClean="0"/>
-              <a:t>‹#›</a:t>
+              <a:pPr/>
+              <a:t>‹Nr.›</a:t>
             </a:fld>
             <a:endParaRPr lang="de-CH"/>
           </a:p>
@@ -1615,7 +1629,7 @@
     </p:spTree>
     <p:extLst>
       <p:ext uri="{BB962C8B-B14F-4D97-AF65-F5344CB8AC3E}">
-        <p14:creationId xmlns:p14="http://schemas.microsoft.com/office/powerpoint/2010/main" val="723124208"/>
+        <p14:creationId xmlns:p14="http://schemas.microsoft.com/office/powerpoint/2010/main" xmlns="" val="723124208"/>
       </p:ext>
     </p:extLst>
   </p:cSld>
@@ -1803,6 +1817,7 @@
           <a:p>
             <a:fld id="{021BCA1A-8260-4C99-B39A-B43CAA439B87}" type="datetimeFigureOut">
               <a:rPr lang="de-CH" smtClean="0"/>
+              <a:pPr/>
               <a:t>04.11.2016</a:t>
             </a:fld>
             <a:endParaRPr lang="de-CH"/>
@@ -1845,7 +1860,8 @@
           <a:p>
             <a:fld id="{631FC4A0-0520-44E0-B489-E0DB3391F3AE}" type="slidenum">
               <a:rPr lang="de-CH" smtClean="0"/>
-              <a:t>‹#›</a:t>
+              <a:pPr/>
+              <a:t>‹Nr.›</a:t>
             </a:fld>
             <a:endParaRPr lang="de-CH"/>
           </a:p>
@@ -1854,7 +1870,7 @@
     </p:spTree>
     <p:extLst>
       <p:ext uri="{BB962C8B-B14F-4D97-AF65-F5344CB8AC3E}">
-        <p14:creationId xmlns:p14="http://schemas.microsoft.com/office/powerpoint/2010/main" val="160160226"/>
+        <p14:creationId xmlns:p14="http://schemas.microsoft.com/office/powerpoint/2010/main" xmlns="" val="160160226"/>
       </p:ext>
     </p:extLst>
   </p:cSld>
@@ -2177,6 +2193,7 @@
           <a:p>
             <a:fld id="{021BCA1A-8260-4C99-B39A-B43CAA439B87}" type="datetimeFigureOut">
               <a:rPr lang="de-CH" smtClean="0"/>
+              <a:pPr/>
               <a:t>04.11.2016</a:t>
             </a:fld>
             <a:endParaRPr lang="de-CH"/>
@@ -2219,7 +2236,8 @@
           <a:p>
             <a:fld id="{631FC4A0-0520-44E0-B489-E0DB3391F3AE}" type="slidenum">
               <a:rPr lang="de-CH" smtClean="0"/>
-              <a:t>‹#›</a:t>
+              <a:pPr/>
+              <a:t>‹Nr.›</a:t>
             </a:fld>
             <a:endParaRPr lang="de-CH"/>
           </a:p>
@@ -2228,7 +2246,7 @@
     </p:spTree>
     <p:extLst>
       <p:ext uri="{BB962C8B-B14F-4D97-AF65-F5344CB8AC3E}">
-        <p14:creationId xmlns:p14="http://schemas.microsoft.com/office/powerpoint/2010/main" val="2791204625"/>
+        <p14:creationId xmlns:p14="http://schemas.microsoft.com/office/powerpoint/2010/main" xmlns="" val="2791204625"/>
       </p:ext>
     </p:extLst>
   </p:cSld>
@@ -2295,6 +2313,7 @@
           <a:p>
             <a:fld id="{021BCA1A-8260-4C99-B39A-B43CAA439B87}" type="datetimeFigureOut">
               <a:rPr lang="de-CH" smtClean="0"/>
+              <a:pPr/>
               <a:t>04.11.2016</a:t>
             </a:fld>
             <a:endParaRPr lang="de-CH"/>
@@ -2337,7 +2356,8 @@
           <a:p>
             <a:fld id="{631FC4A0-0520-44E0-B489-E0DB3391F3AE}" type="slidenum">
               <a:rPr lang="de-CH" smtClean="0"/>
-              <a:t>‹#›</a:t>
+              <a:pPr/>
+              <a:t>‹Nr.›</a:t>
             </a:fld>
             <a:endParaRPr lang="de-CH"/>
           </a:p>
@@ -2346,7 +2366,7 @@
     </p:spTree>
     <p:extLst>
       <p:ext uri="{BB962C8B-B14F-4D97-AF65-F5344CB8AC3E}">
-        <p14:creationId xmlns:p14="http://schemas.microsoft.com/office/powerpoint/2010/main" val="1814524109"/>
+        <p14:creationId xmlns:p14="http://schemas.microsoft.com/office/powerpoint/2010/main" xmlns="" val="1814524109"/>
       </p:ext>
     </p:extLst>
   </p:cSld>
@@ -2390,6 +2410,7 @@
           <a:p>
             <a:fld id="{021BCA1A-8260-4C99-B39A-B43CAA439B87}" type="datetimeFigureOut">
               <a:rPr lang="de-CH" smtClean="0"/>
+              <a:pPr/>
               <a:t>04.11.2016</a:t>
             </a:fld>
             <a:endParaRPr lang="de-CH"/>
@@ -2432,7 +2453,8 @@
           <a:p>
             <a:fld id="{631FC4A0-0520-44E0-B489-E0DB3391F3AE}" type="slidenum">
               <a:rPr lang="de-CH" smtClean="0"/>
-              <a:t>‹#›</a:t>
+              <a:pPr/>
+              <a:t>‹Nr.›</a:t>
             </a:fld>
             <a:endParaRPr lang="de-CH"/>
           </a:p>
@@ -2441,7 +2463,7 @@
     </p:spTree>
     <p:extLst>
       <p:ext uri="{BB962C8B-B14F-4D97-AF65-F5344CB8AC3E}">
-        <p14:creationId xmlns:p14="http://schemas.microsoft.com/office/powerpoint/2010/main" val="4175484287"/>
+        <p14:creationId xmlns:p14="http://schemas.microsoft.com/office/powerpoint/2010/main" xmlns="" val="4175484287"/>
       </p:ext>
     </p:extLst>
   </p:cSld>
@@ -2667,6 +2689,7 @@
           <a:p>
             <a:fld id="{021BCA1A-8260-4C99-B39A-B43CAA439B87}" type="datetimeFigureOut">
               <a:rPr lang="de-CH" smtClean="0"/>
+              <a:pPr/>
               <a:t>04.11.2016</a:t>
             </a:fld>
             <a:endParaRPr lang="de-CH"/>
@@ -2709,7 +2732,8 @@
           <a:p>
             <a:fld id="{631FC4A0-0520-44E0-B489-E0DB3391F3AE}" type="slidenum">
               <a:rPr lang="de-CH" smtClean="0"/>
-              <a:t>‹#›</a:t>
+              <a:pPr/>
+              <a:t>‹Nr.›</a:t>
             </a:fld>
             <a:endParaRPr lang="de-CH"/>
           </a:p>
@@ -2718,7 +2742,7 @@
     </p:spTree>
     <p:extLst>
       <p:ext uri="{BB962C8B-B14F-4D97-AF65-F5344CB8AC3E}">
-        <p14:creationId xmlns:p14="http://schemas.microsoft.com/office/powerpoint/2010/main" val="618611160"/>
+        <p14:creationId xmlns:p14="http://schemas.microsoft.com/office/powerpoint/2010/main" xmlns="" val="618611160"/>
       </p:ext>
     </p:extLst>
   </p:cSld>
@@ -2924,6 +2948,7 @@
           <a:p>
             <a:fld id="{021BCA1A-8260-4C99-B39A-B43CAA439B87}" type="datetimeFigureOut">
               <a:rPr lang="de-CH" smtClean="0"/>
+              <a:pPr/>
               <a:t>04.11.2016</a:t>
             </a:fld>
             <a:endParaRPr lang="de-CH"/>
@@ -2966,7 +2991,8 @@
           <a:p>
             <a:fld id="{631FC4A0-0520-44E0-B489-E0DB3391F3AE}" type="slidenum">
               <a:rPr lang="de-CH" smtClean="0"/>
-              <a:t>‹#›</a:t>
+              <a:pPr/>
+              <a:t>‹Nr.›</a:t>
             </a:fld>
             <a:endParaRPr lang="de-CH"/>
           </a:p>
@@ -2975,7 +3001,7 @@
     </p:spTree>
     <p:extLst>
       <p:ext uri="{BB962C8B-B14F-4D97-AF65-F5344CB8AC3E}">
-        <p14:creationId xmlns:p14="http://schemas.microsoft.com/office/powerpoint/2010/main" val="4124404572"/>
+        <p14:creationId xmlns:p14="http://schemas.microsoft.com/office/powerpoint/2010/main" xmlns="" val="4124404572"/>
       </p:ext>
     </p:extLst>
   </p:cSld>
@@ -3137,6 +3163,7 @@
           <a:p>
             <a:fld id="{021BCA1A-8260-4C99-B39A-B43CAA439B87}" type="datetimeFigureOut">
               <a:rPr lang="de-CH" smtClean="0"/>
+              <a:pPr/>
               <a:t>04.11.2016</a:t>
             </a:fld>
             <a:endParaRPr lang="de-CH"/>
@@ -3215,7 +3242,8 @@
           <a:p>
             <a:fld id="{631FC4A0-0520-44E0-B489-E0DB3391F3AE}" type="slidenum">
               <a:rPr lang="de-CH" smtClean="0"/>
-              <a:t>‹#›</a:t>
+              <a:pPr/>
+              <a:t>‹Nr.›</a:t>
             </a:fld>
             <a:endParaRPr lang="de-CH" dirty="0"/>
           </a:p>
@@ -3224,7 +3252,7 @@
     </p:spTree>
     <p:extLst>
       <p:ext uri="{BB962C8B-B14F-4D97-AF65-F5344CB8AC3E}">
-        <p14:creationId xmlns:p14="http://schemas.microsoft.com/office/powerpoint/2010/main" val="2834213015"/>
+        <p14:creationId xmlns:p14="http://schemas.microsoft.com/office/powerpoint/2010/main" xmlns="" val="2834213015"/>
       </p:ext>
     </p:extLst>
   </p:cSld>
@@ -3804,8 +3832,8 @@
           <a:p>
             <a:pPr algn="l"/>
             <a:r>
-              <a:rPr lang="en-US" sz="1350" dirty="0"/>
-              <a:t>Isabella </a:t>
+              <a:rPr lang="en-US" sz="1350" dirty="0" smtClean="0"/>
+              <a:t>Isa </a:t>
             </a:r>
             <a:r>
               <a:rPr lang="en-US" sz="1350" dirty="0" err="1"/>
@@ -3850,7 +3878,7 @@
     </p:spTree>
     <p:extLst>
       <p:ext uri="{BB962C8B-B14F-4D97-AF65-F5344CB8AC3E}">
-        <p14:creationId xmlns:p14="http://schemas.microsoft.com/office/powerpoint/2010/main" val="678100568"/>
+        <p14:creationId xmlns:p14="http://schemas.microsoft.com/office/powerpoint/2010/main" xmlns="" val="678100568"/>
       </p:ext>
     </p:extLst>
   </p:cSld>
@@ -3924,6 +3952,7 @@
           <a:p>
             <a:fld id="{631FC4A0-0520-44E0-B489-E0DB3391F3AE}" type="slidenum">
               <a:rPr lang="de-CH" smtClean="0"/>
+              <a:pPr/>
               <a:t>2</a:t>
             </a:fld>
             <a:endParaRPr lang="de-CH" dirty="0"/>
@@ -3939,10 +3968,10 @@
           <p:nvPr/>
         </p:nvPicPr>
         <p:blipFill>
-          <a:blip r:embed="rId2">
+          <a:blip r:embed="rId2" cstate="print">
             <a:extLst>
               <a:ext uri="{28A0092B-C50C-407E-A947-70E740481C1C}">
-                <a14:useLocalDpi xmlns:a14="http://schemas.microsoft.com/office/drawing/2010/main" val="0"/>
+                <a14:useLocalDpi xmlns:a14="http://schemas.microsoft.com/office/drawing/2010/main" xmlns="" val="0"/>
               </a:ext>
             </a:extLst>
           </a:blip>
@@ -3962,7 +3991,7 @@
           <a:noFill/>
           <a:extLst>
             <a:ext uri="{909E8E84-426E-40DD-AFC4-6F175D3DCCD1}">
-              <a14:hiddenFill xmlns:a14="http://schemas.microsoft.com/office/drawing/2010/main">
+              <a14:hiddenFill xmlns:a14="http://schemas.microsoft.com/office/drawing/2010/main" xmlns="">
                 <a:solidFill>
                   <a:srgbClr val="FFFFFF"/>
                 </a:solidFill>
@@ -3980,10 +4009,10 @@
           <p:nvPr/>
         </p:nvPicPr>
         <p:blipFill>
-          <a:blip r:embed="rId3">
+          <a:blip r:embed="rId3" cstate="print">
             <a:extLst>
               <a:ext uri="{28A0092B-C50C-407E-A947-70E740481C1C}">
-                <a14:useLocalDpi xmlns:a14="http://schemas.microsoft.com/office/drawing/2010/main" val="0"/>
+                <a14:useLocalDpi xmlns:a14="http://schemas.microsoft.com/office/drawing/2010/main" xmlns="" val="0"/>
               </a:ext>
             </a:extLst>
           </a:blip>
@@ -4003,7 +4032,7 @@
           <a:noFill/>
           <a:extLst>
             <a:ext uri="{909E8E84-426E-40DD-AFC4-6F175D3DCCD1}">
-              <a14:hiddenFill xmlns:a14="http://schemas.microsoft.com/office/drawing/2010/main">
+              <a14:hiddenFill xmlns:a14="http://schemas.microsoft.com/office/drawing/2010/main" xmlns="">
                 <a:solidFill>
                   <a:srgbClr val="FFFFFF"/>
                 </a:solidFill>
@@ -4119,7 +4148,7 @@
     </p:spTree>
     <p:extLst>
       <p:ext uri="{BB962C8B-B14F-4D97-AF65-F5344CB8AC3E}">
-        <p14:creationId xmlns:p14="http://schemas.microsoft.com/office/powerpoint/2010/main" val="289482299"/>
+        <p14:creationId xmlns:p14="http://schemas.microsoft.com/office/powerpoint/2010/main" xmlns="" val="289482299"/>
       </p:ext>
     </p:extLst>
   </p:cSld>
@@ -4212,6 +4241,7 @@
           <a:p>
             <a:fld id="{631FC4A0-0520-44E0-B489-E0DB3391F3AE}" type="slidenum">
               <a:rPr lang="de-CH" smtClean="0"/>
+              <a:pPr/>
               <a:t>3</a:t>
             </a:fld>
             <a:endParaRPr lang="de-CH"/>
@@ -4221,7 +4251,7 @@
     </p:spTree>
     <p:extLst>
       <p:ext uri="{BB962C8B-B14F-4D97-AF65-F5344CB8AC3E}">
-        <p14:creationId xmlns:p14="http://schemas.microsoft.com/office/powerpoint/2010/main" val="2292730490"/>
+        <p14:creationId xmlns:p14="http://schemas.microsoft.com/office/powerpoint/2010/main" xmlns="" val="2292730490"/>
       </p:ext>
     </p:extLst>
   </p:cSld>
@@ -4296,8 +4326,21 @@
             <a:pPr defTabSz="688975"/>
             <a:r>
               <a:rPr lang="en-US" dirty="0" smtClean="0"/>
-              <a:t>Sequential: 	Boost Hopcroft-Karp</a:t>
-            </a:r>
+              <a:t>Sequential: 	Boost </a:t>
+            </a:r>
+            <a:r>
+              <a:rPr lang="en-US" dirty="0" smtClean="0"/>
+              <a:t>(</a:t>
+            </a:r>
+            <a:r>
+              <a:rPr lang="en-US" dirty="0" err="1" smtClean="0"/>
+              <a:t>Hopcroft</a:t>
+            </a:r>
+            <a:r>
+              <a:rPr lang="en-US" dirty="0" smtClean="0"/>
+              <a:t>-Karp) [1] </a:t>
+            </a:r>
+            <a:endParaRPr lang="en-US" dirty="0" smtClean="0"/>
           </a:p>
           <a:p>
             <a:pPr defTabSz="1031875"/>
@@ -4311,7 +4354,11 @@
             </a:r>
             <a:r>
               <a:rPr lang="en-US" dirty="0" smtClean="0"/>
-              <a:t>-Fan [1]</a:t>
+              <a:t>-Fan </a:t>
+            </a:r>
+            <a:r>
+              <a:rPr lang="en-US" dirty="0" smtClean="0"/>
+              <a:t>[2]</a:t>
             </a:r>
             <a:endParaRPr lang="de-CH" dirty="0"/>
           </a:p>
@@ -4334,9 +4381,10 @@
           <a:p>
             <a:fld id="{631FC4A0-0520-44E0-B489-E0DB3391F3AE}" type="slidenum">
               <a:rPr lang="de-CH" smtClean="0"/>
+              <a:pPr/>
               <a:t>4</a:t>
             </a:fld>
-            <a:endParaRPr lang="de-CH"/>
+            <a:endParaRPr lang="de-CH" dirty="0"/>
           </a:p>
         </p:txBody>
       </p:sp>
@@ -4348,8 +4396,8 @@
         </p:nvSpPr>
         <p:spPr>
           <a:xfrm>
-            <a:off x="628650" y="6400413"/>
-            <a:ext cx="7239000" cy="276999"/>
+            <a:off x="602770" y="6210632"/>
+            <a:ext cx="7239000" cy="830997"/>
           </a:xfrm>
           <a:prstGeom prst="rect">
             <a:avLst/>
@@ -4371,6 +4419,29 @@
                 </a:solidFill>
               </a:rPr>
               <a:t>[1] </a:t>
+            </a:r>
+            <a:r>
+              <a:rPr lang="en-US" sz="1200" dirty="0" smtClean="0">
+                <a:solidFill>
+                  <a:schemeClr val="bg1">
+                    <a:lumMod val="75000"/>
+                  </a:schemeClr>
+                </a:solidFill>
+                <a:hlinkClick r:id="rId2"/>
+              </a:rPr>
+              <a:t>http://www.boost.org/doc/libs/1_59_0/libs/graph/doc/maximum_matching.html</a:t>
+            </a:r>
+          </a:p>
+          <a:p>
+            <a:r>
+              <a:rPr lang="en-US" sz="1200" dirty="0" smtClean="0">
+                <a:solidFill>
+                  <a:schemeClr val="bg1">
+                    <a:lumMod val="75000"/>
+                  </a:schemeClr>
+                </a:solidFill>
+              </a:rPr>
+              <a:t>[2] </a:t>
             </a:r>
             <a:r>
               <a:rPr lang="en-US" sz="1200" dirty="0" smtClean="0">
@@ -4383,6 +4454,15 @@
               </a:rPr>
               <a:t>http://www.sandia.gov/~egboman/papers/ParallelMaximumMatching.pdf</a:t>
             </a:r>
+            <a:endParaRPr lang="en-US" sz="1200" dirty="0" smtClean="0">
+              <a:solidFill>
+                <a:schemeClr val="bg1">
+                  <a:lumMod val="75000"/>
+                </a:schemeClr>
+              </a:solidFill>
+            </a:endParaRPr>
+          </a:p>
+          <a:p>
             <a:r>
               <a:rPr lang="en-US" sz="1200" dirty="0" smtClean="0">
                 <a:solidFill>
@@ -4393,6 +4473,8 @@
               </a:rPr>
               <a:t> </a:t>
             </a:r>
+          </a:p>
+          <a:p>
             <a:endParaRPr lang="en-US" sz="1200" dirty="0">
               <a:solidFill>
                 <a:schemeClr val="bg1">
@@ -4406,7 +4488,7 @@
     </p:spTree>
     <p:extLst>
       <p:ext uri="{BB962C8B-B14F-4D97-AF65-F5344CB8AC3E}">
-        <p14:creationId xmlns:p14="http://schemas.microsoft.com/office/powerpoint/2010/main" val="266960599"/>
+        <p14:creationId xmlns:p14="http://schemas.microsoft.com/office/powerpoint/2010/main" xmlns="" val="266960599"/>
       </p:ext>
     </p:extLst>
   </p:cSld>
@@ -4484,6 +4566,7 @@
           <a:p>
             <a:fld id="{631FC4A0-0520-44E0-B489-E0DB3391F3AE}" type="slidenum">
               <a:rPr lang="de-CH" smtClean="0"/>
+              <a:pPr/>
               <a:t>5</a:t>
             </a:fld>
             <a:endParaRPr lang="de-CH"/>
@@ -5355,7 +5438,7 @@
     </p:spTree>
     <p:extLst>
       <p:ext uri="{BB962C8B-B14F-4D97-AF65-F5344CB8AC3E}">
-        <p14:creationId xmlns:p14="http://schemas.microsoft.com/office/powerpoint/2010/main" val="426005414"/>
+        <p14:creationId xmlns:p14="http://schemas.microsoft.com/office/powerpoint/2010/main" xmlns="" val="426005414"/>
       </p:ext>
     </p:extLst>
   </p:cSld>
@@ -5774,6 +5857,7 @@
           <a:p>
             <a:fld id="{631FC4A0-0520-44E0-B489-E0DB3391F3AE}" type="slidenum">
               <a:rPr lang="de-CH" smtClean="0"/>
+              <a:pPr/>
               <a:t>6</a:t>
             </a:fld>
             <a:endParaRPr lang="de-CH"/>
@@ -6655,7 +6739,7 @@
     </p:spTree>
     <p:extLst>
       <p:ext uri="{BB962C8B-B14F-4D97-AF65-F5344CB8AC3E}">
-        <p14:creationId xmlns:p14="http://schemas.microsoft.com/office/powerpoint/2010/main" val="2979775282"/>
+        <p14:creationId xmlns:p14="http://schemas.microsoft.com/office/powerpoint/2010/main" xmlns="" val="2979775282"/>
       </p:ext>
     </p:extLst>
   </p:cSld>
@@ -6946,6 +7030,7 @@
           <a:p>
             <a:fld id="{631FC4A0-0520-44E0-B489-E0DB3391F3AE}" type="slidenum">
               <a:rPr lang="de-CH" smtClean="0"/>
+              <a:pPr/>
               <a:t>7</a:t>
             </a:fld>
             <a:endParaRPr lang="de-CH"/>
@@ -7319,7 +7404,7 @@
     </p:spTree>
     <p:extLst>
       <p:ext uri="{BB962C8B-B14F-4D97-AF65-F5344CB8AC3E}">
-        <p14:creationId xmlns:p14="http://schemas.microsoft.com/office/powerpoint/2010/main" val="3768901669"/>
+        <p14:creationId xmlns:p14="http://schemas.microsoft.com/office/powerpoint/2010/main" xmlns="" val="3768901669"/>
       </p:ext>
     </p:extLst>
   </p:cSld>
@@ -7497,6 +7582,7 @@
           <a:p>
             <a:fld id="{631FC4A0-0520-44E0-B489-E0DB3391F3AE}" type="slidenum">
               <a:rPr lang="de-CH" smtClean="0"/>
+              <a:pPr/>
               <a:t>8</a:t>
             </a:fld>
             <a:endParaRPr lang="de-CH"/>
@@ -7534,7 +7620,7 @@
     </p:spTree>
     <p:extLst>
       <p:ext uri="{BB962C8B-B14F-4D97-AF65-F5344CB8AC3E}">
-        <p14:creationId xmlns:p14="http://schemas.microsoft.com/office/powerpoint/2010/main" val="2342700096"/>
+        <p14:creationId xmlns:p14="http://schemas.microsoft.com/office/powerpoint/2010/main" xmlns="" val="2342700096"/>
       </p:ext>
     </p:extLst>
   </p:cSld>
@@ -7594,7 +7680,7 @@
     </a:clrScheme>
     <a:fontScheme name="Office Theme">
       <a:majorFont>
-        <a:latin typeface="Calibri Light" panose="020F0302020204030204"/>
+        <a:latin typeface="Calibri Light"/>
         <a:ea typeface=""/>
         <a:cs typeface=""/>
         <a:font script="Jpan" typeface="ＭＳ Ｐゴシック"/>
@@ -7629,7 +7715,7 @@
         <a:font script="Geor" typeface="Sylfaen"/>
       </a:majorFont>
       <a:minorFont>
-        <a:latin typeface="Calibri" panose="020F0502020204030204"/>
+        <a:latin typeface="Calibri"/>
         <a:ea typeface=""/>
         <a:cs typeface=""/>
         <a:font script="Jpan" typeface="ＭＳ Ｐゴシック"/>
@@ -7806,7 +7892,7 @@
   <a:extraClrSchemeLst/>
   <a:extLst>
     <a:ext uri="{05A4C25C-085E-4340-85A3-A5531E510DB2}">
-      <thm15:themeFamily xmlns:thm15="http://schemas.microsoft.com/office/thememl/2012/main" name="Office Theme" id="{62F939B6-93AF-4DB8-9C6B-D6C7DFDC589F}" vid="{4A3C46E8-61CC-4603-A589-7422A47A8E4A}"/>
+      <thm15:themeFamily xmlns:thm15="http://schemas.microsoft.com/office/thememl/2012/main" xmlns="" name="Office Theme" id="{62F939B6-93AF-4DB8-9C6B-D6C7DFDC589F}" vid="{4A3C46E8-61CC-4603-A589-7422A47A8E4A}"/>
     </a:ext>
   </a:extLst>
 </a:theme>
@@ -7855,7 +7941,7 @@
     </a:clrScheme>
     <a:fontScheme name="Office">
       <a:majorFont>
-        <a:latin typeface="Calibri Light" panose="020F0302020204030204"/>
+        <a:latin typeface="Calibri Light"/>
         <a:ea typeface=""/>
         <a:cs typeface=""/>
         <a:font script="Jpan" typeface="ＭＳ Ｐゴシック"/>
@@ -7890,7 +7976,7 @@
         <a:font script="Geor" typeface="Sylfaen"/>
       </a:majorFont>
       <a:minorFont>
-        <a:latin typeface="Calibri" panose="020F0502020204030204"/>
+        <a:latin typeface="Calibri"/>
         <a:ea typeface=""/>
         <a:cs typeface=""/>
         <a:font script="Jpan" typeface="ＭＳ Ｐゴシック"/>
@@ -8067,7 +8153,7 @@
   <a:extraClrSchemeLst/>
   <a:extLst>
     <a:ext uri="{05A4C25C-085E-4340-85A3-A5531E510DB2}">
-      <thm15:themeFamily xmlns:thm15="http://schemas.microsoft.com/office/thememl/2012/main" name="Office Theme" id="{62F939B6-93AF-4DB8-9C6B-D6C7DFDC589F}" vid="{4A3C46E8-61CC-4603-A589-7422A47A8E4A}"/>
+      <thm15:themeFamily xmlns:thm15="http://schemas.microsoft.com/office/thememl/2012/main" xmlns="" name="Office Theme" id="{62F939B6-93AF-4DB8-9C6B-D6C7DFDC589F}" vid="{4A3C46E8-61CC-4603-A589-7422A47A8E4A}"/>
     </a:ext>
   </a:extLst>
 </a:theme>
@@ -8116,7 +8202,7 @@
     </a:clrScheme>
     <a:fontScheme name="Office">
       <a:majorFont>
-        <a:latin typeface="Calibri Light" panose="020F0302020204030204"/>
+        <a:latin typeface="Calibri Light"/>
         <a:ea typeface=""/>
         <a:cs typeface=""/>
         <a:font script="Jpan" typeface="ＭＳ Ｐゴシック"/>
@@ -8151,7 +8237,7 @@
         <a:font script="Geor" typeface="Sylfaen"/>
       </a:majorFont>
       <a:minorFont>
-        <a:latin typeface="Calibri" panose="020F0502020204030204"/>
+        <a:latin typeface="Calibri"/>
         <a:ea typeface=""/>
         <a:cs typeface=""/>
         <a:font script="Jpan" typeface="ＭＳ Ｐゴシック"/>
@@ -8328,7 +8414,7 @@
   <a:extraClrSchemeLst/>
   <a:extLst>
     <a:ext uri="{05A4C25C-085E-4340-85A3-A5531E510DB2}">
-      <thm15:themeFamily xmlns:thm15="http://schemas.microsoft.com/office/thememl/2012/main" name="Office Theme" id="{62F939B6-93AF-4DB8-9C6B-D6C7DFDC589F}" vid="{4A3C46E8-61CC-4603-A589-7422A47A8E4A}"/>
+      <thm15:themeFamily xmlns:thm15="http://schemas.microsoft.com/office/thememl/2012/main" xmlns="" name="Office Theme" id="{62F939B6-93AF-4DB8-9C6B-D6C7DFDC589F}" vid="{4A3C46E8-61CC-4603-A589-7422A47A8E4A}"/>
     </a:ext>
   </a:extLst>
 </a:theme>

</xml_diff>

<commit_message>
Merge of Progress Report presentation
Added first measurements diagram, added extra state of the art slide.
</commit_message>
<xml_diff>
--- a/docs/media/presentations/Progress Report.pptx
+++ b/docs/media/presentations/Progress Report.pptx
@@ -14,10 +14,10 @@
     <p:sldId id="256" r:id="rId2"/>
     <p:sldId id="257" r:id="rId3"/>
     <p:sldId id="263" r:id="rId4"/>
-    <p:sldId id="258" r:id="rId5"/>
-    <p:sldId id="259" r:id="rId6"/>
-    <p:sldId id="260" r:id="rId7"/>
-    <p:sldId id="261" r:id="rId8"/>
+    <p:sldId id="259" r:id="rId5"/>
+    <p:sldId id="260" r:id="rId6"/>
+    <p:sldId id="261" r:id="rId7"/>
+    <p:sldId id="265" r:id="rId8"/>
     <p:sldId id="262" r:id="rId9"/>
   </p:sldIdLst>
   <p:sldSz cx="9144000" cy="6858000" type="screen4x3"/>
@@ -119,7 +119,7 @@
   </p:defaultTextStyle>
   <p:extLst>
     <p:ext uri="{EFAFB233-063F-42B5-8137-9DF3F51BA10A}">
-      <p15:sldGuideLst xmlns:p15="http://schemas.microsoft.com/office/powerpoint/2012/main" xmlns="">
+      <p15:sldGuideLst xmlns:p15="http://schemas.microsoft.com/office/powerpoint/2012/main">
         <p15:guide id="1" orient="horz" pos="2160" userDrawn="1">
           <p15:clr>
             <a:srgbClr val="A4A3A4"/>
@@ -132,8 +132,1190 @@
         </p15:guide>
       </p15:sldGuideLst>
     </p:ext>
+    <p:ext uri="{2D200454-40CA-4A62-9FC3-DE9A4176ACB9}">
+      <p15:notesGuideLst xmlns:p15="http://schemas.microsoft.com/office/powerpoint/2012/main"/>
+    </p:ext>
   </p:extLst>
 </p:presentation>
+</file>
+
+<file path=ppt/charts/chart1.xml><?xml version="1.0" encoding="utf-8"?>
+<c:chartSpace xmlns:c="http://schemas.openxmlformats.org/drawingml/2006/chart" xmlns:a="http://schemas.openxmlformats.org/drawingml/2006/main" xmlns:r="http://schemas.openxmlformats.org/officeDocument/2006/relationships" xmlns:c16r2="http://schemas.microsoft.com/office/drawing/2015/06/chart">
+  <c:date1904 val="0"/>
+  <c:lang val="de-DE"/>
+  <c:roundedCorners val="0"/>
+  <mc:AlternateContent xmlns:mc="http://schemas.openxmlformats.org/markup-compatibility/2006">
+    <mc:Choice xmlns:c14="http://schemas.microsoft.com/office/drawing/2007/8/2/chart" Requires="c14">
+      <c14:style val="102"/>
+    </mc:Choice>
+    <mc:Fallback>
+      <c:style val="2"/>
+    </mc:Fallback>
+  </mc:AlternateContent>
+  <c:chart>
+    <c:title>
+      <c:tx>
+        <c:rich>
+          <a:bodyPr rot="0" spcFirstLastPara="1" vertOverflow="ellipsis" vert="horz" wrap="square" anchor="ctr" anchorCtr="1"/>
+          <a:lstStyle/>
+          <a:p>
+            <a:pPr>
+              <a:defRPr sz="1400" b="0" i="0" u="none" strike="noStrike" kern="1200" cap="none" spc="20" baseline="0">
+                <a:solidFill>
+                  <a:schemeClr val="tx1">
+                    <a:lumMod val="50000"/>
+                    <a:lumOff val="50000"/>
+                  </a:schemeClr>
+                </a:solidFill>
+                <a:latin typeface="+mn-lt"/>
+                <a:ea typeface="+mn-ea"/>
+                <a:cs typeface="+mn-cs"/>
+              </a:defRPr>
+            </a:pPr>
+            <a:r>
+              <a:rPr lang="en-US" sz="2000" dirty="0"/>
+              <a:t>Runtime on Xeon Phi</a:t>
+            </a:r>
+          </a:p>
+        </c:rich>
+      </c:tx>
+      <c:overlay val="0"/>
+      <c:spPr>
+        <a:noFill/>
+        <a:ln>
+          <a:noFill/>
+        </a:ln>
+        <a:effectLst/>
+      </c:spPr>
+      <c:txPr>
+        <a:bodyPr rot="0" spcFirstLastPara="1" vertOverflow="ellipsis" vert="horz" wrap="square" anchor="ctr" anchorCtr="1"/>
+        <a:lstStyle/>
+        <a:p>
+          <a:pPr>
+            <a:defRPr sz="1400" b="0" i="0" u="none" strike="noStrike" kern="1200" cap="none" spc="20" baseline="0">
+              <a:solidFill>
+                <a:schemeClr val="tx1">
+                  <a:lumMod val="50000"/>
+                  <a:lumOff val="50000"/>
+                </a:schemeClr>
+              </a:solidFill>
+              <a:latin typeface="+mn-lt"/>
+              <a:ea typeface="+mn-ea"/>
+              <a:cs typeface="+mn-cs"/>
+            </a:defRPr>
+          </a:pPr>
+          <a:endParaRPr lang="en-US"/>
+        </a:p>
+      </c:txPr>
+    </c:title>
+    <c:autoTitleDeleted val="0"/>
+    <c:plotArea>
+      <c:layout/>
+      <c:barChart>
+        <c:barDir val="col"/>
+        <c:grouping val="clustered"/>
+        <c:varyColors val="0"/>
+        <c:ser>
+          <c:idx val="2"/>
+          <c:order val="0"/>
+          <c:tx>
+            <c:strRef>
+              <c:f>[benchmark_results.ods]benchmark_results!$E$4</c:f>
+              <c:strCache>
+                <c:ptCount val="1"/>
+                <c:pt idx="0">
+                  <c:v>boost:edmonds_maxcm</c:v>
+                </c:pt>
+              </c:strCache>
+            </c:strRef>
+          </c:tx>
+          <c:spPr>
+            <a:gradFill rotWithShape="1">
+              <a:gsLst>
+                <a:gs pos="0">
+                  <a:schemeClr val="accent6">
+                    <a:lumMod val="110000"/>
+                    <a:satMod val="105000"/>
+                    <a:tint val="67000"/>
+                  </a:schemeClr>
+                </a:gs>
+                <a:gs pos="50000">
+                  <a:schemeClr val="accent6">
+                    <a:lumMod val="105000"/>
+                    <a:satMod val="103000"/>
+                    <a:tint val="73000"/>
+                  </a:schemeClr>
+                </a:gs>
+                <a:gs pos="100000">
+                  <a:schemeClr val="accent6">
+                    <a:lumMod val="105000"/>
+                    <a:satMod val="109000"/>
+                    <a:tint val="81000"/>
+                  </a:schemeClr>
+                </a:gs>
+              </a:gsLst>
+              <a:lin ang="5400000" scaled="0"/>
+            </a:gradFill>
+            <a:ln w="9525" cap="flat" cmpd="sng" algn="ctr">
+              <a:solidFill>
+                <a:schemeClr val="accent6">
+                  <a:shade val="95000"/>
+                </a:schemeClr>
+              </a:solidFill>
+              <a:round/>
+            </a:ln>
+            <a:effectLst/>
+          </c:spPr>
+          <c:invertIfNegative val="0"/>
+          <c:errBars>
+            <c:errBarType val="both"/>
+            <c:errValType val="cust"/>
+            <c:noEndCap val="0"/>
+            <c:plus>
+              <c:numRef>
+                <c:f>[benchmark_results.ods]benchmark_results!$H$4</c:f>
+                <c:numCache>
+                  <c:formatCode>General</c:formatCode>
+                  <c:ptCount val="1"/>
+                  <c:pt idx="0">
+                    <c:v>9.309661187273742E-3</c:v>
+                  </c:pt>
+                </c:numCache>
+              </c:numRef>
+            </c:plus>
+            <c:minus>
+              <c:numRef>
+                <c:f>[benchmark_results.ods]benchmark_results!$H$4</c:f>
+                <c:numCache>
+                  <c:formatCode>General</c:formatCode>
+                  <c:ptCount val="1"/>
+                  <c:pt idx="0">
+                    <c:v>9.309661187273742E-3</c:v>
+                  </c:pt>
+                </c:numCache>
+              </c:numRef>
+            </c:minus>
+            <c:spPr>
+              <a:noFill/>
+              <a:ln w="9525">
+                <a:solidFill>
+                  <a:schemeClr val="tx1">
+                    <a:lumMod val="50000"/>
+                    <a:lumOff val="50000"/>
+                  </a:schemeClr>
+                </a:solidFill>
+              </a:ln>
+              <a:effectLst/>
+            </c:spPr>
+          </c:errBars>
+          <c:val>
+            <c:numRef>
+              <c:f>[benchmark_results.ods]benchmark_results!$F$4</c:f>
+              <c:numCache>
+                <c:formatCode>General</c:formatCode>
+                <c:ptCount val="1"/>
+                <c:pt idx="0">
+                  <c:v>0.87285689130434807</c:v>
+                </c:pt>
+              </c:numCache>
+            </c:numRef>
+          </c:val>
+          <c:extLst>
+            <c:ext xmlns:c16="http://schemas.microsoft.com/office/drawing/2014/chart" uri="{C3380CC4-5D6E-409C-BE32-E72D297353CC}">
+              <c16:uniqueId val="{00000000-36DA-4B32-B48F-980BAA94EDD4}"/>
+            </c:ext>
+          </c:extLst>
+        </c:ser>
+        <c:ser>
+          <c:idx val="0"/>
+          <c:order val="1"/>
+          <c:tx>
+            <c:strRef>
+              <c:f>[benchmark_results.ods]benchmark_results!$E$2</c:f>
+              <c:strCache>
+                <c:ptCount val="1"/>
+                <c:pt idx="0">
+                  <c:v>pothen fan</c:v>
+                </c:pt>
+              </c:strCache>
+            </c:strRef>
+          </c:tx>
+          <c:spPr>
+            <a:gradFill rotWithShape="1">
+              <a:gsLst>
+                <a:gs pos="0">
+                  <a:schemeClr val="accent2">
+                    <a:lumMod val="110000"/>
+                    <a:satMod val="105000"/>
+                    <a:tint val="67000"/>
+                  </a:schemeClr>
+                </a:gs>
+                <a:gs pos="50000">
+                  <a:schemeClr val="accent2">
+                    <a:lumMod val="105000"/>
+                    <a:satMod val="103000"/>
+                    <a:tint val="73000"/>
+                  </a:schemeClr>
+                </a:gs>
+                <a:gs pos="100000">
+                  <a:schemeClr val="accent2">
+                    <a:lumMod val="105000"/>
+                    <a:satMod val="109000"/>
+                    <a:tint val="81000"/>
+                  </a:schemeClr>
+                </a:gs>
+              </a:gsLst>
+              <a:lin ang="5400000" scaled="0"/>
+            </a:gradFill>
+            <a:ln w="9525" cap="flat" cmpd="sng" algn="ctr">
+              <a:solidFill>
+                <a:schemeClr val="accent2">
+                  <a:shade val="95000"/>
+                </a:schemeClr>
+              </a:solidFill>
+              <a:round/>
+            </a:ln>
+            <a:effectLst/>
+          </c:spPr>
+          <c:invertIfNegative val="0"/>
+          <c:errBars>
+            <c:errBarType val="both"/>
+            <c:errValType val="cust"/>
+            <c:noEndCap val="0"/>
+            <c:plus>
+              <c:numRef>
+                <c:f>[benchmark_results.ods]benchmark_results!$H$2</c:f>
+                <c:numCache>
+                  <c:formatCode>General</c:formatCode>
+                  <c:ptCount val="1"/>
+                  <c:pt idx="0">
+                    <c:v>2.7823293818329169E-4</c:v>
+                  </c:pt>
+                </c:numCache>
+              </c:numRef>
+            </c:plus>
+            <c:minus>
+              <c:numRef>
+                <c:f>[benchmark_results.ods]benchmark_results!$H$2</c:f>
+                <c:numCache>
+                  <c:formatCode>General</c:formatCode>
+                  <c:ptCount val="1"/>
+                  <c:pt idx="0">
+                    <c:v>2.7823293818329169E-4</c:v>
+                  </c:pt>
+                </c:numCache>
+              </c:numRef>
+            </c:minus>
+            <c:spPr>
+              <a:noFill/>
+              <a:ln w="9525">
+                <a:solidFill>
+                  <a:schemeClr val="tx1">
+                    <a:lumMod val="50000"/>
+                    <a:lumOff val="50000"/>
+                  </a:schemeClr>
+                </a:solidFill>
+              </a:ln>
+              <a:effectLst/>
+            </c:spPr>
+          </c:errBars>
+          <c:val>
+            <c:numRef>
+              <c:f>[benchmark_results.ods]benchmark_results!$F$2</c:f>
+              <c:numCache>
+                <c:formatCode>General</c:formatCode>
+                <c:ptCount val="1"/>
+                <c:pt idx="0">
+                  <c:v>0.40256426086956532</c:v>
+                </c:pt>
+              </c:numCache>
+            </c:numRef>
+          </c:val>
+          <c:extLst>
+            <c:ext xmlns:c16="http://schemas.microsoft.com/office/drawing/2014/chart" uri="{C3380CC4-5D6E-409C-BE32-E72D297353CC}">
+              <c16:uniqueId val="{00000001-36DA-4B32-B48F-980BAA94EDD4}"/>
+            </c:ext>
+          </c:extLst>
+        </c:ser>
+        <c:ser>
+          <c:idx val="1"/>
+          <c:order val="2"/>
+          <c:tx>
+            <c:strRef>
+              <c:f>[benchmark_results.ods]benchmark_results!$E$3</c:f>
+              <c:strCache>
+                <c:ptCount val="1"/>
+                <c:pt idx="0">
+                  <c:v>parallel pothen fan</c:v>
+                </c:pt>
+              </c:strCache>
+            </c:strRef>
+          </c:tx>
+          <c:spPr>
+            <a:gradFill rotWithShape="1">
+              <a:gsLst>
+                <a:gs pos="0">
+                  <a:schemeClr val="accent4">
+                    <a:lumMod val="110000"/>
+                    <a:satMod val="105000"/>
+                    <a:tint val="67000"/>
+                  </a:schemeClr>
+                </a:gs>
+                <a:gs pos="50000">
+                  <a:schemeClr val="accent4">
+                    <a:lumMod val="105000"/>
+                    <a:satMod val="103000"/>
+                    <a:tint val="73000"/>
+                  </a:schemeClr>
+                </a:gs>
+                <a:gs pos="100000">
+                  <a:schemeClr val="accent4">
+                    <a:lumMod val="105000"/>
+                    <a:satMod val="109000"/>
+                    <a:tint val="81000"/>
+                  </a:schemeClr>
+                </a:gs>
+              </a:gsLst>
+              <a:lin ang="5400000" scaled="0"/>
+            </a:gradFill>
+            <a:ln w="9525" cap="flat" cmpd="sng" algn="ctr">
+              <a:solidFill>
+                <a:schemeClr val="accent4">
+                  <a:shade val="95000"/>
+                </a:schemeClr>
+              </a:solidFill>
+              <a:round/>
+            </a:ln>
+            <a:effectLst/>
+          </c:spPr>
+          <c:invertIfNegative val="0"/>
+          <c:errBars>
+            <c:errBarType val="both"/>
+            <c:errValType val="cust"/>
+            <c:noEndCap val="0"/>
+            <c:plus>
+              <c:numRef>
+                <c:f>[benchmark_results.ods]benchmark_results!$H$3</c:f>
+                <c:numCache>
+                  <c:formatCode>General</c:formatCode>
+                  <c:ptCount val="1"/>
+                  <c:pt idx="0">
+                    <c:v>6.3438280981628105E-4</c:v>
+                  </c:pt>
+                </c:numCache>
+              </c:numRef>
+            </c:plus>
+            <c:minus>
+              <c:numRef>
+                <c:f>[benchmark_results.ods]benchmark_results!$H$3</c:f>
+                <c:numCache>
+                  <c:formatCode>General</c:formatCode>
+                  <c:ptCount val="1"/>
+                  <c:pt idx="0">
+                    <c:v>6.3438280981628105E-4</c:v>
+                  </c:pt>
+                </c:numCache>
+              </c:numRef>
+            </c:minus>
+            <c:spPr>
+              <a:noFill/>
+              <a:ln w="9525">
+                <a:solidFill>
+                  <a:schemeClr val="tx1">
+                    <a:lumMod val="50000"/>
+                    <a:lumOff val="50000"/>
+                  </a:schemeClr>
+                </a:solidFill>
+              </a:ln>
+              <a:effectLst/>
+            </c:spPr>
+          </c:errBars>
+          <c:val>
+            <c:numRef>
+              <c:f>[benchmark_results.ods]benchmark_results!$F$3</c:f>
+              <c:numCache>
+                <c:formatCode>General</c:formatCode>
+                <c:ptCount val="1"/>
+                <c:pt idx="0">
+                  <c:v>3.6053532608695656E-2</c:v>
+                </c:pt>
+              </c:numCache>
+            </c:numRef>
+          </c:val>
+          <c:extLst>
+            <c:ext xmlns:c16="http://schemas.microsoft.com/office/drawing/2014/chart" uri="{C3380CC4-5D6E-409C-BE32-E72D297353CC}">
+              <c16:uniqueId val="{00000002-36DA-4B32-B48F-980BAA94EDD4}"/>
+            </c:ext>
+          </c:extLst>
+        </c:ser>
+        <c:dLbls>
+          <c:showLegendKey val="0"/>
+          <c:showVal val="0"/>
+          <c:showCatName val="0"/>
+          <c:showSerName val="0"/>
+          <c:showPercent val="0"/>
+          <c:showBubbleSize val="0"/>
+        </c:dLbls>
+        <c:gapWidth val="100"/>
+        <c:overlap val="-24"/>
+        <c:axId val="416761952"/>
+        <c:axId val="421033136"/>
+      </c:barChart>
+      <c:catAx>
+        <c:axId val="416761952"/>
+        <c:scaling>
+          <c:orientation val="minMax"/>
+        </c:scaling>
+        <c:delete val="1"/>
+        <c:axPos val="b"/>
+        <c:numFmt formatCode="General" sourceLinked="1"/>
+        <c:majorTickMark val="none"/>
+        <c:minorTickMark val="none"/>
+        <c:tickLblPos val="nextTo"/>
+        <c:crossAx val="421033136"/>
+        <c:crosses val="autoZero"/>
+        <c:auto val="1"/>
+        <c:lblAlgn val="ctr"/>
+        <c:lblOffset val="100"/>
+        <c:noMultiLvlLbl val="0"/>
+      </c:catAx>
+      <c:valAx>
+        <c:axId val="421033136"/>
+        <c:scaling>
+          <c:orientation val="minMax"/>
+        </c:scaling>
+        <c:delete val="0"/>
+        <c:axPos val="l"/>
+        <c:majorGridlines>
+          <c:spPr>
+            <a:ln w="9525" cap="flat" cmpd="sng" algn="ctr">
+              <a:solidFill>
+                <a:schemeClr val="tx1">
+                  <a:lumMod val="15000"/>
+                  <a:lumOff val="85000"/>
+                </a:schemeClr>
+              </a:solidFill>
+              <a:round/>
+            </a:ln>
+            <a:effectLst/>
+          </c:spPr>
+        </c:majorGridlines>
+        <c:title>
+          <c:tx>
+            <c:rich>
+              <a:bodyPr rot="-5400000" spcFirstLastPara="1" vertOverflow="ellipsis" vert="horz" wrap="square" anchor="ctr" anchorCtr="1"/>
+              <a:lstStyle/>
+              <a:p>
+                <a:pPr>
+                  <a:defRPr sz="900" b="0" i="0" u="none" strike="noStrike" kern="1200" cap="all" baseline="0">
+                    <a:solidFill>
+                      <a:schemeClr val="tx1">
+                        <a:lumMod val="50000"/>
+                        <a:lumOff val="50000"/>
+                      </a:schemeClr>
+                    </a:solidFill>
+                    <a:latin typeface="+mn-lt"/>
+                    <a:ea typeface="+mn-ea"/>
+                    <a:cs typeface="+mn-cs"/>
+                  </a:defRPr>
+                </a:pPr>
+                <a:r>
+                  <a:rPr lang="en-US" dirty="0"/>
+                  <a:t>Runtime [s]</a:t>
+                </a:r>
+              </a:p>
+            </c:rich>
+          </c:tx>
+          <c:overlay val="0"/>
+          <c:spPr>
+            <a:noFill/>
+            <a:ln>
+              <a:noFill/>
+            </a:ln>
+            <a:effectLst/>
+          </c:spPr>
+          <c:txPr>
+            <a:bodyPr rot="-5400000" spcFirstLastPara="1" vertOverflow="ellipsis" vert="horz" wrap="square" anchor="ctr" anchorCtr="1"/>
+            <a:lstStyle/>
+            <a:p>
+              <a:pPr>
+                <a:defRPr sz="900" b="0" i="0" u="none" strike="noStrike" kern="1200" cap="all" baseline="0">
+                  <a:solidFill>
+                    <a:schemeClr val="tx1">
+                      <a:lumMod val="50000"/>
+                      <a:lumOff val="50000"/>
+                    </a:schemeClr>
+                  </a:solidFill>
+                  <a:latin typeface="+mn-lt"/>
+                  <a:ea typeface="+mn-ea"/>
+                  <a:cs typeface="+mn-cs"/>
+                </a:defRPr>
+              </a:pPr>
+              <a:endParaRPr lang="en-US"/>
+            </a:p>
+          </c:txPr>
+        </c:title>
+        <c:numFmt formatCode="General" sourceLinked="1"/>
+        <c:majorTickMark val="none"/>
+        <c:minorTickMark val="none"/>
+        <c:tickLblPos val="nextTo"/>
+        <c:spPr>
+          <a:noFill/>
+          <a:ln>
+            <a:noFill/>
+          </a:ln>
+          <a:effectLst/>
+        </c:spPr>
+        <c:txPr>
+          <a:bodyPr rot="-60000000" spcFirstLastPara="1" vertOverflow="ellipsis" vert="horz" wrap="square" anchor="ctr" anchorCtr="1"/>
+          <a:lstStyle/>
+          <a:p>
+            <a:pPr>
+              <a:defRPr sz="900" b="0" i="0" u="none" strike="noStrike" kern="1200" baseline="0">
+                <a:solidFill>
+                  <a:schemeClr val="tx1">
+                    <a:lumMod val="50000"/>
+                    <a:lumOff val="50000"/>
+                  </a:schemeClr>
+                </a:solidFill>
+                <a:latin typeface="+mn-lt"/>
+                <a:ea typeface="+mn-ea"/>
+                <a:cs typeface="+mn-cs"/>
+              </a:defRPr>
+            </a:pPr>
+            <a:endParaRPr lang="en-US"/>
+          </a:p>
+        </c:txPr>
+        <c:crossAx val="416761952"/>
+        <c:crosses val="autoZero"/>
+        <c:crossBetween val="between"/>
+      </c:valAx>
+      <c:spPr>
+        <a:noFill/>
+        <a:ln>
+          <a:noFill/>
+        </a:ln>
+        <a:effectLst/>
+      </c:spPr>
+    </c:plotArea>
+    <c:legend>
+      <c:legendPos val="b"/>
+      <c:overlay val="0"/>
+      <c:spPr>
+        <a:noFill/>
+        <a:ln>
+          <a:noFill/>
+        </a:ln>
+        <a:effectLst/>
+      </c:spPr>
+      <c:txPr>
+        <a:bodyPr rot="0" spcFirstLastPara="1" vertOverflow="ellipsis" vert="horz" wrap="square" anchor="ctr" anchorCtr="1"/>
+        <a:lstStyle/>
+        <a:p>
+          <a:pPr>
+            <a:defRPr sz="1200" b="0" i="0" u="none" strike="noStrike" kern="1200" baseline="0">
+              <a:solidFill>
+                <a:schemeClr val="tx1">
+                  <a:lumMod val="50000"/>
+                  <a:lumOff val="50000"/>
+                </a:schemeClr>
+              </a:solidFill>
+              <a:latin typeface="+mn-lt"/>
+              <a:ea typeface="+mn-ea"/>
+              <a:cs typeface="+mn-cs"/>
+            </a:defRPr>
+          </a:pPr>
+          <a:endParaRPr lang="en-US"/>
+        </a:p>
+      </c:txPr>
+    </c:legend>
+    <c:plotVisOnly val="1"/>
+    <c:dispBlanksAs val="gap"/>
+    <c:showDLblsOverMax val="0"/>
+  </c:chart>
+  <c:spPr>
+    <a:noFill/>
+    <a:ln>
+      <a:noFill/>
+    </a:ln>
+    <a:effectLst/>
+  </c:spPr>
+  <c:txPr>
+    <a:bodyPr/>
+    <a:lstStyle/>
+    <a:p>
+      <a:pPr>
+        <a:defRPr/>
+      </a:pPr>
+      <a:endParaRPr lang="en-US"/>
+    </a:p>
+  </c:txPr>
+  <c:externalData r:id="rId3">
+    <c:autoUpdate val="0"/>
+  </c:externalData>
+</c:chartSpace>
+</file>
+
+<file path=ppt/charts/colors1.xml><?xml version="1.0" encoding="utf-8"?>
+<cs:colorStyle xmlns:cs="http://schemas.microsoft.com/office/drawing/2012/chartStyle" xmlns:a="http://schemas.openxmlformats.org/drawingml/2006/main" meth="cycle" id="12">
+  <a:schemeClr val="accent2"/>
+  <a:schemeClr val="accent4"/>
+  <a:schemeClr val="accent6"/>
+  <cs:variation/>
+  <cs:variation>
+    <a:lumMod val="60000"/>
+  </cs:variation>
+  <cs:variation>
+    <a:lumMod val="80000"/>
+    <a:lumOff val="20000"/>
+  </cs:variation>
+  <cs:variation>
+    <a:lumMod val="80000"/>
+  </cs:variation>
+  <cs:variation>
+    <a:lumMod val="60000"/>
+    <a:lumOff val="40000"/>
+  </cs:variation>
+  <cs:variation>
+    <a:lumMod val="50000"/>
+  </cs:variation>
+  <cs:variation>
+    <a:lumMod val="70000"/>
+    <a:lumOff val="30000"/>
+  </cs:variation>
+  <cs:variation>
+    <a:lumMod val="70000"/>
+  </cs:variation>
+  <cs:variation>
+    <a:lumMod val="50000"/>
+    <a:lumOff val="50000"/>
+  </cs:variation>
+</cs:colorStyle>
+</file>
+
+<file path=ppt/charts/style1.xml><?xml version="1.0" encoding="utf-8"?>
+<cs:chartStyle xmlns:cs="http://schemas.microsoft.com/office/drawing/2012/chartStyle" xmlns:a="http://schemas.openxmlformats.org/drawingml/2006/main" id="206">
+  <cs:axisTitle>
+    <cs:lnRef idx="0"/>
+    <cs:fillRef idx="0"/>
+    <cs:effectRef idx="0"/>
+    <cs:fontRef idx="minor">
+      <a:schemeClr val="tx1">
+        <a:lumMod val="50000"/>
+        <a:lumOff val="50000"/>
+      </a:schemeClr>
+    </cs:fontRef>
+    <cs:defRPr sz="900" kern="1200" cap="all"/>
+  </cs:axisTitle>
+  <cs:categoryAxis>
+    <cs:lnRef idx="0"/>
+    <cs:fillRef idx="0"/>
+    <cs:effectRef idx="0"/>
+    <cs:fontRef idx="minor">
+      <a:schemeClr val="tx1">
+        <a:lumMod val="50000"/>
+        <a:lumOff val="50000"/>
+      </a:schemeClr>
+    </cs:fontRef>
+    <cs:spPr>
+      <a:ln w="9525" cap="flat" cmpd="sng" algn="ctr">
+        <a:solidFill>
+          <a:schemeClr val="tx1">
+            <a:lumMod val="15000"/>
+            <a:lumOff val="85000"/>
+          </a:schemeClr>
+        </a:solidFill>
+        <a:round/>
+      </a:ln>
+    </cs:spPr>
+    <cs:defRPr sz="900" kern="1200"/>
+  </cs:categoryAxis>
+  <cs:chartArea mods="allowNoFillOverride allowNoLineOverride">
+    <cs:lnRef idx="0"/>
+    <cs:fillRef idx="0"/>
+    <cs:effectRef idx="0"/>
+    <cs:fontRef idx="minor">
+      <a:schemeClr val="dk1"/>
+    </cs:fontRef>
+    <cs:spPr>
+      <a:solidFill>
+        <a:schemeClr val="bg1"/>
+      </a:solidFill>
+      <a:ln w="9525" cap="flat" cmpd="sng" algn="ctr">
+        <a:solidFill>
+          <a:schemeClr val="tx1">
+            <a:lumMod val="15000"/>
+            <a:lumOff val="85000"/>
+          </a:schemeClr>
+        </a:solidFill>
+        <a:round/>
+      </a:ln>
+    </cs:spPr>
+    <cs:defRPr sz="900" kern="1200"/>
+  </cs:chartArea>
+  <cs:dataLabel>
+    <cs:lnRef idx="0"/>
+    <cs:fillRef idx="0"/>
+    <cs:effectRef idx="0"/>
+    <cs:fontRef idx="minor">
+      <a:schemeClr val="tx1">
+        <a:lumMod val="50000"/>
+        <a:lumOff val="50000"/>
+      </a:schemeClr>
+    </cs:fontRef>
+    <cs:defRPr sz="900" kern="1200"/>
+  </cs:dataLabel>
+  <cs:dataLabelCallout>
+    <cs:lnRef idx="0"/>
+    <cs:fillRef idx="0"/>
+    <cs:effectRef idx="0"/>
+    <cs:fontRef idx="minor">
+      <a:schemeClr val="dk1">
+        <a:lumMod val="65000"/>
+        <a:lumOff val="35000"/>
+      </a:schemeClr>
+    </cs:fontRef>
+    <cs:spPr>
+      <a:solidFill>
+        <a:schemeClr val="lt1"/>
+      </a:solidFill>
+      <a:ln>
+        <a:solidFill>
+          <a:schemeClr val="dk1">
+            <a:lumMod val="25000"/>
+            <a:lumOff val="75000"/>
+          </a:schemeClr>
+        </a:solidFill>
+      </a:ln>
+    </cs:spPr>
+    <cs:defRPr sz="900" kern="1200"/>
+    <cs:bodyPr rot="0" spcFirstLastPara="1" vertOverflow="clip" horzOverflow="clip" vert="horz" wrap="square" lIns="36576" tIns="18288" rIns="36576" bIns="18288" anchor="ctr" anchorCtr="1">
+      <a:spAutoFit/>
+    </cs:bodyPr>
+  </cs:dataLabelCallout>
+  <cs:dataPoint>
+    <cs:lnRef idx="0">
+      <cs:styleClr val="auto"/>
+    </cs:lnRef>
+    <cs:fillRef idx="2">
+      <cs:styleClr val="auto"/>
+    </cs:fillRef>
+    <cs:effectRef idx="1"/>
+    <cs:fontRef idx="minor">
+      <a:schemeClr val="dk1"/>
+    </cs:fontRef>
+    <cs:spPr>
+      <a:ln w="9525" cap="flat" cmpd="sng" algn="ctr">
+        <a:solidFill>
+          <a:schemeClr val="phClr">
+            <a:shade val="95000"/>
+          </a:schemeClr>
+        </a:solidFill>
+        <a:round/>
+      </a:ln>
+    </cs:spPr>
+  </cs:dataPoint>
+  <cs:dataPoint3D>
+    <cs:lnRef idx="0">
+      <cs:styleClr val="auto"/>
+    </cs:lnRef>
+    <cs:fillRef idx="2">
+      <cs:styleClr val="auto"/>
+    </cs:fillRef>
+    <cs:effectRef idx="1"/>
+    <cs:fontRef idx="minor">
+      <a:schemeClr val="dk1"/>
+    </cs:fontRef>
+    <cs:spPr>
+      <a:ln w="9525" cap="flat" cmpd="sng" algn="ctr">
+        <a:solidFill>
+          <a:schemeClr val="phClr">
+            <a:shade val="95000"/>
+          </a:schemeClr>
+        </a:solidFill>
+        <a:round/>
+      </a:ln>
+    </cs:spPr>
+  </cs:dataPoint3D>
+  <cs:dataPointLine>
+    <cs:lnRef idx="0">
+      <cs:styleClr val="auto"/>
+    </cs:lnRef>
+    <cs:fillRef idx="2">
+      <cs:styleClr val="auto"/>
+    </cs:fillRef>
+    <cs:effectRef idx="1"/>
+    <cs:fontRef idx="minor">
+      <a:schemeClr val="dk1"/>
+    </cs:fontRef>
+    <cs:spPr>
+      <a:ln w="15875" cap="rnd">
+        <a:solidFill>
+          <a:schemeClr val="phClr"/>
+        </a:solidFill>
+        <a:round/>
+      </a:ln>
+    </cs:spPr>
+  </cs:dataPointLine>
+  <cs:dataPointMarker>
+    <cs:lnRef idx="0">
+      <cs:styleClr val="auto"/>
+    </cs:lnRef>
+    <cs:fillRef idx="2">
+      <cs:styleClr val="auto"/>
+    </cs:fillRef>
+    <cs:effectRef idx="1"/>
+    <cs:fontRef idx="minor">
+      <a:schemeClr val="dk1"/>
+    </cs:fontRef>
+    <cs:spPr>
+      <a:ln w="9525" cap="flat" cmpd="sng" algn="ctr">
+        <a:solidFill>
+          <a:schemeClr val="phClr">
+            <a:shade val="95000"/>
+          </a:schemeClr>
+        </a:solidFill>
+        <a:round/>
+      </a:ln>
+    </cs:spPr>
+  </cs:dataPointMarker>
+  <cs:dataPointMarkerLayout symbol="circle" size="4"/>
+  <cs:dataPointWireframe>
+    <cs:lnRef idx="0">
+      <cs:styleClr val="auto"/>
+    </cs:lnRef>
+    <cs:fillRef idx="2"/>
+    <cs:effectRef idx="0"/>
+    <cs:fontRef idx="minor">
+      <a:schemeClr val="dk1"/>
+    </cs:fontRef>
+    <cs:spPr>
+      <a:ln w="9525" cap="rnd">
+        <a:solidFill>
+          <a:schemeClr val="phClr"/>
+        </a:solidFill>
+        <a:round/>
+      </a:ln>
+    </cs:spPr>
+  </cs:dataPointWireframe>
+  <cs:dataTable>
+    <cs:lnRef idx="0"/>
+    <cs:fillRef idx="0"/>
+    <cs:effectRef idx="0"/>
+    <cs:fontRef idx="minor">
+      <a:schemeClr val="tx1">
+        <a:lumMod val="50000"/>
+        <a:lumOff val="50000"/>
+      </a:schemeClr>
+    </cs:fontRef>
+    <cs:spPr>
+      <a:ln w="9525">
+        <a:solidFill>
+          <a:schemeClr val="tx1">
+            <a:lumMod val="15000"/>
+            <a:lumOff val="85000"/>
+          </a:schemeClr>
+        </a:solidFill>
+      </a:ln>
+    </cs:spPr>
+    <cs:defRPr sz="900" kern="1200"/>
+  </cs:dataTable>
+  <cs:downBar>
+    <cs:lnRef idx="0"/>
+    <cs:fillRef idx="0"/>
+    <cs:effectRef idx="0"/>
+    <cs:fontRef idx="minor">
+      <a:schemeClr val="dk1"/>
+    </cs:fontRef>
+    <cs:spPr>
+      <a:solidFill>
+        <a:schemeClr val="dk1">
+          <a:lumMod val="75000"/>
+          <a:lumOff val="25000"/>
+        </a:schemeClr>
+      </a:solidFill>
+      <a:ln w="9525">
+        <a:solidFill>
+          <a:schemeClr val="tx1">
+            <a:lumMod val="50000"/>
+            <a:lumOff val="50000"/>
+          </a:schemeClr>
+        </a:solidFill>
+      </a:ln>
+    </cs:spPr>
+  </cs:downBar>
+  <cs:dropLine>
+    <cs:lnRef idx="0"/>
+    <cs:fillRef idx="0"/>
+    <cs:effectRef idx="0"/>
+    <cs:fontRef idx="minor">
+      <a:schemeClr val="dk1"/>
+    </cs:fontRef>
+    <cs:spPr>
+      <a:ln w="9525">
+        <a:solidFill>
+          <a:schemeClr val="tx1">
+            <a:lumMod val="35000"/>
+            <a:lumOff val="65000"/>
+          </a:schemeClr>
+        </a:solidFill>
+        <a:prstDash val="dash"/>
+      </a:ln>
+    </cs:spPr>
+  </cs:dropLine>
+  <cs:errorBar>
+    <cs:lnRef idx="0"/>
+    <cs:fillRef idx="0"/>
+    <cs:effectRef idx="0"/>
+    <cs:fontRef idx="minor">
+      <a:schemeClr val="dk1"/>
+    </cs:fontRef>
+    <cs:spPr>
+      <a:ln w="9525">
+        <a:solidFill>
+          <a:schemeClr val="tx1">
+            <a:lumMod val="50000"/>
+            <a:lumOff val="50000"/>
+          </a:schemeClr>
+        </a:solidFill>
+      </a:ln>
+    </cs:spPr>
+  </cs:errorBar>
+  <cs:floor>
+    <cs:lnRef idx="0"/>
+    <cs:fillRef idx="0"/>
+    <cs:effectRef idx="0"/>
+    <cs:fontRef idx="minor">
+      <a:schemeClr val="dk1"/>
+    </cs:fontRef>
+  </cs:floor>
+  <cs:gridlineMajor>
+    <cs:lnRef idx="0"/>
+    <cs:fillRef idx="0"/>
+    <cs:effectRef idx="0"/>
+    <cs:fontRef idx="minor">
+      <a:schemeClr val="dk1"/>
+    </cs:fontRef>
+    <cs:spPr>
+      <a:ln w="9525" cap="flat" cmpd="sng" algn="ctr">
+        <a:solidFill>
+          <a:schemeClr val="tx1">
+            <a:lumMod val="15000"/>
+            <a:lumOff val="85000"/>
+          </a:schemeClr>
+        </a:solidFill>
+        <a:round/>
+      </a:ln>
+    </cs:spPr>
+  </cs:gridlineMajor>
+  <cs:gridlineMinor>
+    <cs:lnRef idx="0"/>
+    <cs:fillRef idx="0"/>
+    <cs:effectRef idx="0"/>
+    <cs:fontRef idx="minor">
+      <a:schemeClr val="dk1"/>
+    </cs:fontRef>
+    <cs:spPr>
+      <a:ln>
+        <a:solidFill>
+          <a:schemeClr val="tx1">
+            <a:lumMod val="5000"/>
+            <a:lumOff val="95000"/>
+          </a:schemeClr>
+        </a:solidFill>
+      </a:ln>
+    </cs:spPr>
+  </cs:gridlineMinor>
+  <cs:hiLoLine>
+    <cs:lnRef idx="0"/>
+    <cs:fillRef idx="0"/>
+    <cs:effectRef idx="0"/>
+    <cs:fontRef idx="minor">
+      <a:schemeClr val="dk1"/>
+    </cs:fontRef>
+    <cs:spPr>
+      <a:ln w="9525">
+        <a:solidFill>
+          <a:schemeClr val="tx1">
+            <a:lumMod val="50000"/>
+            <a:lumOff val="50000"/>
+          </a:schemeClr>
+        </a:solidFill>
+        <a:prstDash val="dash"/>
+      </a:ln>
+    </cs:spPr>
+  </cs:hiLoLine>
+  <cs:leaderLine>
+    <cs:lnRef idx="0"/>
+    <cs:fillRef idx="0"/>
+    <cs:effectRef idx="0"/>
+    <cs:fontRef idx="minor">
+      <a:schemeClr val="dk1"/>
+    </cs:fontRef>
+    <cs:spPr>
+      <a:ln w="9525">
+        <a:solidFill>
+          <a:schemeClr val="tx1">
+            <a:lumMod val="35000"/>
+            <a:lumOff val="65000"/>
+          </a:schemeClr>
+        </a:solidFill>
+      </a:ln>
+    </cs:spPr>
+  </cs:leaderLine>
+  <cs:legend>
+    <cs:lnRef idx="0"/>
+    <cs:fillRef idx="0"/>
+    <cs:effectRef idx="0"/>
+    <cs:fontRef idx="minor">
+      <a:schemeClr val="tx1">
+        <a:lumMod val="50000"/>
+        <a:lumOff val="50000"/>
+      </a:schemeClr>
+    </cs:fontRef>
+    <cs:defRPr sz="900" kern="1200"/>
+  </cs:legend>
+  <cs:plotArea mods="allowNoFillOverride allowNoLineOverride">
+    <cs:lnRef idx="0"/>
+    <cs:fillRef idx="0"/>
+    <cs:effectRef idx="0"/>
+    <cs:fontRef idx="minor">
+      <a:schemeClr val="dk1"/>
+    </cs:fontRef>
+  </cs:plotArea>
+  <cs:plotArea3D mods="allowNoFillOverride allowNoLineOverride">
+    <cs:lnRef idx="0"/>
+    <cs:fillRef idx="0"/>
+    <cs:effectRef idx="0"/>
+    <cs:fontRef idx="minor">
+      <a:schemeClr val="dk1"/>
+    </cs:fontRef>
+  </cs:plotArea3D>
+  <cs:seriesAxis>
+    <cs:lnRef idx="0"/>
+    <cs:fillRef idx="0"/>
+    <cs:effectRef idx="0"/>
+    <cs:fontRef idx="minor">
+      <a:schemeClr val="tx1">
+        <a:lumMod val="50000"/>
+        <a:lumOff val="50000"/>
+      </a:schemeClr>
+    </cs:fontRef>
+    <cs:spPr>
+      <a:ln w="9525" cap="flat" cmpd="sng" algn="ctr">
+        <a:solidFill>
+          <a:schemeClr val="tx1">
+            <a:lumMod val="15000"/>
+            <a:lumOff val="85000"/>
+          </a:schemeClr>
+        </a:solidFill>
+        <a:round/>
+      </a:ln>
+    </cs:spPr>
+    <cs:defRPr sz="900" kern="1200"/>
+  </cs:seriesAxis>
+  <cs:seriesLine>
+    <cs:lnRef idx="0"/>
+    <cs:fillRef idx="0"/>
+    <cs:effectRef idx="0"/>
+    <cs:fontRef idx="minor">
+      <a:schemeClr val="dk1"/>
+    </cs:fontRef>
+    <cs:spPr>
+      <a:ln w="9525">
+        <a:solidFill>
+          <a:schemeClr val="tx1">
+            <a:lumMod val="35000"/>
+            <a:lumOff val="65000"/>
+          </a:schemeClr>
+        </a:solidFill>
+        <a:prstDash val="dash"/>
+      </a:ln>
+    </cs:spPr>
+  </cs:seriesLine>
+  <cs:title>
+    <cs:lnRef idx="0"/>
+    <cs:fillRef idx="0"/>
+    <cs:effectRef idx="0"/>
+    <cs:fontRef idx="minor">
+      <a:schemeClr val="tx1">
+        <a:lumMod val="50000"/>
+        <a:lumOff val="50000"/>
+      </a:schemeClr>
+    </cs:fontRef>
+    <cs:defRPr sz="1400" kern="1200" cap="none" spc="20" baseline="0"/>
+  </cs:title>
+  <cs:trendline>
+    <cs:lnRef idx="0">
+      <cs:styleClr val="auto"/>
+    </cs:lnRef>
+    <cs:fillRef idx="2"/>
+    <cs:effectRef idx="0"/>
+    <cs:fontRef idx="minor">
+      <a:schemeClr val="dk1"/>
+    </cs:fontRef>
+    <cs:spPr>
+      <a:ln w="9525" cap="rnd">
+        <a:solidFill>
+          <a:schemeClr val="phClr"/>
+        </a:solidFill>
+      </a:ln>
+    </cs:spPr>
+  </cs:trendline>
+  <cs:trendlineLabel>
+    <cs:lnRef idx="0"/>
+    <cs:fillRef idx="0"/>
+    <cs:effectRef idx="0"/>
+    <cs:fontRef idx="minor">
+      <a:schemeClr val="tx1">
+        <a:lumMod val="50000"/>
+        <a:lumOff val="50000"/>
+      </a:schemeClr>
+    </cs:fontRef>
+    <cs:defRPr sz="900" kern="1200"/>
+  </cs:trendlineLabel>
+  <cs:upBar>
+    <cs:lnRef idx="0"/>
+    <cs:fillRef idx="0"/>
+    <cs:effectRef idx="0"/>
+    <cs:fontRef idx="minor">
+      <a:schemeClr val="dk1"/>
+    </cs:fontRef>
+    <cs:spPr>
+      <a:solidFill>
+        <a:schemeClr val="lt1"/>
+      </a:solidFill>
+      <a:ln w="9525">
+        <a:solidFill>
+          <a:schemeClr val="tx1">
+            <a:lumMod val="50000"/>
+            <a:lumOff val="50000"/>
+          </a:schemeClr>
+        </a:solidFill>
+      </a:ln>
+    </cs:spPr>
+  </cs:upBar>
+  <cs:valueAxis>
+    <cs:lnRef idx="0"/>
+    <cs:fillRef idx="0"/>
+    <cs:effectRef idx="0"/>
+    <cs:fontRef idx="minor">
+      <a:schemeClr val="tx1">
+        <a:lumMod val="50000"/>
+        <a:lumOff val="50000"/>
+      </a:schemeClr>
+    </cs:fontRef>
+    <cs:defRPr sz="900" kern="1200"/>
+  </cs:valueAxis>
+  <cs:wall>
+    <cs:lnRef idx="0"/>
+    <cs:fillRef idx="0"/>
+    <cs:effectRef idx="0"/>
+    <cs:fontRef idx="minor">
+      <a:schemeClr val="dk1"/>
+    </cs:fontRef>
+  </cs:wall>
+</cs:chartStyle>
 </file>
 
 <file path=ppt/handoutMasters/handoutMaster1.xml><?xml version="1.0" encoding="utf-8"?>
@@ -219,7 +1401,7 @@
             <a:fld id="{DABACB24-01F3-44EF-B8FD-6CD37C5459D1}" type="datetimeFigureOut">
               <a:rPr lang="de-CH" smtClean="0"/>
               <a:pPr/>
-              <a:t>04.11.2016</a:t>
+              <a:t>06.11.2016</a:t>
             </a:fld>
             <a:endParaRPr lang="de-CH"/>
           </a:p>
@@ -295,7 +1477,7 @@
     </p:spTree>
     <p:extLst>
       <p:ext uri="{BB962C8B-B14F-4D97-AF65-F5344CB8AC3E}">
-        <p14:creationId xmlns:p14="http://schemas.microsoft.com/office/powerpoint/2010/main" xmlns="" val="2222135000"/>
+        <p14:creationId xmlns:p14="http://schemas.microsoft.com/office/powerpoint/2010/main" val="2222135000"/>
       </p:ext>
     </p:extLst>
   </p:cSld>
@@ -386,7 +1568,7 @@
             <a:fld id="{F9472E8F-40B5-4B0B-902F-B3E73EB16C6F}" type="datetimeFigureOut">
               <a:rPr lang="de-CH" smtClean="0"/>
               <a:pPr/>
-              <a:t>04.11.2016</a:t>
+              <a:t>06.11.2016</a:t>
             </a:fld>
             <a:endParaRPr lang="de-CH"/>
           </a:p>
@@ -450,35 +1632,35 @@
           <a:p>
             <a:pPr lvl="0"/>
             <a:r>
-              <a:rPr lang="en-US" smtClean="0"/>
+              <a:rPr lang="en-US"/>
               <a:t>Click to edit Master text styles</a:t>
             </a:r>
           </a:p>
           <a:p>
             <a:pPr lvl="1"/>
             <a:r>
-              <a:rPr lang="en-US" smtClean="0"/>
+              <a:rPr lang="en-US"/>
               <a:t>Second level</a:t>
             </a:r>
           </a:p>
           <a:p>
             <a:pPr lvl="2"/>
             <a:r>
-              <a:rPr lang="en-US" smtClean="0"/>
+              <a:rPr lang="en-US"/>
               <a:t>Third level</a:t>
             </a:r>
           </a:p>
           <a:p>
             <a:pPr lvl="3"/>
             <a:r>
-              <a:rPr lang="en-US" smtClean="0"/>
+              <a:rPr lang="en-US"/>
               <a:t>Fourth level</a:t>
             </a:r>
           </a:p>
           <a:p>
             <a:pPr lvl="4"/>
             <a:r>
-              <a:rPr lang="en-US" smtClean="0"/>
+              <a:rPr lang="en-US"/>
               <a:t>Fifth level</a:t>
             </a:r>
             <a:endParaRPr lang="de-CH"/>
@@ -555,7 +1737,7 @@
     </p:spTree>
     <p:extLst>
       <p:ext uri="{BB962C8B-B14F-4D97-AF65-F5344CB8AC3E}">
-        <p14:creationId xmlns:p14="http://schemas.microsoft.com/office/powerpoint/2010/main" xmlns="" val="164638833"/>
+        <p14:creationId xmlns:p14="http://schemas.microsoft.com/office/powerpoint/2010/main" val="164638833"/>
       </p:ext>
     </p:extLst>
   </p:cSld>
@@ -697,7 +1879,7 @@
           </a:lstStyle>
           <a:p>
             <a:r>
-              <a:rPr lang="en-US" smtClean="0"/>
+              <a:rPr lang="en-US"/>
               <a:t>Click to edit Master title style</a:t>
             </a:r>
             <a:endParaRPr lang="en-US" dirty="0"/>
@@ -762,7 +1944,7 @@
           </a:lstStyle>
           <a:p>
             <a:r>
-              <a:rPr lang="en-US" smtClean="0"/>
+              <a:rPr lang="en-US"/>
               <a:t>Click to edit Master subtitle style</a:t>
             </a:r>
             <a:endParaRPr lang="en-US" dirty="0"/>
@@ -787,7 +1969,7 @@
             <a:fld id="{021BCA1A-8260-4C99-B39A-B43CAA439B87}" type="datetimeFigureOut">
               <a:rPr lang="de-CH" smtClean="0"/>
               <a:pPr/>
-              <a:t>04.11.2016</a:t>
+              <a:t>06.11.2016</a:t>
             </a:fld>
             <a:endParaRPr lang="de-CH"/>
           </a:p>
@@ -839,20 +2021,13 @@
     </p:spTree>
     <p:extLst>
       <p:ext uri="{BB962C8B-B14F-4D97-AF65-F5344CB8AC3E}">
-        <p14:creationId xmlns:p14="http://schemas.microsoft.com/office/powerpoint/2010/main" xmlns="" val="1200742964"/>
+        <p14:creationId xmlns:p14="http://schemas.microsoft.com/office/powerpoint/2010/main" val="1200742964"/>
       </p:ext>
     </p:extLst>
   </p:cSld>
   <p:clrMapOvr>
     <a:masterClrMapping/>
   </p:clrMapOvr>
-  <p:timing>
-    <p:tnLst>
-      <p:par>
-        <p:cTn id="1" dur="indefinite" restart="never" nodeType="tmRoot"/>
-      </p:par>
-    </p:tnLst>
-  </p:timing>
 </p:sldLayout>
 </file>
 
@@ -889,7 +2064,7 @@
           <a:lstStyle/>
           <a:p>
             <a:r>
-              <a:rPr lang="en-US" smtClean="0"/>
+              <a:rPr lang="en-US"/>
               <a:t>Click to edit Master title style</a:t>
             </a:r>
             <a:endParaRPr lang="en-US" dirty="0"/>
@@ -913,35 +2088,35 @@
           <a:p>
             <a:pPr lvl="0"/>
             <a:r>
-              <a:rPr lang="en-US" smtClean="0"/>
+              <a:rPr lang="en-US"/>
               <a:t>Click to edit Master text styles</a:t>
             </a:r>
           </a:p>
           <a:p>
             <a:pPr lvl="1"/>
             <a:r>
-              <a:rPr lang="en-US" smtClean="0"/>
+              <a:rPr lang="en-US"/>
               <a:t>Second level</a:t>
             </a:r>
           </a:p>
           <a:p>
             <a:pPr lvl="2"/>
             <a:r>
-              <a:rPr lang="en-US" smtClean="0"/>
+              <a:rPr lang="en-US"/>
               <a:t>Third level</a:t>
             </a:r>
           </a:p>
           <a:p>
             <a:pPr lvl="3"/>
             <a:r>
-              <a:rPr lang="en-US" smtClean="0"/>
+              <a:rPr lang="en-US"/>
               <a:t>Fourth level</a:t>
             </a:r>
           </a:p>
           <a:p>
             <a:pPr lvl="4"/>
             <a:r>
-              <a:rPr lang="en-US" smtClean="0"/>
+              <a:rPr lang="en-US"/>
               <a:t>Fifth level</a:t>
             </a:r>
             <a:endParaRPr lang="en-US" dirty="0"/>
@@ -966,7 +2141,7 @@
             <a:fld id="{021BCA1A-8260-4C99-B39A-B43CAA439B87}" type="datetimeFigureOut">
               <a:rPr lang="de-CH" smtClean="0"/>
               <a:pPr/>
-              <a:t>04.11.2016</a:t>
+              <a:t>06.11.2016</a:t>
             </a:fld>
             <a:endParaRPr lang="de-CH"/>
           </a:p>
@@ -1018,7 +2193,7 @@
     </p:spTree>
     <p:extLst>
       <p:ext uri="{BB962C8B-B14F-4D97-AF65-F5344CB8AC3E}">
-        <p14:creationId xmlns:p14="http://schemas.microsoft.com/office/powerpoint/2010/main" xmlns="" val="3743155127"/>
+        <p14:creationId xmlns:p14="http://schemas.microsoft.com/office/powerpoint/2010/main" val="3743155127"/>
       </p:ext>
     </p:extLst>
   </p:cSld>
@@ -1066,7 +2241,7 @@
           <a:lstStyle/>
           <a:p>
             <a:r>
-              <a:rPr lang="en-US" smtClean="0"/>
+              <a:rPr lang="en-US"/>
               <a:t>Click to edit Master title style</a:t>
             </a:r>
             <a:endParaRPr lang="en-US" dirty="0"/>
@@ -1095,35 +2270,35 @@
           <a:p>
             <a:pPr lvl="0"/>
             <a:r>
-              <a:rPr lang="en-US" smtClean="0"/>
+              <a:rPr lang="en-US"/>
               <a:t>Click to edit Master text styles</a:t>
             </a:r>
           </a:p>
           <a:p>
             <a:pPr lvl="1"/>
             <a:r>
-              <a:rPr lang="en-US" smtClean="0"/>
+              <a:rPr lang="en-US"/>
               <a:t>Second level</a:t>
             </a:r>
           </a:p>
           <a:p>
             <a:pPr lvl="2"/>
             <a:r>
-              <a:rPr lang="en-US" smtClean="0"/>
+              <a:rPr lang="en-US"/>
               <a:t>Third level</a:t>
             </a:r>
           </a:p>
           <a:p>
             <a:pPr lvl="3"/>
             <a:r>
-              <a:rPr lang="en-US" smtClean="0"/>
+              <a:rPr lang="en-US"/>
               <a:t>Fourth level</a:t>
             </a:r>
           </a:p>
           <a:p>
             <a:pPr lvl="4"/>
             <a:r>
-              <a:rPr lang="en-US" smtClean="0"/>
+              <a:rPr lang="en-US"/>
               <a:t>Fifth level</a:t>
             </a:r>
             <a:endParaRPr lang="en-US" dirty="0"/>
@@ -1148,7 +2323,7 @@
             <a:fld id="{021BCA1A-8260-4C99-B39A-B43CAA439B87}" type="datetimeFigureOut">
               <a:rPr lang="de-CH" smtClean="0"/>
               <a:pPr/>
-              <a:t>04.11.2016</a:t>
+              <a:t>06.11.2016</a:t>
             </a:fld>
             <a:endParaRPr lang="de-CH"/>
           </a:p>
@@ -1200,7 +2375,7 @@
     </p:spTree>
     <p:extLst>
       <p:ext uri="{BB962C8B-B14F-4D97-AF65-F5344CB8AC3E}">
-        <p14:creationId xmlns:p14="http://schemas.microsoft.com/office/powerpoint/2010/main" xmlns="" val="2158136055"/>
+        <p14:creationId xmlns:p14="http://schemas.microsoft.com/office/powerpoint/2010/main" val="2158136055"/>
       </p:ext>
     </p:extLst>
   </p:cSld>
@@ -1243,7 +2418,7 @@
           <a:lstStyle/>
           <a:p>
             <a:r>
-              <a:rPr lang="en-US" smtClean="0"/>
+              <a:rPr lang="en-US"/>
               <a:t>Click to edit Master title style</a:t>
             </a:r>
             <a:endParaRPr lang="en-US" dirty="0"/>
@@ -1271,38 +2446,37 @@
           <a:p>
             <a:pPr lvl="0"/>
             <a:r>
-              <a:rPr lang="en-US" dirty="0" smtClean="0"/>
+              <a:rPr lang="en-US" dirty="0"/>
               <a:t>Click to edit Master text styles</a:t>
             </a:r>
           </a:p>
           <a:p>
             <a:pPr lvl="1"/>
             <a:r>
-              <a:rPr lang="en-US" dirty="0" smtClean="0"/>
+              <a:rPr lang="en-US" dirty="0"/>
               <a:t>Second level</a:t>
             </a:r>
           </a:p>
           <a:p>
             <a:pPr lvl="2"/>
             <a:r>
-              <a:rPr lang="en-US" dirty="0" smtClean="0"/>
+              <a:rPr lang="en-US" dirty="0"/>
               <a:t>Third level</a:t>
             </a:r>
           </a:p>
           <a:p>
             <a:pPr lvl="3"/>
             <a:r>
-              <a:rPr lang="en-US" dirty="0" smtClean="0"/>
+              <a:rPr lang="en-US" dirty="0"/>
               <a:t>Fourth level</a:t>
             </a:r>
           </a:p>
           <a:p>
             <a:pPr lvl="4"/>
             <a:r>
-              <a:rPr lang="en-US" dirty="0" smtClean="0"/>
+              <a:rPr lang="en-US" dirty="0"/>
               <a:t>Fifth level</a:t>
             </a:r>
-            <a:endParaRPr lang="en-US" dirty="0"/>
           </a:p>
         </p:txBody>
       </p:sp>
@@ -1324,7 +2498,7 @@
             <a:fld id="{021BCA1A-8260-4C99-B39A-B43CAA439B87}" type="datetimeFigureOut">
               <a:rPr lang="de-CH" smtClean="0"/>
               <a:pPr/>
-              <a:t>04.11.2016</a:t>
+              <a:t>06.11.2016</a:t>
             </a:fld>
             <a:endParaRPr lang="de-CH"/>
           </a:p>
@@ -1376,20 +2550,13 @@
     </p:spTree>
     <p:extLst>
       <p:ext uri="{BB962C8B-B14F-4D97-AF65-F5344CB8AC3E}">
-        <p14:creationId xmlns:p14="http://schemas.microsoft.com/office/powerpoint/2010/main" xmlns="" val="3707560489"/>
+        <p14:creationId xmlns:p14="http://schemas.microsoft.com/office/powerpoint/2010/main" val="3707560489"/>
       </p:ext>
     </p:extLst>
   </p:cSld>
   <p:clrMapOvr>
     <a:masterClrMapping/>
   </p:clrMapOvr>
-  <p:timing>
-    <p:tnLst>
-      <p:par>
-        <p:cTn id="1" dur="indefinite" restart="never" nodeType="tmRoot"/>
-      </p:par>
-    </p:tnLst>
-  </p:timing>
 </p:sldLayout>
 </file>
 
@@ -1435,7 +2602,7 @@
           </a:lstStyle>
           <a:p>
             <a:r>
-              <a:rPr lang="en-US" smtClean="0"/>
+              <a:rPr lang="en-US"/>
               <a:t>Click to edit Master title style</a:t>
             </a:r>
             <a:endParaRPr lang="en-US" dirty="0"/>
@@ -1553,7 +2720,7 @@
           <a:p>
             <a:pPr lvl="0"/>
             <a:r>
-              <a:rPr lang="en-US" smtClean="0"/>
+              <a:rPr lang="en-US"/>
               <a:t>Click to edit Master text styles</a:t>
             </a:r>
           </a:p>
@@ -1577,7 +2744,7 @@
             <a:fld id="{021BCA1A-8260-4C99-B39A-B43CAA439B87}" type="datetimeFigureOut">
               <a:rPr lang="de-CH" smtClean="0"/>
               <a:pPr/>
-              <a:t>04.11.2016</a:t>
+              <a:t>06.11.2016</a:t>
             </a:fld>
             <a:endParaRPr lang="de-CH"/>
           </a:p>
@@ -1629,20 +2796,13 @@
     </p:spTree>
     <p:extLst>
       <p:ext uri="{BB962C8B-B14F-4D97-AF65-F5344CB8AC3E}">
-        <p14:creationId xmlns:p14="http://schemas.microsoft.com/office/powerpoint/2010/main" xmlns="" val="723124208"/>
+        <p14:creationId xmlns:p14="http://schemas.microsoft.com/office/powerpoint/2010/main" val="723124208"/>
       </p:ext>
     </p:extLst>
   </p:cSld>
   <p:clrMapOvr>
     <a:masterClrMapping/>
   </p:clrMapOvr>
-  <p:timing>
-    <p:tnLst>
-      <p:par>
-        <p:cTn id="1" dur="indefinite" restart="never" nodeType="tmRoot"/>
-      </p:par>
-    </p:tnLst>
-  </p:timing>
 </p:sldLayout>
 </file>
 
@@ -1679,7 +2839,7 @@
           <a:lstStyle/>
           <a:p>
             <a:r>
-              <a:rPr lang="en-US" smtClean="0"/>
+              <a:rPr lang="en-US"/>
               <a:t>Click to edit Master title style</a:t>
             </a:r>
             <a:endParaRPr lang="en-US" dirty="0"/>
@@ -1708,35 +2868,35 @@
           <a:p>
             <a:pPr lvl="0"/>
             <a:r>
-              <a:rPr lang="en-US" smtClean="0"/>
+              <a:rPr lang="en-US"/>
               <a:t>Click to edit Master text styles</a:t>
             </a:r>
           </a:p>
           <a:p>
             <a:pPr lvl="1"/>
             <a:r>
-              <a:rPr lang="en-US" smtClean="0"/>
+              <a:rPr lang="en-US"/>
               <a:t>Second level</a:t>
             </a:r>
           </a:p>
           <a:p>
             <a:pPr lvl="2"/>
             <a:r>
-              <a:rPr lang="en-US" smtClean="0"/>
+              <a:rPr lang="en-US"/>
               <a:t>Third level</a:t>
             </a:r>
           </a:p>
           <a:p>
             <a:pPr lvl="3"/>
             <a:r>
-              <a:rPr lang="en-US" smtClean="0"/>
+              <a:rPr lang="en-US"/>
               <a:t>Fourth level</a:t>
             </a:r>
           </a:p>
           <a:p>
             <a:pPr lvl="4"/>
             <a:r>
-              <a:rPr lang="en-US" smtClean="0"/>
+              <a:rPr lang="en-US"/>
               <a:t>Fifth level</a:t>
             </a:r>
             <a:endParaRPr lang="en-US" dirty="0"/>
@@ -1765,35 +2925,35 @@
           <a:p>
             <a:pPr lvl="0"/>
             <a:r>
-              <a:rPr lang="en-US" smtClean="0"/>
+              <a:rPr lang="en-US"/>
               <a:t>Click to edit Master text styles</a:t>
             </a:r>
           </a:p>
           <a:p>
             <a:pPr lvl="1"/>
             <a:r>
-              <a:rPr lang="en-US" smtClean="0"/>
+              <a:rPr lang="en-US"/>
               <a:t>Second level</a:t>
             </a:r>
           </a:p>
           <a:p>
             <a:pPr lvl="2"/>
             <a:r>
-              <a:rPr lang="en-US" smtClean="0"/>
+              <a:rPr lang="en-US"/>
               <a:t>Third level</a:t>
             </a:r>
           </a:p>
           <a:p>
             <a:pPr lvl="3"/>
             <a:r>
-              <a:rPr lang="en-US" smtClean="0"/>
+              <a:rPr lang="en-US"/>
               <a:t>Fourth level</a:t>
             </a:r>
           </a:p>
           <a:p>
             <a:pPr lvl="4"/>
             <a:r>
-              <a:rPr lang="en-US" smtClean="0"/>
+              <a:rPr lang="en-US"/>
               <a:t>Fifth level</a:t>
             </a:r>
             <a:endParaRPr lang="en-US" dirty="0"/>
@@ -1818,7 +2978,7 @@
             <a:fld id="{021BCA1A-8260-4C99-B39A-B43CAA439B87}" type="datetimeFigureOut">
               <a:rPr lang="de-CH" smtClean="0"/>
               <a:pPr/>
-              <a:t>04.11.2016</a:t>
+              <a:t>06.11.2016</a:t>
             </a:fld>
             <a:endParaRPr lang="de-CH"/>
           </a:p>
@@ -1870,20 +3030,13 @@
     </p:spTree>
     <p:extLst>
       <p:ext uri="{BB962C8B-B14F-4D97-AF65-F5344CB8AC3E}">
-        <p14:creationId xmlns:p14="http://schemas.microsoft.com/office/powerpoint/2010/main" xmlns="" val="160160226"/>
+        <p14:creationId xmlns:p14="http://schemas.microsoft.com/office/powerpoint/2010/main" val="160160226"/>
       </p:ext>
     </p:extLst>
   </p:cSld>
   <p:clrMapOvr>
     <a:masterClrMapping/>
   </p:clrMapOvr>
-  <p:timing>
-    <p:tnLst>
-      <p:par>
-        <p:cTn id="1" dur="indefinite" restart="never" nodeType="tmRoot"/>
-      </p:par>
-    </p:tnLst>
-  </p:timing>
 </p:sldLayout>
 </file>
 
@@ -1925,7 +3078,7 @@
           <a:lstStyle/>
           <a:p>
             <a:r>
-              <a:rPr lang="en-US" smtClean="0"/>
+              <a:rPr lang="en-US"/>
               <a:t>Click to edit Master title style</a:t>
             </a:r>
             <a:endParaRPr lang="en-US" dirty="0"/>
@@ -1991,7 +3144,7 @@
           <a:p>
             <a:pPr lvl="0"/>
             <a:r>
-              <a:rPr lang="en-US" smtClean="0"/>
+              <a:rPr lang="en-US"/>
               <a:t>Click to edit Master text styles</a:t>
             </a:r>
           </a:p>
@@ -2019,35 +3172,35 @@
           <a:p>
             <a:pPr lvl="0"/>
             <a:r>
-              <a:rPr lang="en-US" smtClean="0"/>
+              <a:rPr lang="en-US"/>
               <a:t>Click to edit Master text styles</a:t>
             </a:r>
           </a:p>
           <a:p>
             <a:pPr lvl="1"/>
             <a:r>
-              <a:rPr lang="en-US" smtClean="0"/>
+              <a:rPr lang="en-US"/>
               <a:t>Second level</a:t>
             </a:r>
           </a:p>
           <a:p>
             <a:pPr lvl="2"/>
             <a:r>
-              <a:rPr lang="en-US" smtClean="0"/>
+              <a:rPr lang="en-US"/>
               <a:t>Third level</a:t>
             </a:r>
           </a:p>
           <a:p>
             <a:pPr lvl="3"/>
             <a:r>
-              <a:rPr lang="en-US" smtClean="0"/>
+              <a:rPr lang="en-US"/>
               <a:t>Fourth level</a:t>
             </a:r>
           </a:p>
           <a:p>
             <a:pPr lvl="4"/>
             <a:r>
-              <a:rPr lang="en-US" smtClean="0"/>
+              <a:rPr lang="en-US"/>
               <a:t>Fifth level</a:t>
             </a:r>
             <a:endParaRPr lang="en-US" dirty="0"/>
@@ -2113,7 +3266,7 @@
           <a:p>
             <a:pPr lvl="0"/>
             <a:r>
-              <a:rPr lang="en-US" smtClean="0"/>
+              <a:rPr lang="en-US"/>
               <a:t>Click to edit Master text styles</a:t>
             </a:r>
           </a:p>
@@ -2141,35 +3294,35 @@
           <a:p>
             <a:pPr lvl="0"/>
             <a:r>
-              <a:rPr lang="en-US" smtClean="0"/>
+              <a:rPr lang="en-US"/>
               <a:t>Click to edit Master text styles</a:t>
             </a:r>
           </a:p>
           <a:p>
             <a:pPr lvl="1"/>
             <a:r>
-              <a:rPr lang="en-US" smtClean="0"/>
+              <a:rPr lang="en-US"/>
               <a:t>Second level</a:t>
             </a:r>
           </a:p>
           <a:p>
             <a:pPr lvl="2"/>
             <a:r>
-              <a:rPr lang="en-US" smtClean="0"/>
+              <a:rPr lang="en-US"/>
               <a:t>Third level</a:t>
             </a:r>
           </a:p>
           <a:p>
             <a:pPr lvl="3"/>
             <a:r>
-              <a:rPr lang="en-US" smtClean="0"/>
+              <a:rPr lang="en-US"/>
               <a:t>Fourth level</a:t>
             </a:r>
           </a:p>
           <a:p>
             <a:pPr lvl="4"/>
             <a:r>
-              <a:rPr lang="en-US" smtClean="0"/>
+              <a:rPr lang="en-US"/>
               <a:t>Fifth level</a:t>
             </a:r>
             <a:endParaRPr lang="en-US" dirty="0"/>
@@ -2194,7 +3347,7 @@
             <a:fld id="{021BCA1A-8260-4C99-B39A-B43CAA439B87}" type="datetimeFigureOut">
               <a:rPr lang="de-CH" smtClean="0"/>
               <a:pPr/>
-              <a:t>04.11.2016</a:t>
+              <a:t>06.11.2016</a:t>
             </a:fld>
             <a:endParaRPr lang="de-CH"/>
           </a:p>
@@ -2246,7 +3399,7 @@
     </p:spTree>
     <p:extLst>
       <p:ext uri="{BB962C8B-B14F-4D97-AF65-F5344CB8AC3E}">
-        <p14:creationId xmlns:p14="http://schemas.microsoft.com/office/powerpoint/2010/main" xmlns="" val="2791204625"/>
+        <p14:creationId xmlns:p14="http://schemas.microsoft.com/office/powerpoint/2010/main" val="2791204625"/>
       </p:ext>
     </p:extLst>
   </p:cSld>
@@ -2289,7 +3442,7 @@
           <a:lstStyle/>
           <a:p>
             <a:r>
-              <a:rPr lang="en-US" smtClean="0"/>
+              <a:rPr lang="en-US"/>
               <a:t>Click to edit Master title style</a:t>
             </a:r>
             <a:endParaRPr lang="en-US" dirty="0"/>
@@ -2314,7 +3467,7 @@
             <a:fld id="{021BCA1A-8260-4C99-B39A-B43CAA439B87}" type="datetimeFigureOut">
               <a:rPr lang="de-CH" smtClean="0"/>
               <a:pPr/>
-              <a:t>04.11.2016</a:t>
+              <a:t>06.11.2016</a:t>
             </a:fld>
             <a:endParaRPr lang="de-CH"/>
           </a:p>
@@ -2366,7 +3519,7 @@
     </p:spTree>
     <p:extLst>
       <p:ext uri="{BB962C8B-B14F-4D97-AF65-F5344CB8AC3E}">
-        <p14:creationId xmlns:p14="http://schemas.microsoft.com/office/powerpoint/2010/main" xmlns="" val="1814524109"/>
+        <p14:creationId xmlns:p14="http://schemas.microsoft.com/office/powerpoint/2010/main" val="1814524109"/>
       </p:ext>
     </p:extLst>
   </p:cSld>
@@ -2411,7 +3564,7 @@
             <a:fld id="{021BCA1A-8260-4C99-B39A-B43CAA439B87}" type="datetimeFigureOut">
               <a:rPr lang="de-CH" smtClean="0"/>
               <a:pPr/>
-              <a:t>04.11.2016</a:t>
+              <a:t>06.11.2016</a:t>
             </a:fld>
             <a:endParaRPr lang="de-CH"/>
           </a:p>
@@ -2463,7 +3616,7 @@
     </p:spTree>
     <p:extLst>
       <p:ext uri="{BB962C8B-B14F-4D97-AF65-F5344CB8AC3E}">
-        <p14:creationId xmlns:p14="http://schemas.microsoft.com/office/powerpoint/2010/main" xmlns="" val="4175484287"/>
+        <p14:creationId xmlns:p14="http://schemas.microsoft.com/office/powerpoint/2010/main" val="4175484287"/>
       </p:ext>
     </p:extLst>
   </p:cSld>
@@ -2515,7 +3668,7 @@
           </a:lstStyle>
           <a:p>
             <a:r>
-              <a:rPr lang="en-US" smtClean="0"/>
+              <a:rPr lang="en-US"/>
               <a:t>Click to edit Master title style</a:t>
             </a:r>
             <a:endParaRPr lang="en-US" dirty="0"/>
@@ -2572,35 +3725,35 @@
           <a:p>
             <a:pPr lvl="0"/>
             <a:r>
-              <a:rPr lang="en-US" smtClean="0"/>
+              <a:rPr lang="en-US"/>
               <a:t>Click to edit Master text styles</a:t>
             </a:r>
           </a:p>
           <a:p>
             <a:pPr lvl="1"/>
             <a:r>
-              <a:rPr lang="en-US" smtClean="0"/>
+              <a:rPr lang="en-US"/>
               <a:t>Second level</a:t>
             </a:r>
           </a:p>
           <a:p>
             <a:pPr lvl="2"/>
             <a:r>
-              <a:rPr lang="en-US" smtClean="0"/>
+              <a:rPr lang="en-US"/>
               <a:t>Third level</a:t>
             </a:r>
           </a:p>
           <a:p>
             <a:pPr lvl="3"/>
             <a:r>
-              <a:rPr lang="en-US" smtClean="0"/>
+              <a:rPr lang="en-US"/>
               <a:t>Fourth level</a:t>
             </a:r>
           </a:p>
           <a:p>
             <a:pPr lvl="4"/>
             <a:r>
-              <a:rPr lang="en-US" smtClean="0"/>
+              <a:rPr lang="en-US"/>
               <a:t>Fifth level</a:t>
             </a:r>
             <a:endParaRPr lang="en-US" dirty="0"/>
@@ -2666,7 +3819,7 @@
           <a:p>
             <a:pPr lvl="0"/>
             <a:r>
-              <a:rPr lang="en-US" smtClean="0"/>
+              <a:rPr lang="en-US"/>
               <a:t>Click to edit Master text styles</a:t>
             </a:r>
           </a:p>
@@ -2690,7 +3843,7 @@
             <a:fld id="{021BCA1A-8260-4C99-B39A-B43CAA439B87}" type="datetimeFigureOut">
               <a:rPr lang="de-CH" smtClean="0"/>
               <a:pPr/>
-              <a:t>04.11.2016</a:t>
+              <a:t>06.11.2016</a:t>
             </a:fld>
             <a:endParaRPr lang="de-CH"/>
           </a:p>
@@ -2742,7 +3895,7 @@
     </p:spTree>
     <p:extLst>
       <p:ext uri="{BB962C8B-B14F-4D97-AF65-F5344CB8AC3E}">
-        <p14:creationId xmlns:p14="http://schemas.microsoft.com/office/powerpoint/2010/main" xmlns="" val="618611160"/>
+        <p14:creationId xmlns:p14="http://schemas.microsoft.com/office/powerpoint/2010/main" val="618611160"/>
       </p:ext>
     </p:extLst>
   </p:cSld>
@@ -2794,7 +3947,7 @@
           </a:lstStyle>
           <a:p>
             <a:r>
-              <a:rPr lang="en-US" smtClean="0"/>
+              <a:rPr lang="en-US"/>
               <a:t>Click to edit Master title style</a:t>
             </a:r>
             <a:endParaRPr lang="en-US" dirty="0"/>
@@ -2859,7 +4012,7 @@
           </a:lstStyle>
           <a:p>
             <a:r>
-              <a:rPr lang="en-US" smtClean="0"/>
+              <a:rPr lang="en-US"/>
               <a:t>Click icon to add picture</a:t>
             </a:r>
             <a:endParaRPr lang="en-US" dirty="0"/>
@@ -2925,7 +4078,7 @@
           <a:p>
             <a:pPr lvl="0"/>
             <a:r>
-              <a:rPr lang="en-US" smtClean="0"/>
+              <a:rPr lang="en-US"/>
               <a:t>Click to edit Master text styles</a:t>
             </a:r>
           </a:p>
@@ -2949,7 +4102,7 @@
             <a:fld id="{021BCA1A-8260-4C99-B39A-B43CAA439B87}" type="datetimeFigureOut">
               <a:rPr lang="de-CH" smtClean="0"/>
               <a:pPr/>
-              <a:t>04.11.2016</a:t>
+              <a:t>06.11.2016</a:t>
             </a:fld>
             <a:endParaRPr lang="de-CH"/>
           </a:p>
@@ -3001,7 +4154,7 @@
     </p:spTree>
     <p:extLst>
       <p:ext uri="{BB962C8B-B14F-4D97-AF65-F5344CB8AC3E}">
-        <p14:creationId xmlns:p14="http://schemas.microsoft.com/office/powerpoint/2010/main" xmlns="" val="4124404572"/>
+        <p14:creationId xmlns:p14="http://schemas.microsoft.com/office/powerpoint/2010/main" val="4124404572"/>
       </p:ext>
     </p:extLst>
   </p:cSld>
@@ -3059,7 +4212,7 @@
           <a:lstStyle/>
           <a:p>
             <a:r>
-              <a:rPr lang="en-US" smtClean="0"/>
+              <a:rPr lang="en-US"/>
               <a:t>Click to edit Master title style</a:t>
             </a:r>
             <a:endParaRPr lang="en-US" dirty="0"/>
@@ -3093,38 +4246,37 @@
           <a:p>
             <a:pPr lvl="0"/>
             <a:r>
-              <a:rPr lang="en-US" dirty="0" smtClean="0"/>
+              <a:rPr lang="en-US" dirty="0"/>
               <a:t>Click to edit Master text styles</a:t>
             </a:r>
           </a:p>
           <a:p>
             <a:pPr lvl="1"/>
             <a:r>
-              <a:rPr lang="en-US" dirty="0" smtClean="0"/>
+              <a:rPr lang="en-US" dirty="0"/>
               <a:t>Second level</a:t>
             </a:r>
           </a:p>
           <a:p>
             <a:pPr lvl="2"/>
             <a:r>
-              <a:rPr lang="en-US" dirty="0" smtClean="0"/>
+              <a:rPr lang="en-US" dirty="0"/>
               <a:t>Third level</a:t>
             </a:r>
           </a:p>
           <a:p>
             <a:pPr lvl="3"/>
             <a:r>
-              <a:rPr lang="en-US" dirty="0" smtClean="0"/>
+              <a:rPr lang="en-US" dirty="0"/>
               <a:t>Fourth level</a:t>
             </a:r>
           </a:p>
           <a:p>
             <a:pPr lvl="4"/>
             <a:r>
-              <a:rPr lang="en-US" dirty="0" smtClean="0"/>
+              <a:rPr lang="en-US" dirty="0"/>
               <a:t>Fifth level</a:t>
             </a:r>
-            <a:endParaRPr lang="en-US" dirty="0"/>
           </a:p>
         </p:txBody>
       </p:sp>
@@ -3164,7 +4316,7 @@
             <a:fld id="{021BCA1A-8260-4C99-B39A-B43CAA439B87}" type="datetimeFigureOut">
               <a:rPr lang="de-CH" smtClean="0"/>
               <a:pPr/>
-              <a:t>04.11.2016</a:t>
+              <a:t>06.11.2016</a:t>
             </a:fld>
             <a:endParaRPr lang="de-CH"/>
           </a:p>
@@ -3252,7 +4404,7 @@
     </p:spTree>
     <p:extLst>
       <p:ext uri="{BB962C8B-B14F-4D97-AF65-F5344CB8AC3E}">
-        <p14:creationId xmlns:p14="http://schemas.microsoft.com/office/powerpoint/2010/main" xmlns="" val="2834213015"/>
+        <p14:creationId xmlns:p14="http://schemas.microsoft.com/office/powerpoint/2010/main" val="2834213015"/>
       </p:ext>
     </p:extLst>
   </p:cSld>
@@ -3270,13 +4422,6 @@
     <p:sldLayoutId id="2147483670" r:id="rId10"/>
     <p:sldLayoutId id="2147483671" r:id="rId11"/>
   </p:sldLayoutIdLst>
-  <p:timing>
-    <p:tnLst>
-      <p:par>
-        <p:cTn id="1" dur="indefinite" restart="never" nodeType="tmRoot"/>
-      </p:par>
-    </p:tnLst>
-  </p:timing>
   <p:hf hdr="0" ftr="0" dt="0"/>
   <p:txStyles>
     <p:titleStyle>
@@ -3602,12 +4747,8 @@
           <a:p>
             <a:pPr algn="l"/>
             <a:r>
-              <a:rPr lang="en-US" sz="4050" dirty="0" smtClean="0"/>
-              <a:t>Maximum </a:t>
-            </a:r>
-            <a:r>
               <a:rPr lang="en-US" sz="4050" dirty="0"/>
-              <a:t>Cardinality Matching</a:t>
+              <a:t>Maximum Cardinality Matching</a:t>
             </a:r>
             <a:endParaRPr lang="de-CH" sz="4050" dirty="0"/>
           </a:p>
@@ -3637,7 +4778,7 @@
           <a:p>
             <a:pPr algn="l"/>
             <a:r>
-              <a:rPr lang="en-US" sz="2000" i="1" dirty="0" smtClean="0"/>
+              <a:rPr lang="en-US" sz="2000" i="1" dirty="0"/>
               <a:t>Progress Report, 7.11.2016</a:t>
             </a:r>
             <a:endParaRPr lang="de-CH" sz="2000" i="1" dirty="0"/>
@@ -3832,7 +4973,7 @@
           <a:p>
             <a:pPr algn="l"/>
             <a:r>
-              <a:rPr lang="en-US" sz="1350" dirty="0" smtClean="0"/>
+              <a:rPr lang="en-US" sz="1350" dirty="0"/>
               <a:t>Isa </a:t>
             </a:r>
             <a:r>
@@ -3878,20 +5019,13 @@
     </p:spTree>
     <p:extLst>
       <p:ext uri="{BB962C8B-B14F-4D97-AF65-F5344CB8AC3E}">
-        <p14:creationId xmlns:p14="http://schemas.microsoft.com/office/powerpoint/2010/main" xmlns="" val="678100568"/>
+        <p14:creationId xmlns:p14="http://schemas.microsoft.com/office/powerpoint/2010/main" val="678100568"/>
       </p:ext>
     </p:extLst>
   </p:cSld>
   <p:clrMapOvr>
     <a:masterClrMapping/>
   </p:clrMapOvr>
-  <p:timing>
-    <p:tnLst>
-      <p:par>
-        <p:cTn id="1" dur="indefinite" restart="never" nodeType="tmRoot"/>
-      </p:par>
-    </p:tnLst>
-  </p:timing>
 </p:sld>
 </file>
 
@@ -3928,7 +5062,7 @@
           <a:lstStyle/>
           <a:p>
             <a:r>
-              <a:rPr lang="en-US" dirty="0" smtClean="0"/>
+              <a:rPr lang="en-US" dirty="0"/>
               <a:t>Maximum Cardinality Matching</a:t>
             </a:r>
             <a:endParaRPr lang="de-CH" dirty="0"/>
@@ -3971,7 +5105,7 @@
           <a:blip r:embed="rId2" cstate="print">
             <a:extLst>
               <a:ext uri="{28A0092B-C50C-407E-A947-70E740481C1C}">
-                <a14:useLocalDpi xmlns:a14="http://schemas.microsoft.com/office/drawing/2010/main" xmlns="" val="0"/>
+                <a14:useLocalDpi xmlns:a14="http://schemas.microsoft.com/office/drawing/2010/main" val="0"/>
               </a:ext>
             </a:extLst>
           </a:blip>
@@ -3991,7 +5125,7 @@
           <a:noFill/>
           <a:extLst>
             <a:ext uri="{909E8E84-426E-40DD-AFC4-6F175D3DCCD1}">
-              <a14:hiddenFill xmlns:a14="http://schemas.microsoft.com/office/drawing/2010/main" xmlns="">
+              <a14:hiddenFill xmlns:a14="http://schemas.microsoft.com/office/drawing/2010/main">
                 <a:solidFill>
                   <a:srgbClr val="FFFFFF"/>
                 </a:solidFill>
@@ -4012,7 +5146,7 @@
           <a:blip r:embed="rId3" cstate="print">
             <a:extLst>
               <a:ext uri="{28A0092B-C50C-407E-A947-70E740481C1C}">
-                <a14:useLocalDpi xmlns:a14="http://schemas.microsoft.com/office/drawing/2010/main" xmlns="" val="0"/>
+                <a14:useLocalDpi xmlns:a14="http://schemas.microsoft.com/office/drawing/2010/main" val="0"/>
               </a:ext>
             </a:extLst>
           </a:blip>
@@ -4032,7 +5166,7 @@
           <a:noFill/>
           <a:extLst>
             <a:ext uri="{909E8E84-426E-40DD-AFC4-6F175D3DCCD1}">
-              <a14:hiddenFill xmlns:a14="http://schemas.microsoft.com/office/drawing/2010/main" xmlns="">
+              <a14:hiddenFill xmlns:a14="http://schemas.microsoft.com/office/drawing/2010/main">
                 <a:solidFill>
                   <a:srgbClr val="FFFFFF"/>
                 </a:solidFill>
@@ -4148,20 +5282,13 @@
     </p:spTree>
     <p:extLst>
       <p:ext uri="{BB962C8B-B14F-4D97-AF65-F5344CB8AC3E}">
-        <p14:creationId xmlns:p14="http://schemas.microsoft.com/office/powerpoint/2010/main" xmlns="" val="289482299"/>
+        <p14:creationId xmlns:p14="http://schemas.microsoft.com/office/powerpoint/2010/main" val="289482299"/>
       </p:ext>
     </p:extLst>
   </p:cSld>
   <p:clrMapOvr>
     <a:masterClrMapping/>
   </p:clrMapOvr>
-  <p:timing>
-    <p:tnLst>
-      <p:par>
-        <p:cTn id="1" dur="indefinite" restart="never" nodeType="tmRoot"/>
-      </p:par>
-    </p:tnLst>
-  </p:timing>
 </p:sld>
 </file>
 
@@ -4198,32 +5325,228 @@
           <a:lstStyle/>
           <a:p>
             <a:r>
-              <a:rPr lang="en-US" dirty="0" smtClean="0"/>
+              <a:rPr lang="en-US" dirty="0"/>
               <a:t>State of the Art</a:t>
             </a:r>
             <a:endParaRPr lang="de-CH" dirty="0"/>
           </a:p>
         </p:txBody>
       </p:sp>
-      <p:sp>
-        <p:nvSpPr>
-          <p:cNvPr id="3" name="Content Placeholder 2"/>
-          <p:cNvSpPr>
-            <a:spLocks noGrp="1"/>
-          </p:cNvSpPr>
-          <p:nvPr>
-            <p:ph idx="1"/>
-          </p:nvPr>
-        </p:nvSpPr>
-        <p:spPr/>
-        <p:txBody>
-          <a:bodyPr/>
-          <a:lstStyle/>
-          <a:p>
-            <a:endParaRPr lang="de-CH" dirty="0"/>
-          </a:p>
-        </p:txBody>
-      </p:sp>
+      <mc:AlternateContent xmlns:mc="http://schemas.openxmlformats.org/markup-compatibility/2006">
+        <mc:Choice xmlns:a14="http://schemas.microsoft.com/office/drawing/2010/main" Requires="a14">
+          <p:sp>
+            <p:nvSpPr>
+              <p:cNvPr id="3" name="Content Placeholder 2"/>
+              <p:cNvSpPr>
+                <a:spLocks noGrp="1"/>
+              </p:cNvSpPr>
+              <p:nvPr>
+                <p:ph idx="1"/>
+              </p:nvPr>
+            </p:nvSpPr>
+            <p:spPr/>
+            <p:txBody>
+              <a:bodyPr/>
+              <a:lstStyle/>
+              <a:p>
+                <a:r>
+                  <a:rPr lang="de-CH" dirty="0"/>
+                  <a:t>Pothen Fan </a:t>
+                </a:r>
+                <a14:m>
+                  <m:oMath xmlns:m="http://schemas.openxmlformats.org/officeDocument/2006/math">
+                    <m:r>
+                      <a:rPr lang="de-CH" b="0" i="1" smtClean="0">
+                        <a:latin typeface="Cambria Math" panose="02040503050406030204" pitchFamily="18" charset="0"/>
+                      </a:rPr>
+                      <m:t>𝑂</m:t>
+                    </m:r>
+                    <m:r>
+                      <a:rPr lang="de-CH" b="0" i="1" smtClean="0">
+                        <a:latin typeface="Cambria Math" panose="02040503050406030204" pitchFamily="18" charset="0"/>
+                      </a:rPr>
+                      <m:t>(</m:t>
+                    </m:r>
+                    <m:r>
+                      <a:rPr lang="de-CH" b="0" i="1" smtClean="0">
+                        <a:latin typeface="Cambria Math" panose="02040503050406030204" pitchFamily="18" charset="0"/>
+                      </a:rPr>
+                      <m:t>𝑛𝑚</m:t>
+                    </m:r>
+                    <m:r>
+                      <a:rPr lang="de-CH" b="0" i="1" smtClean="0">
+                        <a:latin typeface="Cambria Math" panose="02040503050406030204" pitchFamily="18" charset="0"/>
+                      </a:rPr>
+                      <m:t>)</m:t>
+                    </m:r>
+                  </m:oMath>
+                </a14:m>
+                <a:r>
+                  <a:rPr lang="de-CH" i="1" dirty="0"/>
+                  <a:t> </a:t>
+                </a:r>
+                <a:r>
+                  <a:rPr lang="de-CH" dirty="0"/>
+                  <a:t>[1]</a:t>
+                </a:r>
+              </a:p>
+              <a:p>
+                <a:r>
+                  <a:rPr lang="de-CH" dirty="0" err="1"/>
+                  <a:t>Hopcroft</a:t>
+                </a:r>
+                <a:r>
+                  <a:rPr lang="de-CH" dirty="0"/>
+                  <a:t> </a:t>
+                </a:r>
+                <a:r>
+                  <a:rPr lang="de-CH" dirty="0" err="1"/>
+                  <a:t>Karp</a:t>
+                </a:r>
+                <a:r>
+                  <a:rPr lang="de-CH" dirty="0"/>
+                  <a:t> </a:t>
+                </a:r>
+                <a14:m>
+                  <m:oMath xmlns:m="http://schemas.openxmlformats.org/officeDocument/2006/math">
+                    <m:r>
+                      <a:rPr lang="de-CH" i="1">
+                        <a:latin typeface="Cambria Math" panose="02040503050406030204" pitchFamily="18" charset="0"/>
+                      </a:rPr>
+                      <m:t>𝑂</m:t>
+                    </m:r>
+                    <m:r>
+                      <a:rPr lang="de-CH" i="1">
+                        <a:latin typeface="Cambria Math" panose="02040503050406030204" pitchFamily="18" charset="0"/>
+                      </a:rPr>
+                      <m:t>(</m:t>
+                    </m:r>
+                    <m:rad>
+                      <m:radPr>
+                        <m:degHide m:val="on"/>
+                        <m:ctrlPr>
+                          <a:rPr lang="de-CH" i="1" smtClean="0">
+                            <a:latin typeface="Cambria Math" panose="02040503050406030204" pitchFamily="18" charset="0"/>
+                          </a:rPr>
+                        </m:ctrlPr>
+                      </m:radPr>
+                      <m:deg/>
+                      <m:e>
+                        <m:r>
+                          <a:rPr lang="de-CH" b="0" i="1" smtClean="0">
+                            <a:latin typeface="Cambria Math" panose="02040503050406030204" pitchFamily="18" charset="0"/>
+                          </a:rPr>
+                          <m:t>𝑛</m:t>
+                        </m:r>
+                      </m:e>
+                    </m:rad>
+                    <m:r>
+                      <a:rPr lang="de-CH" i="1">
+                        <a:latin typeface="Cambria Math" panose="02040503050406030204" pitchFamily="18" charset="0"/>
+                      </a:rPr>
+                      <m:t>𝑚</m:t>
+                    </m:r>
+                    <m:r>
+                      <a:rPr lang="de-CH" i="1">
+                        <a:latin typeface="Cambria Math" panose="02040503050406030204" pitchFamily="18" charset="0"/>
+                      </a:rPr>
+                      <m:t>)</m:t>
+                    </m:r>
+                  </m:oMath>
+                </a14:m>
+                <a:r>
+                  <a:rPr lang="de-CH" dirty="0"/>
+                  <a:t> [2]</a:t>
+                </a:r>
+              </a:p>
+              <a:p>
+                <a:r>
+                  <a:rPr lang="de-CH" dirty="0" err="1"/>
+                  <a:t>Tree</a:t>
+                </a:r>
+                <a:r>
+                  <a:rPr lang="de-CH" dirty="0"/>
+                  <a:t> </a:t>
+                </a:r>
+                <a:r>
+                  <a:rPr lang="de-CH" dirty="0" err="1"/>
+                  <a:t>Grafting</a:t>
+                </a:r>
+                <a:r>
+                  <a:rPr lang="de-CH" dirty="0"/>
+                  <a:t> </a:t>
+                </a:r>
+                <a14:m>
+                  <m:oMath xmlns:m="http://schemas.openxmlformats.org/officeDocument/2006/math">
+                    <m:r>
+                      <a:rPr lang="de-CH" i="1">
+                        <a:latin typeface="Cambria Math" panose="02040503050406030204" pitchFamily="18" charset="0"/>
+                      </a:rPr>
+                      <m:t>𝑂</m:t>
+                    </m:r>
+                    <m:r>
+                      <a:rPr lang="de-CH" i="1">
+                        <a:latin typeface="Cambria Math" panose="02040503050406030204" pitchFamily="18" charset="0"/>
+                      </a:rPr>
+                      <m:t>(</m:t>
+                    </m:r>
+                    <m:r>
+                      <a:rPr lang="de-CH" i="1">
+                        <a:latin typeface="Cambria Math" panose="02040503050406030204" pitchFamily="18" charset="0"/>
+                      </a:rPr>
+                      <m:t>𝑛𝑚</m:t>
+                    </m:r>
+                    <m:r>
+                      <a:rPr lang="de-CH" i="1">
+                        <a:latin typeface="Cambria Math" panose="02040503050406030204" pitchFamily="18" charset="0"/>
+                      </a:rPr>
+                      <m:t>)</m:t>
+                    </m:r>
+                  </m:oMath>
+                </a14:m>
+                <a:r>
+                  <a:rPr lang="de-CH" dirty="0"/>
+                  <a:t> [3]</a:t>
+                </a:r>
+                <a:endParaRPr lang="de-CH" dirty="0"/>
+              </a:p>
+            </p:txBody>
+          </p:sp>
+        </mc:Choice>
+        <mc:Fallback>
+          <p:sp>
+            <p:nvSpPr>
+              <p:cNvPr id="3" name="Content Placeholder 2"/>
+              <p:cNvSpPr>
+                <a:spLocks noGrp="1" noRot="1" noChangeAspect="1" noMove="1" noResize="1" noEditPoints="1" noAdjustHandles="1" noChangeArrowheads="1" noChangeShapeType="1" noTextEdit="1"/>
+              </p:cNvSpPr>
+              <p:nvPr>
+                <p:ph idx="1"/>
+              </p:nvPr>
+            </p:nvSpPr>
+            <p:spPr>
+              <a:blipFill>
+                <a:blip r:embed="rId2"/>
+                <a:stretch>
+                  <a:fillRect l="-1391"/>
+                </a:stretch>
+              </a:blipFill>
+            </p:spPr>
+            <p:txBody>
+              <a:bodyPr/>
+              <a:lstStyle/>
+              <a:p>
+                <a:r>
+                  <a:rPr lang="en-US">
+                    <a:noFill/>
+                  </a:rPr>
+                  <a:t> </a:t>
+                </a:r>
+              </a:p>
+            </p:txBody>
+          </p:sp>
+        </mc:Fallback>
+      </mc:AlternateContent>
       <p:sp>
         <p:nvSpPr>
           <p:cNvPr id="4" name="Slide Number Placeholder 3"/>
@@ -4244,27 +5567,343 @@
               <a:pPr/>
               <a:t>3</a:t>
             </a:fld>
-            <a:endParaRPr lang="de-CH"/>
+            <a:endParaRPr lang="de-CH" dirty="0"/>
+          </a:p>
+        </p:txBody>
+      </p:sp>
+      <p:sp>
+        <p:nvSpPr>
+          <p:cNvPr id="5" name="TextBox 4"/>
+          <p:cNvSpPr txBox="1"/>
+          <p:nvPr/>
+        </p:nvSpPr>
+        <p:spPr>
+          <a:xfrm>
+            <a:off x="628650" y="6176963"/>
+            <a:ext cx="7239000" cy="861774"/>
+          </a:xfrm>
+          <a:prstGeom prst="rect">
+            <a:avLst/>
+          </a:prstGeom>
+          <a:noFill/>
+        </p:spPr>
+        <p:txBody>
+          <a:bodyPr wrap="square" rtlCol="0">
+            <a:spAutoFit/>
+          </a:bodyPr>
+          <a:lstStyle/>
+          <a:p>
+            <a:pPr lvl="0" hangingPunct="0">
+              <a:defRPr sz="1200">
+                <a:latin typeface="Calibri" pitchFamily="34"/>
+              </a:defRPr>
+            </a:pPr>
+            <a:r>
+              <a:rPr lang="de-DE" sz="1000" dirty="0">
+                <a:solidFill>
+                  <a:schemeClr val="accent3"/>
+                </a:solidFill>
+                <a:latin typeface="Calibri" pitchFamily="34"/>
+                <a:ea typeface="Andale Sans UI" pitchFamily="2"/>
+                <a:cs typeface="Tahoma" pitchFamily="2"/>
+              </a:rPr>
+              <a:t>[1] </a:t>
+            </a:r>
+            <a:r>
+              <a:rPr lang="de-DE" sz="1000" dirty="0">
+                <a:solidFill>
+                  <a:schemeClr val="accent3"/>
+                </a:solidFill>
+                <a:latin typeface="Calibri" pitchFamily="34"/>
+                <a:ea typeface="Andale Sans UI" pitchFamily="2"/>
+                <a:cs typeface="Tahoma" pitchFamily="2"/>
+                <a:hlinkClick r:id="rId3"/>
+              </a:rPr>
+              <a:t>https://pdfs.semanticscholar.org/6eda/a726a61c0c059cc1ab553abd02539fd81573.pdf</a:t>
+            </a:r>
+          </a:p>
+          <a:p>
+            <a:pPr lvl="0" hangingPunct="0">
+              <a:defRPr sz="1200">
+                <a:latin typeface="Calibri" pitchFamily="34"/>
+              </a:defRPr>
+            </a:pPr>
+            <a:r>
+              <a:rPr lang="de-DE" sz="1000" dirty="0">
+                <a:solidFill>
+                  <a:schemeClr val="accent3"/>
+                </a:solidFill>
+                <a:latin typeface="Calibri" pitchFamily="34"/>
+                <a:ea typeface="Andale Sans UI" pitchFamily="2"/>
+                <a:cs typeface="Tahoma" pitchFamily="2"/>
+              </a:rPr>
+              <a:t>[2]  J. </a:t>
+            </a:r>
+            <a:r>
+              <a:rPr lang="de-DE" sz="1000" dirty="0" err="1">
+                <a:solidFill>
+                  <a:schemeClr val="accent3"/>
+                </a:solidFill>
+                <a:latin typeface="Calibri" pitchFamily="34"/>
+                <a:ea typeface="Andale Sans UI" pitchFamily="2"/>
+                <a:cs typeface="Tahoma" pitchFamily="2"/>
+              </a:rPr>
+              <a:t>Hopcroft</a:t>
+            </a:r>
+            <a:r>
+              <a:rPr lang="de-DE" sz="1000" dirty="0">
+                <a:solidFill>
+                  <a:schemeClr val="accent3"/>
+                </a:solidFill>
+                <a:latin typeface="Calibri" pitchFamily="34"/>
+                <a:ea typeface="Andale Sans UI" pitchFamily="2"/>
+                <a:cs typeface="Tahoma" pitchFamily="2"/>
+              </a:rPr>
+              <a:t> </a:t>
+            </a:r>
+            <a:r>
+              <a:rPr lang="de-DE" sz="1000" dirty="0" err="1">
+                <a:solidFill>
+                  <a:schemeClr val="accent3"/>
+                </a:solidFill>
+                <a:latin typeface="Calibri" pitchFamily="34"/>
+                <a:ea typeface="Andale Sans UI" pitchFamily="2"/>
+                <a:cs typeface="Tahoma" pitchFamily="2"/>
+              </a:rPr>
+              <a:t>and</a:t>
+            </a:r>
+            <a:r>
+              <a:rPr lang="de-DE" sz="1000" dirty="0">
+                <a:solidFill>
+                  <a:schemeClr val="accent3"/>
+                </a:solidFill>
+                <a:latin typeface="Calibri" pitchFamily="34"/>
+                <a:ea typeface="Andale Sans UI" pitchFamily="2"/>
+                <a:cs typeface="Tahoma" pitchFamily="2"/>
+              </a:rPr>
+              <a:t> R. </a:t>
+            </a:r>
+            <a:r>
+              <a:rPr lang="de-DE" sz="1000" dirty="0" err="1">
+                <a:solidFill>
+                  <a:schemeClr val="accent3"/>
+                </a:solidFill>
+                <a:latin typeface="Calibri" pitchFamily="34"/>
+                <a:ea typeface="Andale Sans UI" pitchFamily="2"/>
+                <a:cs typeface="Tahoma" pitchFamily="2"/>
+              </a:rPr>
+              <a:t>Karp</a:t>
+            </a:r>
+            <a:r>
+              <a:rPr lang="de-DE" sz="1000" dirty="0">
+                <a:solidFill>
+                  <a:schemeClr val="accent3"/>
+                </a:solidFill>
+                <a:latin typeface="Calibri" pitchFamily="34"/>
+                <a:ea typeface="Andale Sans UI" pitchFamily="2"/>
+                <a:cs typeface="Tahoma" pitchFamily="2"/>
+              </a:rPr>
+              <a:t>, “A n5/2 </a:t>
+            </a:r>
+            <a:r>
+              <a:rPr lang="de-DE" sz="1000" dirty="0" err="1">
+                <a:solidFill>
+                  <a:schemeClr val="accent3"/>
+                </a:solidFill>
+                <a:latin typeface="Calibri" pitchFamily="34"/>
+                <a:ea typeface="Andale Sans UI" pitchFamily="2"/>
+                <a:cs typeface="Tahoma" pitchFamily="2"/>
+              </a:rPr>
+              <a:t>algorithm</a:t>
+            </a:r>
+            <a:r>
+              <a:rPr lang="de-DE" sz="1000" dirty="0">
+                <a:solidFill>
+                  <a:schemeClr val="accent3"/>
+                </a:solidFill>
+                <a:latin typeface="Calibri" pitchFamily="34"/>
+                <a:ea typeface="Andale Sans UI" pitchFamily="2"/>
+                <a:cs typeface="Tahoma" pitchFamily="2"/>
+              </a:rPr>
+              <a:t> </a:t>
+            </a:r>
+            <a:r>
+              <a:rPr lang="de-DE" sz="1000" dirty="0" err="1">
+                <a:solidFill>
+                  <a:schemeClr val="accent3"/>
+                </a:solidFill>
+                <a:latin typeface="Calibri" pitchFamily="34"/>
+                <a:ea typeface="Andale Sans UI" pitchFamily="2"/>
+                <a:cs typeface="Tahoma" pitchFamily="2"/>
+              </a:rPr>
+              <a:t>for</a:t>
+            </a:r>
+            <a:r>
+              <a:rPr lang="de-DE" sz="1000" dirty="0">
+                <a:solidFill>
+                  <a:schemeClr val="accent3"/>
+                </a:solidFill>
+                <a:latin typeface="Calibri" pitchFamily="34"/>
+                <a:ea typeface="Andale Sans UI" pitchFamily="2"/>
+                <a:cs typeface="Tahoma" pitchFamily="2"/>
+              </a:rPr>
+              <a:t> </a:t>
+            </a:r>
+            <a:r>
+              <a:rPr lang="de-DE" sz="1000" dirty="0" err="1">
+                <a:solidFill>
+                  <a:schemeClr val="accent3"/>
+                </a:solidFill>
+                <a:latin typeface="Calibri" pitchFamily="34"/>
+                <a:ea typeface="Andale Sans UI" pitchFamily="2"/>
+                <a:cs typeface="Tahoma" pitchFamily="2"/>
+              </a:rPr>
+              <a:t>maximum</a:t>
+            </a:r>
+            <a:r>
+              <a:rPr lang="de-DE" sz="1000" dirty="0">
+                <a:solidFill>
+                  <a:schemeClr val="accent3"/>
+                </a:solidFill>
+                <a:latin typeface="Calibri" pitchFamily="34"/>
+                <a:ea typeface="Andale Sans UI" pitchFamily="2"/>
+                <a:cs typeface="Tahoma" pitchFamily="2"/>
+              </a:rPr>
+              <a:t> </a:t>
+            </a:r>
+            <a:r>
+              <a:rPr lang="de-DE" sz="1000" dirty="0" err="1">
+                <a:solidFill>
+                  <a:schemeClr val="accent3"/>
+                </a:solidFill>
+                <a:latin typeface="Calibri" pitchFamily="34"/>
+                <a:ea typeface="Andale Sans UI" pitchFamily="2"/>
+                <a:cs typeface="Tahoma" pitchFamily="2"/>
+              </a:rPr>
+              <a:t>matchings</a:t>
+            </a:r>
+            <a:r>
+              <a:rPr lang="de-DE" sz="1000" dirty="0">
+                <a:solidFill>
+                  <a:schemeClr val="accent3"/>
+                </a:solidFill>
+                <a:latin typeface="Calibri" pitchFamily="34"/>
+                <a:ea typeface="Andale Sans UI" pitchFamily="2"/>
+                <a:cs typeface="Tahoma" pitchFamily="2"/>
+              </a:rPr>
+              <a:t> in </a:t>
+            </a:r>
+            <a:r>
+              <a:rPr lang="de-DE" sz="1000" dirty="0" err="1">
+                <a:solidFill>
+                  <a:schemeClr val="accent3"/>
+                </a:solidFill>
+                <a:latin typeface="Calibri" pitchFamily="34"/>
+                <a:ea typeface="Andale Sans UI" pitchFamily="2"/>
+                <a:cs typeface="Tahoma" pitchFamily="2"/>
+              </a:rPr>
+              <a:t>bipartite</a:t>
+            </a:r>
+            <a:r>
+              <a:rPr lang="de-DE" sz="1000" dirty="0">
+                <a:solidFill>
+                  <a:schemeClr val="accent3"/>
+                </a:solidFill>
+                <a:latin typeface="Calibri" pitchFamily="34"/>
+                <a:ea typeface="Andale Sans UI" pitchFamily="2"/>
+                <a:cs typeface="Tahoma" pitchFamily="2"/>
+              </a:rPr>
+              <a:t> </a:t>
+            </a:r>
+            <a:r>
+              <a:rPr lang="de-DE" sz="1000" dirty="0" err="1">
+                <a:solidFill>
+                  <a:schemeClr val="accent3"/>
+                </a:solidFill>
+                <a:latin typeface="Calibri" pitchFamily="34"/>
+                <a:ea typeface="Andale Sans UI" pitchFamily="2"/>
+                <a:cs typeface="Tahoma" pitchFamily="2"/>
+              </a:rPr>
+              <a:t>graphs</a:t>
+            </a:r>
+            <a:r>
+              <a:rPr lang="de-DE" sz="1000" dirty="0">
+                <a:solidFill>
+                  <a:schemeClr val="accent3"/>
+                </a:solidFill>
+                <a:latin typeface="Calibri" pitchFamily="34"/>
+                <a:ea typeface="Andale Sans UI" pitchFamily="2"/>
+                <a:cs typeface="Tahoma" pitchFamily="2"/>
+              </a:rPr>
+              <a:t>,” SIAM J. </a:t>
+            </a:r>
+            <a:r>
+              <a:rPr lang="de-DE" sz="1000" dirty="0" err="1">
+                <a:solidFill>
+                  <a:schemeClr val="accent3"/>
+                </a:solidFill>
+                <a:latin typeface="Calibri" pitchFamily="34"/>
+                <a:ea typeface="Andale Sans UI" pitchFamily="2"/>
+                <a:cs typeface="Tahoma" pitchFamily="2"/>
+              </a:rPr>
+              <a:t>Comput</a:t>
+            </a:r>
+            <a:r>
+              <a:rPr lang="de-DE" sz="1000" dirty="0">
+                <a:solidFill>
+                  <a:schemeClr val="accent3"/>
+                </a:solidFill>
+                <a:latin typeface="Calibri" pitchFamily="34"/>
+                <a:ea typeface="Andale Sans UI" pitchFamily="2"/>
+                <a:cs typeface="Tahoma" pitchFamily="2"/>
+              </a:rPr>
+              <a:t>., vol. 2, pp. 225–231, 1973.</a:t>
+            </a:r>
+          </a:p>
+          <a:p>
+            <a:pPr lvl="0" hangingPunct="0">
+              <a:defRPr sz="1200">
+                <a:latin typeface="Calibri" pitchFamily="34"/>
+              </a:defRPr>
+            </a:pPr>
+            <a:r>
+              <a:rPr lang="de-DE" sz="1000" dirty="0">
+                <a:solidFill>
+                  <a:schemeClr val="accent3"/>
+                </a:solidFill>
+                <a:latin typeface="Calibri" pitchFamily="34"/>
+                <a:ea typeface="Andale Sans UI" pitchFamily="2"/>
+                <a:cs typeface="Tahoma" pitchFamily="2"/>
+              </a:rPr>
+              <a:t>[3] https://www.cs.purdue.edu/homes/apothen/Papers/cardinality-matching-TPDS-2016.pdf</a:t>
+            </a:r>
+          </a:p>
+          <a:p>
+            <a:endParaRPr lang="en-US" sz="1000" dirty="0">
+              <a:solidFill>
+                <a:schemeClr val="accent3"/>
+              </a:solidFill>
+            </a:endParaRPr>
+          </a:p>
+          <a:p>
+            <a:endParaRPr lang="en-US" sz="1000" dirty="0">
+              <a:solidFill>
+                <a:schemeClr val="accent3"/>
+              </a:solidFill>
+            </a:endParaRPr>
           </a:p>
         </p:txBody>
       </p:sp>
     </p:spTree>
     <p:extLst>
       <p:ext uri="{BB962C8B-B14F-4D97-AF65-F5344CB8AC3E}">
-        <p14:creationId xmlns:p14="http://schemas.microsoft.com/office/powerpoint/2010/main" xmlns="" val="2292730490"/>
+        <p14:creationId xmlns:p14="http://schemas.microsoft.com/office/powerpoint/2010/main" val="2292730490"/>
       </p:ext>
     </p:extLst>
   </p:cSld>
   <p:clrMapOvr>
     <a:masterClrMapping/>
   </p:clrMapOvr>
-  <p:timing>
-    <p:tnLst>
-      <p:par>
-        <p:cTn id="1" dur="indefinite" restart="never" nodeType="tmRoot"/>
-      </p:par>
-    </p:tnLst>
-  </p:timing>
 </p:sld>
 </file>
 
@@ -4301,64 +5940,12 @@
           <a:lstStyle/>
           <a:p>
             <a:r>
-              <a:rPr lang="en-US" dirty="0" smtClean="0"/>
-              <a:t>Baseline</a:t>
-            </a:r>
-            <a:endParaRPr lang="de-CH" dirty="0"/>
-          </a:p>
-        </p:txBody>
-      </p:sp>
-      <p:sp>
-        <p:nvSpPr>
-          <p:cNvPr id="3" name="Content Placeholder 2"/>
-          <p:cNvSpPr>
-            <a:spLocks noGrp="1"/>
-          </p:cNvSpPr>
-          <p:nvPr>
-            <p:ph idx="1"/>
-          </p:nvPr>
-        </p:nvSpPr>
-        <p:spPr/>
-        <p:txBody>
-          <a:bodyPr/>
-          <a:lstStyle/>
-          <a:p>
-            <a:pPr defTabSz="688975"/>
-            <a:r>
-              <a:rPr lang="en-US" dirty="0" smtClean="0"/>
-              <a:t>Sequential: 	Boost </a:t>
-            </a:r>
-            <a:r>
-              <a:rPr lang="en-US" dirty="0" smtClean="0"/>
-              <a:t>(</a:t>
-            </a:r>
-            <a:r>
-              <a:rPr lang="en-US" dirty="0" err="1" smtClean="0"/>
-              <a:t>Hopcroft</a:t>
-            </a:r>
-            <a:r>
-              <a:rPr lang="en-US" dirty="0" smtClean="0"/>
-              <a:t>-Karp) [1] </a:t>
-            </a:r>
-            <a:endParaRPr lang="en-US" dirty="0" smtClean="0"/>
-          </a:p>
-          <a:p>
-            <a:pPr defTabSz="1031875"/>
-            <a:r>
-              <a:rPr lang="en-US" dirty="0" smtClean="0"/>
-              <a:t>Parallel: 	</a:t>
-            </a:r>
-            <a:r>
-              <a:rPr lang="en-US" dirty="0" err="1" smtClean="0"/>
+              <a:rPr lang="en-US" dirty="0" err="1"/>
               <a:t>Pothen</a:t>
             </a:r>
             <a:r>
-              <a:rPr lang="en-US" dirty="0" smtClean="0"/>
-              <a:t>-Fan </a:t>
-            </a:r>
-            <a:r>
-              <a:rPr lang="en-US" dirty="0" smtClean="0"/>
-              <a:t>[2]</a:t>
+              <a:rPr lang="en-US" dirty="0"/>
+              <a:t>-Fan</a:t>
             </a:r>
             <a:endParaRPr lang="de-CH" dirty="0"/>
           </a:p>
@@ -4383,191 +5970,6 @@
               <a:rPr lang="de-CH" smtClean="0"/>
               <a:pPr/>
               <a:t>4</a:t>
-            </a:fld>
-            <a:endParaRPr lang="de-CH" dirty="0"/>
-          </a:p>
-        </p:txBody>
-      </p:sp>
-      <p:sp>
-        <p:nvSpPr>
-          <p:cNvPr id="5" name="TextBox 4"/>
-          <p:cNvSpPr txBox="1"/>
-          <p:nvPr/>
-        </p:nvSpPr>
-        <p:spPr>
-          <a:xfrm>
-            <a:off x="602770" y="6210632"/>
-            <a:ext cx="7239000" cy="830997"/>
-          </a:xfrm>
-          <a:prstGeom prst="rect">
-            <a:avLst/>
-          </a:prstGeom>
-          <a:noFill/>
-        </p:spPr>
-        <p:txBody>
-          <a:bodyPr wrap="square" rtlCol="0">
-            <a:spAutoFit/>
-          </a:bodyPr>
-          <a:lstStyle/>
-          <a:p>
-            <a:r>
-              <a:rPr lang="en-US" sz="1200" dirty="0" smtClean="0">
-                <a:solidFill>
-                  <a:schemeClr val="bg1">
-                    <a:lumMod val="75000"/>
-                  </a:schemeClr>
-                </a:solidFill>
-              </a:rPr>
-              <a:t>[1] </a:t>
-            </a:r>
-            <a:r>
-              <a:rPr lang="en-US" sz="1200" dirty="0" smtClean="0">
-                <a:solidFill>
-                  <a:schemeClr val="bg1">
-                    <a:lumMod val="75000"/>
-                  </a:schemeClr>
-                </a:solidFill>
-                <a:hlinkClick r:id="rId2"/>
-              </a:rPr>
-              <a:t>http://www.boost.org/doc/libs/1_59_0/libs/graph/doc/maximum_matching.html</a:t>
-            </a:r>
-          </a:p>
-          <a:p>
-            <a:r>
-              <a:rPr lang="en-US" sz="1200" dirty="0" smtClean="0">
-                <a:solidFill>
-                  <a:schemeClr val="bg1">
-                    <a:lumMod val="75000"/>
-                  </a:schemeClr>
-                </a:solidFill>
-              </a:rPr>
-              <a:t>[2] </a:t>
-            </a:r>
-            <a:r>
-              <a:rPr lang="en-US" sz="1200" dirty="0" smtClean="0">
-                <a:solidFill>
-                  <a:schemeClr val="bg1">
-                    <a:lumMod val="75000"/>
-                  </a:schemeClr>
-                </a:solidFill>
-                <a:hlinkClick r:id="rId2"/>
-              </a:rPr>
-              <a:t>http://www.sandia.gov/~egboman/papers/ParallelMaximumMatching.pdf</a:t>
-            </a:r>
-            <a:endParaRPr lang="en-US" sz="1200" dirty="0" smtClean="0">
-              <a:solidFill>
-                <a:schemeClr val="bg1">
-                  <a:lumMod val="75000"/>
-                </a:schemeClr>
-              </a:solidFill>
-            </a:endParaRPr>
-          </a:p>
-          <a:p>
-            <a:r>
-              <a:rPr lang="en-US" sz="1200" dirty="0" smtClean="0">
-                <a:solidFill>
-                  <a:schemeClr val="bg1">
-                    <a:lumMod val="75000"/>
-                  </a:schemeClr>
-                </a:solidFill>
-              </a:rPr>
-              <a:t> </a:t>
-            </a:r>
-          </a:p>
-          <a:p>
-            <a:endParaRPr lang="en-US" sz="1200" dirty="0">
-              <a:solidFill>
-                <a:schemeClr val="bg1">
-                  <a:lumMod val="75000"/>
-                </a:schemeClr>
-              </a:solidFill>
-            </a:endParaRPr>
-          </a:p>
-        </p:txBody>
-      </p:sp>
-    </p:spTree>
-    <p:extLst>
-      <p:ext uri="{BB962C8B-B14F-4D97-AF65-F5344CB8AC3E}">
-        <p14:creationId xmlns:p14="http://schemas.microsoft.com/office/powerpoint/2010/main" xmlns="" val="266960599"/>
-      </p:ext>
-    </p:extLst>
-  </p:cSld>
-  <p:clrMapOvr>
-    <a:masterClrMapping/>
-  </p:clrMapOvr>
-  <p:timing>
-    <p:tnLst>
-      <p:par>
-        <p:cTn id="1" dur="indefinite" restart="never" nodeType="tmRoot"/>
-      </p:par>
-    </p:tnLst>
-  </p:timing>
-</p:sld>
-</file>
-
-<file path=ppt/slides/slide5.xml><?xml version="1.0" encoding="utf-8"?>
-<p:sld xmlns:a="http://schemas.openxmlformats.org/drawingml/2006/main" xmlns:r="http://schemas.openxmlformats.org/officeDocument/2006/relationships" xmlns:p="http://schemas.openxmlformats.org/presentationml/2006/main">
-  <p:cSld>
-    <p:spTree>
-      <p:nvGrpSpPr>
-        <p:cNvPr id="1" name=""/>
-        <p:cNvGrpSpPr/>
-        <p:nvPr/>
-      </p:nvGrpSpPr>
-      <p:grpSpPr>
-        <a:xfrm>
-          <a:off x="0" y="0"/>
-          <a:ext cx="0" cy="0"/>
-          <a:chOff x="0" y="0"/>
-          <a:chExt cx="0" cy="0"/>
-        </a:xfrm>
-      </p:grpSpPr>
-      <p:sp>
-        <p:nvSpPr>
-          <p:cNvPr id="2" name="Title 1"/>
-          <p:cNvSpPr>
-            <a:spLocks noGrp="1"/>
-          </p:cNvSpPr>
-          <p:nvPr>
-            <p:ph type="title"/>
-          </p:nvPr>
-        </p:nvSpPr>
-        <p:spPr/>
-        <p:txBody>
-          <a:bodyPr/>
-          <a:lstStyle/>
-          <a:p>
-            <a:r>
-              <a:rPr lang="en-US" dirty="0" err="1" smtClean="0"/>
-              <a:t>Pothen</a:t>
-            </a:r>
-            <a:r>
-              <a:rPr lang="en-US" dirty="0" smtClean="0"/>
-              <a:t>-Fan</a:t>
-            </a:r>
-            <a:endParaRPr lang="de-CH" dirty="0"/>
-          </a:p>
-        </p:txBody>
-      </p:sp>
-      <p:sp>
-        <p:nvSpPr>
-          <p:cNvPr id="4" name="Slide Number Placeholder 3"/>
-          <p:cNvSpPr>
-            <a:spLocks noGrp="1"/>
-          </p:cNvSpPr>
-          <p:nvPr>
-            <p:ph type="sldNum" sz="quarter" idx="12"/>
-          </p:nvPr>
-        </p:nvSpPr>
-        <p:spPr/>
-        <p:txBody>
-          <a:bodyPr/>
-          <a:lstStyle/>
-          <a:p>
-            <a:fld id="{631FC4A0-0520-44E0-B489-E0DB3391F3AE}" type="slidenum">
-              <a:rPr lang="de-CH" smtClean="0"/>
-              <a:pPr/>
-              <a:t>5</a:t>
             </a:fld>
             <a:endParaRPr lang="de-CH"/>
           </a:p>
@@ -4608,7 +6010,7 @@
           <a:p>
             <a:pPr algn="ctr"/>
             <a:r>
-              <a:rPr lang="en-US" dirty="0" smtClean="0"/>
+              <a:rPr lang="en-US" dirty="0"/>
               <a:t>A</a:t>
             </a:r>
             <a:endParaRPr lang="de-CH" dirty="0"/>
@@ -4650,7 +6052,7 @@
           <a:p>
             <a:pPr algn="ctr"/>
             <a:r>
-              <a:rPr lang="en-US" dirty="0" smtClean="0"/>
+              <a:rPr lang="en-US" dirty="0"/>
               <a:t>B</a:t>
             </a:r>
             <a:endParaRPr lang="de-CH" dirty="0"/>
@@ -4692,7 +6094,7 @@
           <a:p>
             <a:pPr algn="ctr"/>
             <a:r>
-              <a:rPr lang="en-US" dirty="0" smtClean="0"/>
+              <a:rPr lang="en-US" dirty="0"/>
               <a:t>C</a:t>
             </a:r>
             <a:endParaRPr lang="de-CH" dirty="0"/>
@@ -4734,7 +6136,7 @@
           <a:p>
             <a:pPr algn="ctr"/>
             <a:r>
-              <a:rPr lang="en-US" dirty="0" smtClean="0"/>
+              <a:rPr lang="en-US" dirty="0"/>
               <a:t>D</a:t>
             </a:r>
             <a:endParaRPr lang="de-CH" dirty="0"/>
@@ -4776,7 +6178,7 @@
           <a:p>
             <a:pPr algn="ctr"/>
             <a:r>
-              <a:rPr lang="en-US" dirty="0" smtClean="0"/>
+              <a:rPr lang="en-US" dirty="0"/>
               <a:t>1</a:t>
             </a:r>
             <a:endParaRPr lang="de-CH" dirty="0"/>
@@ -4818,7 +6220,7 @@
           <a:p>
             <a:pPr algn="ctr"/>
             <a:r>
-              <a:rPr lang="en-US" dirty="0" smtClean="0"/>
+              <a:rPr lang="en-US" dirty="0"/>
               <a:t>2</a:t>
             </a:r>
             <a:endParaRPr lang="de-CH" dirty="0"/>
@@ -4860,7 +6262,7 @@
           <a:p>
             <a:pPr algn="ctr"/>
             <a:r>
-              <a:rPr lang="en-US" dirty="0" smtClean="0"/>
+              <a:rPr lang="en-US" dirty="0"/>
               <a:t>3</a:t>
             </a:r>
             <a:endParaRPr lang="de-CH" dirty="0"/>
@@ -4902,7 +6304,7 @@
           <a:p>
             <a:pPr algn="ctr"/>
             <a:r>
-              <a:rPr lang="en-US" dirty="0" smtClean="0"/>
+              <a:rPr lang="en-US" dirty="0"/>
               <a:t>4</a:t>
             </a:r>
             <a:endParaRPr lang="de-CH" dirty="0"/>
@@ -5165,7 +6567,7 @@
           <a:p>
             <a:pPr algn="ctr"/>
             <a:r>
-              <a:rPr lang="en-US" dirty="0" smtClean="0"/>
+              <a:rPr lang="en-US" dirty="0"/>
               <a:t>C</a:t>
             </a:r>
             <a:endParaRPr lang="de-CH" dirty="0"/>
@@ -5265,7 +6667,7 @@
           <a:p>
             <a:pPr algn="ctr"/>
             <a:r>
-              <a:rPr lang="en-US" dirty="0" smtClean="0"/>
+              <a:rPr lang="en-US" dirty="0"/>
               <a:t>A</a:t>
             </a:r>
             <a:endParaRPr lang="de-CH" dirty="0"/>
@@ -5315,7 +6717,7 @@
           <a:p>
             <a:pPr algn="ctr"/>
             <a:r>
-              <a:rPr lang="en-US" dirty="0" smtClean="0"/>
+              <a:rPr lang="en-US" dirty="0"/>
               <a:t>4</a:t>
             </a:r>
           </a:p>
@@ -5438,7 +6840,7 @@
     </p:spTree>
     <p:extLst>
       <p:ext uri="{BB962C8B-B14F-4D97-AF65-F5344CB8AC3E}">
-        <p14:creationId xmlns:p14="http://schemas.microsoft.com/office/powerpoint/2010/main" xmlns="" val="426005414"/>
+        <p14:creationId xmlns:p14="http://schemas.microsoft.com/office/powerpoint/2010/main" val="426005414"/>
       </p:ext>
     </p:extLst>
   </p:cSld>
@@ -5796,7 +7198,7 @@
 </p:sld>
 </file>
 
-<file path=ppt/slides/slide6.xml><?xml version="1.0" encoding="utf-8"?>
+<file path=ppt/slides/slide5.xml><?xml version="1.0" encoding="utf-8"?>
 <p:sld xmlns:a="http://schemas.openxmlformats.org/drawingml/2006/main" xmlns:r="http://schemas.openxmlformats.org/officeDocument/2006/relationships" xmlns:p="http://schemas.openxmlformats.org/presentationml/2006/main">
   <p:cSld>
     <p:spTree>
@@ -5829,11 +7231,11 @@
           <a:lstStyle/>
           <a:p>
             <a:r>
-              <a:rPr lang="en-US" dirty="0" err="1" smtClean="0"/>
+              <a:rPr lang="en-US" dirty="0" err="1"/>
               <a:t>Pothen</a:t>
             </a:r>
             <a:r>
-              <a:rPr lang="en-US" dirty="0" smtClean="0"/>
+              <a:rPr lang="en-US" dirty="0"/>
               <a:t>-Fan</a:t>
             </a:r>
             <a:endParaRPr lang="de-CH" dirty="0"/>
@@ -5858,7 +7260,7 @@
             <a:fld id="{631FC4A0-0520-44E0-B489-E0DB3391F3AE}" type="slidenum">
               <a:rPr lang="de-CH" smtClean="0"/>
               <a:pPr/>
-              <a:t>6</a:t>
+              <a:t>5</a:t>
             </a:fld>
             <a:endParaRPr lang="de-CH"/>
           </a:p>
@@ -6013,7 +7415,7 @@
           <a:p>
             <a:pPr algn="ctr"/>
             <a:r>
-              <a:rPr lang="en-US" dirty="0" smtClean="0"/>
+              <a:rPr lang="en-US" dirty="0"/>
               <a:t>A</a:t>
             </a:r>
             <a:endParaRPr lang="de-CH" dirty="0"/>
@@ -6055,7 +7457,7 @@
           <a:p>
             <a:pPr algn="ctr"/>
             <a:r>
-              <a:rPr lang="en-US" dirty="0" smtClean="0"/>
+              <a:rPr lang="en-US" dirty="0"/>
               <a:t>B</a:t>
             </a:r>
             <a:endParaRPr lang="de-CH" dirty="0"/>
@@ -6097,7 +7499,7 @@
           <a:p>
             <a:pPr algn="ctr"/>
             <a:r>
-              <a:rPr lang="en-US" dirty="0" smtClean="0"/>
+              <a:rPr lang="en-US" dirty="0"/>
               <a:t>C</a:t>
             </a:r>
             <a:endParaRPr lang="de-CH" dirty="0"/>
@@ -6139,7 +7541,7 @@
           <a:p>
             <a:pPr algn="ctr"/>
             <a:r>
-              <a:rPr lang="en-US" dirty="0" smtClean="0"/>
+              <a:rPr lang="en-US" dirty="0"/>
               <a:t>D</a:t>
             </a:r>
             <a:endParaRPr lang="de-CH" dirty="0"/>
@@ -6181,7 +7583,7 @@
           <a:p>
             <a:pPr algn="ctr"/>
             <a:r>
-              <a:rPr lang="en-US" dirty="0" smtClean="0"/>
+              <a:rPr lang="en-US" dirty="0"/>
               <a:t>1</a:t>
             </a:r>
             <a:endParaRPr lang="de-CH" dirty="0"/>
@@ -6223,7 +7625,7 @@
           <a:p>
             <a:pPr algn="ctr"/>
             <a:r>
-              <a:rPr lang="en-US" dirty="0" smtClean="0"/>
+              <a:rPr lang="en-US" dirty="0"/>
               <a:t>2</a:t>
             </a:r>
             <a:endParaRPr lang="de-CH" dirty="0"/>
@@ -6265,7 +7667,7 @@
           <a:p>
             <a:pPr algn="ctr"/>
             <a:r>
-              <a:rPr lang="en-US" dirty="0" smtClean="0"/>
+              <a:rPr lang="en-US" dirty="0"/>
               <a:t>3</a:t>
             </a:r>
             <a:endParaRPr lang="de-CH" dirty="0"/>
@@ -6307,7 +7709,7 @@
           <a:p>
             <a:pPr algn="ctr"/>
             <a:r>
-              <a:rPr lang="en-US" dirty="0" smtClean="0"/>
+              <a:rPr lang="en-US" dirty="0"/>
               <a:t>4</a:t>
             </a:r>
             <a:endParaRPr lang="de-CH" dirty="0"/>
@@ -6466,7 +7868,7 @@
           <a:p>
             <a:pPr algn="ctr"/>
             <a:r>
-              <a:rPr lang="en-US" dirty="0" smtClean="0"/>
+              <a:rPr lang="en-US" dirty="0"/>
               <a:t>C</a:t>
             </a:r>
             <a:endParaRPr lang="de-CH" dirty="0"/>
@@ -6566,7 +7968,7 @@
           <a:p>
             <a:pPr algn="ctr"/>
             <a:r>
-              <a:rPr lang="en-US" dirty="0" smtClean="0"/>
+              <a:rPr lang="en-US" dirty="0"/>
               <a:t>A</a:t>
             </a:r>
             <a:endParaRPr lang="de-CH" dirty="0"/>
@@ -6616,7 +8018,7 @@
           <a:p>
             <a:pPr algn="ctr"/>
             <a:r>
-              <a:rPr lang="en-US" dirty="0" smtClean="0"/>
+              <a:rPr lang="en-US" dirty="0"/>
               <a:t>4</a:t>
             </a:r>
           </a:p>
@@ -6739,7 +8141,7 @@
     </p:spTree>
     <p:extLst>
       <p:ext uri="{BB962C8B-B14F-4D97-AF65-F5344CB8AC3E}">
-        <p14:creationId xmlns:p14="http://schemas.microsoft.com/office/powerpoint/2010/main" xmlns="" val="2979775282"/>
+        <p14:creationId xmlns:p14="http://schemas.microsoft.com/office/powerpoint/2010/main" val="2979775282"/>
       </p:ext>
     </p:extLst>
   </p:cSld>
@@ -6938,7 +8340,7 @@
 </p:sld>
 </file>
 
-<file path=ppt/slides/slide7.xml><?xml version="1.0" encoding="utf-8"?>
+<file path=ppt/slides/slide6.xml><?xml version="1.0" encoding="utf-8"?>
 <p:sld xmlns:a="http://schemas.openxmlformats.org/drawingml/2006/main" xmlns:r="http://schemas.openxmlformats.org/officeDocument/2006/relationships" xmlns:p="http://schemas.openxmlformats.org/presentationml/2006/main">
   <p:cSld>
     <p:spTree>
@@ -6971,45 +8373,10 @@
           <a:lstStyle/>
           <a:p>
             <a:r>
-              <a:rPr lang="en-US" dirty="0" smtClean="0"/>
+              <a:rPr lang="en-US" dirty="0"/>
               <a:t>Current State</a:t>
             </a:r>
             <a:endParaRPr lang="de-CH" dirty="0"/>
-          </a:p>
-        </p:txBody>
-      </p:sp>
-      <p:sp>
-        <p:nvSpPr>
-          <p:cNvPr id="3" name="Content Placeholder 2"/>
-          <p:cNvSpPr>
-            <a:spLocks noGrp="1"/>
-          </p:cNvSpPr>
-          <p:nvPr>
-            <p:ph idx="1"/>
-          </p:nvPr>
-        </p:nvSpPr>
-        <p:spPr>
-          <a:xfrm>
-            <a:off x="628650" y="1696511"/>
-            <a:ext cx="7886700" cy="697442"/>
-          </a:xfrm>
-        </p:spPr>
-        <p:txBody>
-          <a:bodyPr/>
-          <a:lstStyle/>
-          <a:p>
-            <a:r>
-              <a:rPr lang="en-US" dirty="0" smtClean="0"/>
-              <a:t>First own implementation of </a:t>
-            </a:r>
-            <a:r>
-              <a:rPr lang="en-US" dirty="0" err="1" smtClean="0"/>
-              <a:t>Pothen</a:t>
-            </a:r>
-            <a:r>
-              <a:rPr lang="en-US" dirty="0" smtClean="0"/>
-              <a:t>-Fan</a:t>
-            </a:r>
           </a:p>
         </p:txBody>
       </p:sp>
@@ -7031,7 +8398,7 @@
             <a:fld id="{631FC4A0-0520-44E0-B489-E0DB3391F3AE}" type="slidenum">
               <a:rPr lang="de-CH" smtClean="0"/>
               <a:pPr/>
-              <a:t>7</a:t>
+              <a:t>6</a:t>
             </a:fld>
             <a:endParaRPr lang="de-CH"/>
           </a:p>
@@ -7078,266 +8445,50 @@
             </a:lvl1pPr>
           </a:lstStyle>
           <a:p>
-            <a:r>
-              <a:rPr lang="en-US" dirty="0" smtClean="0"/>
-              <a:t>Future Steps</a:t>
-            </a:r>
             <a:endParaRPr lang="de-CH" dirty="0"/>
           </a:p>
         </p:txBody>
       </p:sp>
-      <p:sp>
-        <p:nvSpPr>
-          <p:cNvPr id="7" name="Content Placeholder 2"/>
-          <p:cNvSpPr txBox="1">
-            <a:spLocks/>
-          </p:cNvSpPr>
+      <p:graphicFrame>
+        <p:nvGraphicFramePr>
+          <p:cNvPr id="9" name="Diagramm 8">
+            <a:extLst>
+              <a:ext uri="{FF2B5EF4-FFF2-40B4-BE49-F238E27FC236}">
+                <a16:creationId xmlns:a16="http://schemas.microsoft.com/office/drawing/2014/main" id="{6FA43576-4C4D-4F56-BF10-405C548E4C8F}"/>
+              </a:ext>
+            </a:extLst>
+          </p:cNvPr>
+          <p:cNvGraphicFramePr>
+            <a:graphicFrameLocks/>
+          </p:cNvGraphicFramePr>
+          <p:nvPr>
+            <p:extLst>
+              <p:ext uri="{D42A27DB-BD31-4B8C-83A1-F6EECF244321}">
+                <p14:modId xmlns:p14="http://schemas.microsoft.com/office/powerpoint/2010/main" val="643529480"/>
+              </p:ext>
+            </p:extLst>
+          </p:nvPr>
+        </p:nvGraphicFramePr>
+        <p:xfrm>
+          <a:off x="1021743" y="1550504"/>
+          <a:ext cx="7100513" cy="4087185"/>
+        </p:xfrm>
+        <a:graphic>
+          <a:graphicData uri="http://schemas.openxmlformats.org/drawingml/2006/chart">
+            <c:chart xmlns:c="http://schemas.openxmlformats.org/drawingml/2006/chart" xmlns:r="http://schemas.openxmlformats.org/officeDocument/2006/relationships" r:id="rId2"/>
+          </a:graphicData>
+        </a:graphic>
+      </p:graphicFrame>
+      <p:sp>
+        <p:nvSpPr>
+          <p:cNvPr id="10" name="Textfeld 9"/>
+          <p:cNvSpPr txBox="1"/>
           <p:nvPr/>
         </p:nvSpPr>
         <p:spPr>
           <a:xfrm>
-            <a:off x="628650" y="3739771"/>
-            <a:ext cx="7886700" cy="2584447"/>
-          </a:xfrm>
-          <a:prstGeom prst="rect">
-            <a:avLst/>
-          </a:prstGeom>
-        </p:spPr>
-        <p:txBody>
-          <a:bodyPr vert="horz" lIns="91440" tIns="45720" rIns="91440" bIns="45720" rtlCol="0">
-            <a:normAutofit/>
-          </a:bodyPr>
-          <a:lstStyle>
-            <a:lvl1pPr marL="228600" indent="-228600" algn="l" defTabSz="914400" rtl="0" eaLnBrk="1" latinLnBrk="0" hangingPunct="1">
-              <a:lnSpc>
-                <a:spcPct val="90000"/>
-              </a:lnSpc>
-              <a:spcBef>
-                <a:spcPts val="1000"/>
-              </a:spcBef>
-              <a:buFont typeface="Arial" panose="020B0604020202020204" pitchFamily="34" charset="0"/>
-              <a:buChar char="•"/>
-              <a:defRPr sz="2800" kern="1200">
-                <a:solidFill>
-                  <a:schemeClr val="tx1"/>
-                </a:solidFill>
-                <a:latin typeface="+mn-lt"/>
-                <a:ea typeface="+mn-ea"/>
-                <a:cs typeface="+mn-cs"/>
-              </a:defRPr>
-            </a:lvl1pPr>
-            <a:lvl2pPr marL="685800" indent="-228600" algn="l" defTabSz="914400" rtl="0" eaLnBrk="1" latinLnBrk="0" hangingPunct="1">
-              <a:lnSpc>
-                <a:spcPct val="90000"/>
-              </a:lnSpc>
-              <a:spcBef>
-                <a:spcPts val="500"/>
-              </a:spcBef>
-              <a:buFont typeface="Arial" panose="020B0604020202020204" pitchFamily="34" charset="0"/>
-              <a:buChar char="•"/>
-              <a:defRPr sz="2400" kern="1200">
-                <a:solidFill>
-                  <a:schemeClr val="tx1"/>
-                </a:solidFill>
-                <a:latin typeface="+mn-lt"/>
-                <a:ea typeface="+mn-ea"/>
-                <a:cs typeface="+mn-cs"/>
-              </a:defRPr>
-            </a:lvl2pPr>
-            <a:lvl3pPr marL="1143000" indent="-228600" algn="l" defTabSz="914400" rtl="0" eaLnBrk="1" latinLnBrk="0" hangingPunct="1">
-              <a:lnSpc>
-                <a:spcPct val="90000"/>
-              </a:lnSpc>
-              <a:spcBef>
-                <a:spcPts val="500"/>
-              </a:spcBef>
-              <a:buFont typeface="Arial" panose="020B0604020202020204" pitchFamily="34" charset="0"/>
-              <a:buChar char="•"/>
-              <a:defRPr sz="2000" kern="1200">
-                <a:solidFill>
-                  <a:schemeClr val="tx1"/>
-                </a:solidFill>
-                <a:latin typeface="+mn-lt"/>
-                <a:ea typeface="+mn-ea"/>
-                <a:cs typeface="+mn-cs"/>
-              </a:defRPr>
-            </a:lvl3pPr>
-            <a:lvl4pPr marL="1600200" indent="-228600" algn="l" defTabSz="914400" rtl="0" eaLnBrk="1" latinLnBrk="0" hangingPunct="1">
-              <a:lnSpc>
-                <a:spcPct val="90000"/>
-              </a:lnSpc>
-              <a:spcBef>
-                <a:spcPts val="500"/>
-              </a:spcBef>
-              <a:buFont typeface="Arial" panose="020B0604020202020204" pitchFamily="34" charset="0"/>
-              <a:buChar char="•"/>
-              <a:defRPr sz="1800" kern="1200">
-                <a:solidFill>
-                  <a:schemeClr val="tx1"/>
-                </a:solidFill>
-                <a:latin typeface="+mn-lt"/>
-                <a:ea typeface="+mn-ea"/>
-                <a:cs typeface="+mn-cs"/>
-              </a:defRPr>
-            </a:lvl4pPr>
-            <a:lvl5pPr marL="2057400" indent="-228600" algn="l" defTabSz="914400" rtl="0" eaLnBrk="1" latinLnBrk="0" hangingPunct="1">
-              <a:lnSpc>
-                <a:spcPct val="90000"/>
-              </a:lnSpc>
-              <a:spcBef>
-                <a:spcPts val="500"/>
-              </a:spcBef>
-              <a:buFont typeface="Arial" panose="020B0604020202020204" pitchFamily="34" charset="0"/>
-              <a:buChar char="•"/>
-              <a:defRPr sz="1800" kern="1200">
-                <a:solidFill>
-                  <a:schemeClr val="tx1"/>
-                </a:solidFill>
-                <a:latin typeface="+mn-lt"/>
-                <a:ea typeface="+mn-ea"/>
-                <a:cs typeface="+mn-cs"/>
-              </a:defRPr>
-            </a:lvl5pPr>
-            <a:lvl6pPr marL="2514600" indent="-228600" algn="l" defTabSz="914400" rtl="0" eaLnBrk="1" latinLnBrk="0" hangingPunct="1">
-              <a:lnSpc>
-                <a:spcPct val="90000"/>
-              </a:lnSpc>
-              <a:spcBef>
-                <a:spcPts val="500"/>
-              </a:spcBef>
-              <a:buFont typeface="Arial" panose="020B0604020202020204" pitchFamily="34" charset="0"/>
-              <a:buChar char="•"/>
-              <a:defRPr sz="1800" kern="1200">
-                <a:solidFill>
-                  <a:schemeClr val="tx1"/>
-                </a:solidFill>
-                <a:latin typeface="+mn-lt"/>
-                <a:ea typeface="+mn-ea"/>
-                <a:cs typeface="+mn-cs"/>
-              </a:defRPr>
-            </a:lvl6pPr>
-            <a:lvl7pPr marL="2971800" indent="-228600" algn="l" defTabSz="914400" rtl="0" eaLnBrk="1" latinLnBrk="0" hangingPunct="1">
-              <a:lnSpc>
-                <a:spcPct val="90000"/>
-              </a:lnSpc>
-              <a:spcBef>
-                <a:spcPts val="500"/>
-              </a:spcBef>
-              <a:buFont typeface="Arial" panose="020B0604020202020204" pitchFamily="34" charset="0"/>
-              <a:buChar char="•"/>
-              <a:defRPr sz="1800" kern="1200">
-                <a:solidFill>
-                  <a:schemeClr val="tx1"/>
-                </a:solidFill>
-                <a:latin typeface="+mn-lt"/>
-                <a:ea typeface="+mn-ea"/>
-                <a:cs typeface="+mn-cs"/>
-              </a:defRPr>
-            </a:lvl7pPr>
-            <a:lvl8pPr marL="3429000" indent="-228600" algn="l" defTabSz="914400" rtl="0" eaLnBrk="1" latinLnBrk="0" hangingPunct="1">
-              <a:lnSpc>
-                <a:spcPct val="90000"/>
-              </a:lnSpc>
-              <a:spcBef>
-                <a:spcPts val="500"/>
-              </a:spcBef>
-              <a:buFont typeface="Arial" panose="020B0604020202020204" pitchFamily="34" charset="0"/>
-              <a:buChar char="•"/>
-              <a:defRPr sz="1800" kern="1200">
-                <a:solidFill>
-                  <a:schemeClr val="tx1"/>
-                </a:solidFill>
-                <a:latin typeface="+mn-lt"/>
-                <a:ea typeface="+mn-ea"/>
-                <a:cs typeface="+mn-cs"/>
-              </a:defRPr>
-            </a:lvl8pPr>
-            <a:lvl9pPr marL="3886200" indent="-228600" algn="l" defTabSz="914400" rtl="0" eaLnBrk="1" latinLnBrk="0" hangingPunct="1">
-              <a:lnSpc>
-                <a:spcPct val="90000"/>
-              </a:lnSpc>
-              <a:spcBef>
-                <a:spcPts val="500"/>
-              </a:spcBef>
-              <a:buFont typeface="Arial" panose="020B0604020202020204" pitchFamily="34" charset="0"/>
-              <a:buChar char="•"/>
-              <a:defRPr sz="1800" kern="1200">
-                <a:solidFill>
-                  <a:schemeClr val="tx1"/>
-                </a:solidFill>
-                <a:latin typeface="+mn-lt"/>
-                <a:ea typeface="+mn-ea"/>
-                <a:cs typeface="+mn-cs"/>
-              </a:defRPr>
-            </a:lvl9pPr>
-          </a:lstStyle>
-          <a:p>
-            <a:r>
-              <a:rPr lang="en-US" dirty="0" smtClean="0"/>
-              <a:t>Tune parallel </a:t>
-            </a:r>
-            <a:r>
-              <a:rPr lang="en-US" dirty="0" err="1" smtClean="0"/>
-              <a:t>Pothen</a:t>
-            </a:r>
-            <a:r>
-              <a:rPr lang="en-US" dirty="0" smtClean="0"/>
-              <a:t>-Fan for Xeon Phi</a:t>
-            </a:r>
-          </a:p>
-          <a:p>
-            <a:r>
-              <a:rPr lang="en-US" dirty="0" smtClean="0"/>
-              <a:t>Benchmark with </a:t>
-            </a:r>
-            <a:r>
-              <a:rPr lang="en-US" dirty="0" err="1" smtClean="0"/>
-              <a:t>SuiteSparse</a:t>
-            </a:r>
-            <a:r>
-              <a:rPr lang="en-US" dirty="0" smtClean="0"/>
-              <a:t> Matrix Collection</a:t>
-            </a:r>
-          </a:p>
-          <a:p>
-            <a:pPr lvl="1"/>
-            <a:r>
-              <a:rPr lang="en-US" i="1" dirty="0" smtClean="0"/>
-              <a:t>Roadmap USA</a:t>
-            </a:r>
-          </a:p>
-          <a:p>
-            <a:pPr lvl="1"/>
-            <a:r>
-              <a:rPr lang="en-US" i="1" dirty="0" smtClean="0"/>
-              <a:t>Wikipedia</a:t>
-            </a:r>
-          </a:p>
-          <a:p>
-            <a:pPr lvl="1"/>
-            <a:r>
-              <a:rPr lang="en-US" i="1" dirty="0" smtClean="0"/>
-              <a:t>Amazon.com</a:t>
-            </a:r>
-          </a:p>
-          <a:p>
-            <a:pPr marL="0" indent="0">
-              <a:buNone/>
-            </a:pPr>
-            <a:endParaRPr lang="en-US" dirty="0" smtClean="0"/>
-          </a:p>
-        </p:txBody>
-      </p:sp>
-      <p:sp>
-        <p:nvSpPr>
-          <p:cNvPr id="8" name="TextBox 7"/>
-          <p:cNvSpPr txBox="1"/>
-          <p:nvPr/>
-        </p:nvSpPr>
-        <p:spPr>
-          <a:xfrm>
-            <a:off x="628650" y="6400413"/>
-            <a:ext cx="7001933" cy="276999"/>
+            <a:off x="1244379" y="5812354"/>
+            <a:ext cx="6655242" cy="369332"/>
           </a:xfrm>
           <a:prstGeom prst="rect">
             <a:avLst/>
@@ -7350,50 +8501,40 @@
           </a:bodyPr>
           <a:lstStyle/>
           <a:p>
-            <a:r>
-              <a:rPr lang="en-US" sz="1200" dirty="0" err="1" smtClean="0">
+            <a:pPr algn="ctr"/>
+            <a:r>
+              <a:rPr lang="de-CH" dirty="0">
                 <a:solidFill>
-                  <a:schemeClr val="bg1">
+                  <a:schemeClr val="accent3">
                     <a:lumMod val="75000"/>
                   </a:schemeClr>
                 </a:solidFill>
               </a:rPr>
-              <a:t>SparseMatrix</a:t>
-            </a:r>
-            <a:r>
-              <a:rPr lang="en-US" sz="1200" dirty="0" smtClean="0">
+              <a:t>G = (U, V) |V| = 73364, |E| = 88328, n = 50, CI = 95%, </a:t>
+            </a:r>
+            <a:r>
+              <a:rPr lang="de-CH" dirty="0" err="1">
                 <a:solidFill>
-                  <a:schemeClr val="bg1">
+                  <a:schemeClr val="accent3">
                     <a:lumMod val="75000"/>
                   </a:schemeClr>
                 </a:solidFill>
               </a:rPr>
-              <a:t>: </a:t>
-            </a:r>
-            <a:r>
-              <a:rPr lang="en-US" sz="1200" dirty="0" smtClean="0">
+              <a:t>Speedup</a:t>
+            </a:r>
+            <a:r>
+              <a:rPr lang="de-CH" dirty="0">
                 <a:solidFill>
-                  <a:schemeClr val="bg1">
-                    <a:lumMod val="75000"/>
-                  </a:schemeClr>
-                </a:solidFill>
-                <a:hlinkClick r:id="rId2"/>
-              </a:rPr>
-              <a:t>http://www.cise.ufl.edu/research/sparse/matrices/</a:t>
-            </a:r>
-            <a:r>
-              <a:rPr lang="en-US" sz="1200" dirty="0" smtClean="0">
-                <a:solidFill>
-                  <a:schemeClr val="bg1">
+                  <a:schemeClr val="accent3">
                     <a:lumMod val="75000"/>
                   </a:schemeClr>
                 </a:solidFill>
               </a:rPr>
-              <a:t> </a:t>
-            </a:r>
-            <a:endParaRPr lang="de-CH" sz="1200" dirty="0">
+              <a:t> = 11</a:t>
+            </a:r>
+            <a:endParaRPr lang="en-US" dirty="0">
               <a:solidFill>
-                <a:schemeClr val="bg1">
+                <a:schemeClr val="accent3">
                   <a:lumMod val="75000"/>
                 </a:schemeClr>
               </a:solidFill>
@@ -7404,7 +8545,7 @@
     </p:spTree>
     <p:extLst>
       <p:ext uri="{BB962C8B-B14F-4D97-AF65-F5344CB8AC3E}">
-        <p14:creationId xmlns:p14="http://schemas.microsoft.com/office/powerpoint/2010/main" xmlns="" val="3768901669"/>
+        <p14:creationId xmlns:p14="http://schemas.microsoft.com/office/powerpoint/2010/main" val="3768901669"/>
       </p:ext>
     </p:extLst>
   </p:cSld>
@@ -7423,6 +8564,9 @@
                     <p:cTn id="3" fill="hold">
                       <p:stCondLst>
                         <p:cond delay="indefinite"/>
+                        <p:cond evt="onBegin" delay="0">
+                          <p:tn val="2"/>
+                        </p:cond>
                       </p:stCondLst>
                       <p:childTnLst>
                         <p:par>
@@ -7432,10 +8576,15 @@
                             </p:stCondLst>
                             <p:childTnLst>
                               <p:par>
-                                <p:cTn id="5" presetID="1" presetClass="entr" presetSubtype="0" fill="hold" grpId="0" nodeType="clickEffect">
+                                <p:cTn id="5" presetID="1" presetClass="entr" presetSubtype="0" fill="hold" grpId="0" nodeType="withEffect" nodePh="1">
                                   <p:stCondLst>
                                     <p:cond delay="0"/>
                                   </p:stCondLst>
+                                  <p:endCondLst>
+                                    <p:cond evt="begin" delay="0">
+                                      <p:tn val="5"/>
+                                    </p:cond>
+                                  </p:endCondLst>
                                   <p:childTnLst>
                                     <p:set>
                                       <p:cBhvr>
@@ -7445,61 +8594,7 @@
                                           </p:stCondLst>
                                         </p:cTn>
                                         <p:tgtEl>
-                                          <p:spTgt spid="7"/>
-                                        </p:tgtEl>
-                                        <p:attrNameLst>
-                                          <p:attrName>style.visibility</p:attrName>
-                                        </p:attrNameLst>
-                                      </p:cBhvr>
-                                      <p:to>
-                                        <p:strVal val="visible"/>
-                                      </p:to>
-                                    </p:set>
-                                  </p:childTnLst>
-                                </p:cTn>
-                              </p:par>
-                              <p:par>
-                                <p:cTn id="7" presetID="1" presetClass="entr" presetSubtype="0" fill="hold" grpId="0" nodeType="withEffect">
-                                  <p:stCondLst>
-                                    <p:cond delay="0"/>
-                                  </p:stCondLst>
-                                  <p:childTnLst>
-                                    <p:set>
-                                      <p:cBhvr>
-                                        <p:cTn id="8" dur="1" fill="hold">
-                                          <p:stCondLst>
-                                            <p:cond delay="0"/>
-                                          </p:stCondLst>
-                                        </p:cTn>
-                                        <p:tgtEl>
                                           <p:spTgt spid="5"/>
-                                        </p:tgtEl>
-                                        <p:attrNameLst>
-                                          <p:attrName>style.visibility</p:attrName>
-                                        </p:attrNameLst>
-                                      </p:cBhvr>
-                                      <p:to>
-                                        <p:strVal val="visible"/>
-                                      </p:to>
-                                    </p:set>
-                                  </p:childTnLst>
-                                </p:cTn>
-                              </p:par>
-                              <p:par>
-                                <p:cTn id="9" presetID="1" presetClass="entr" presetSubtype="0" fill="hold" grpId="0" nodeType="withEffect">
-                                  <p:stCondLst>
-                                    <p:cond delay="0"/>
-                                  </p:stCondLst>
-                                  <p:childTnLst>
-                                    <p:set>
-                                      <p:cBhvr>
-                                        <p:cTn id="10" dur="1" fill="hold">
-                                          <p:stCondLst>
-                                            <p:cond delay="0"/>
-                                          </p:stCondLst>
-                                        </p:cTn>
-                                        <p:tgtEl>
-                                          <p:spTgt spid="8"/>
                                         </p:tgtEl>
                                         <p:attrNameLst>
                                           <p:attrName>style.visibility</p:attrName>
@@ -7541,8 +8636,305 @@
     </p:tnLst>
     <p:bldLst>
       <p:bldP spid="5" grpId="0"/>
-      <p:bldP spid="7" grpId="0"/>
-      <p:bldP spid="8" grpId="0"/>
+    </p:bldLst>
+  </p:timing>
+</p:sld>
+</file>
+
+<file path=ppt/slides/slide7.xml><?xml version="1.0" encoding="utf-8"?>
+<p:sld xmlns:a="http://schemas.openxmlformats.org/drawingml/2006/main" xmlns:r="http://schemas.openxmlformats.org/officeDocument/2006/relationships" xmlns:p="http://schemas.openxmlformats.org/presentationml/2006/main">
+  <p:cSld>
+    <p:spTree>
+      <p:nvGrpSpPr>
+        <p:cNvPr id="1" name=""/>
+        <p:cNvGrpSpPr/>
+        <p:nvPr/>
+      </p:nvGrpSpPr>
+      <p:grpSpPr>
+        <a:xfrm>
+          <a:off x="0" y="0"/>
+          <a:ext cx="0" cy="0"/>
+          <a:chOff x="0" y="0"/>
+          <a:chExt cx="0" cy="0"/>
+        </a:xfrm>
+      </p:grpSpPr>
+      <p:sp>
+        <p:nvSpPr>
+          <p:cNvPr id="2" name="Titel 1"/>
+          <p:cNvSpPr>
+            <a:spLocks noGrp="1"/>
+          </p:cNvSpPr>
+          <p:nvPr>
+            <p:ph type="title"/>
+          </p:nvPr>
+        </p:nvSpPr>
+        <p:spPr/>
+        <p:txBody>
+          <a:bodyPr/>
+          <a:lstStyle/>
+          <a:p>
+            <a:r>
+              <a:rPr lang="en-US" dirty="0"/>
+              <a:t>Future Steps</a:t>
+            </a:r>
+            <a:endParaRPr lang="en-US" dirty="0"/>
+          </a:p>
+        </p:txBody>
+      </p:sp>
+      <p:sp>
+        <p:nvSpPr>
+          <p:cNvPr id="3" name="Inhaltsplatzhalter 2"/>
+          <p:cNvSpPr>
+            <a:spLocks noGrp="1"/>
+          </p:cNvSpPr>
+          <p:nvPr>
+            <p:ph idx="1"/>
+          </p:nvPr>
+        </p:nvSpPr>
+        <p:spPr/>
+        <p:txBody>
+          <a:bodyPr/>
+          <a:lstStyle/>
+          <a:p>
+            <a:r>
+              <a:rPr lang="en-US" dirty="0"/>
+              <a:t>Tune parallel </a:t>
+            </a:r>
+            <a:r>
+              <a:rPr lang="en-US" dirty="0" err="1"/>
+              <a:t>Pothen</a:t>
+            </a:r>
+            <a:r>
+              <a:rPr lang="en-US" dirty="0"/>
+              <a:t>-Fan for Xeon Phi</a:t>
+            </a:r>
+          </a:p>
+          <a:p>
+            <a:r>
+              <a:rPr lang="en-US" dirty="0"/>
+              <a:t>Benchmark with </a:t>
+            </a:r>
+            <a:r>
+              <a:rPr lang="en-US" dirty="0" err="1"/>
+              <a:t>SuiteSparse</a:t>
+            </a:r>
+            <a:r>
+              <a:rPr lang="en-US" dirty="0"/>
+              <a:t> Matrix Collection</a:t>
+            </a:r>
+          </a:p>
+          <a:p>
+            <a:pPr lvl="1"/>
+            <a:r>
+              <a:rPr lang="en-US" dirty="0"/>
+              <a:t>Roadmap USA</a:t>
+            </a:r>
+          </a:p>
+          <a:p>
+            <a:pPr lvl="1"/>
+            <a:r>
+              <a:rPr lang="en-US" dirty="0"/>
+              <a:t>Wikipedia</a:t>
+            </a:r>
+          </a:p>
+          <a:p>
+            <a:pPr lvl="1"/>
+            <a:r>
+              <a:rPr lang="en-US" dirty="0"/>
+              <a:t>Amazon.com</a:t>
+            </a:r>
+          </a:p>
+          <a:p>
+            <a:endParaRPr lang="en-US" dirty="0"/>
+          </a:p>
+        </p:txBody>
+      </p:sp>
+      <p:sp>
+        <p:nvSpPr>
+          <p:cNvPr id="4" name="Foliennummernplatzhalter 3"/>
+          <p:cNvSpPr>
+            <a:spLocks noGrp="1"/>
+          </p:cNvSpPr>
+          <p:nvPr>
+            <p:ph type="sldNum" sz="quarter" idx="12"/>
+          </p:nvPr>
+        </p:nvSpPr>
+        <p:spPr/>
+        <p:txBody>
+          <a:bodyPr/>
+          <a:lstStyle/>
+          <a:p>
+            <a:fld id="{631FC4A0-0520-44E0-B489-E0DB3391F3AE}" type="slidenum">
+              <a:rPr lang="de-CH" smtClean="0"/>
+              <a:pPr/>
+              <a:t>7</a:t>
+            </a:fld>
+            <a:endParaRPr lang="de-CH"/>
+          </a:p>
+        </p:txBody>
+      </p:sp>
+      <p:sp>
+        <p:nvSpPr>
+          <p:cNvPr id="5" name="TextBox 7"/>
+          <p:cNvSpPr txBox="1"/>
+          <p:nvPr/>
+        </p:nvSpPr>
+        <p:spPr>
+          <a:xfrm>
+            <a:off x="628650" y="6400413"/>
+            <a:ext cx="7001933" cy="276999"/>
+          </a:xfrm>
+          <a:prstGeom prst="rect">
+            <a:avLst/>
+          </a:prstGeom>
+          <a:noFill/>
+        </p:spPr>
+        <p:txBody>
+          <a:bodyPr wrap="square" rtlCol="0">
+            <a:spAutoFit/>
+          </a:bodyPr>
+          <a:lstStyle/>
+          <a:p>
+            <a:r>
+              <a:rPr lang="en-US" sz="1200" dirty="0" err="1">
+                <a:solidFill>
+                  <a:schemeClr val="bg1">
+                    <a:lumMod val="75000"/>
+                  </a:schemeClr>
+                </a:solidFill>
+              </a:rPr>
+              <a:t>SparseMatrix</a:t>
+            </a:r>
+            <a:r>
+              <a:rPr lang="en-US" sz="1200" dirty="0">
+                <a:solidFill>
+                  <a:schemeClr val="bg1">
+                    <a:lumMod val="75000"/>
+                  </a:schemeClr>
+                </a:solidFill>
+              </a:rPr>
+              <a:t>: </a:t>
+            </a:r>
+            <a:r>
+              <a:rPr lang="en-US" sz="1200" dirty="0">
+                <a:solidFill>
+                  <a:schemeClr val="bg1">
+                    <a:lumMod val="75000"/>
+                  </a:schemeClr>
+                </a:solidFill>
+                <a:hlinkClick r:id="rId2"/>
+              </a:rPr>
+              <a:t>http://www.cise.ufl.edu/research/sparse/matrices/</a:t>
+            </a:r>
+            <a:r>
+              <a:rPr lang="en-US" sz="1200" dirty="0">
+                <a:solidFill>
+                  <a:schemeClr val="bg1">
+                    <a:lumMod val="75000"/>
+                  </a:schemeClr>
+                </a:solidFill>
+              </a:rPr>
+              <a:t> </a:t>
+            </a:r>
+            <a:endParaRPr lang="de-CH" sz="1200" dirty="0">
+              <a:solidFill>
+                <a:schemeClr val="bg1">
+                  <a:lumMod val="75000"/>
+                </a:schemeClr>
+              </a:solidFill>
+            </a:endParaRPr>
+          </a:p>
+        </p:txBody>
+      </p:sp>
+    </p:spTree>
+    <p:extLst>
+      <p:ext uri="{BB962C8B-B14F-4D97-AF65-F5344CB8AC3E}">
+        <p14:creationId xmlns:p14="http://schemas.microsoft.com/office/powerpoint/2010/main" val="1912670769"/>
+      </p:ext>
+    </p:extLst>
+  </p:cSld>
+  <p:clrMapOvr>
+    <a:masterClrMapping/>
+  </p:clrMapOvr>
+  <p:timing>
+    <p:tnLst>
+      <p:par>
+        <p:cTn id="1" dur="indefinite" restart="never" nodeType="tmRoot">
+          <p:childTnLst>
+            <p:seq concurrent="1" nextAc="seek">
+              <p:cTn id="2" dur="indefinite" nodeType="mainSeq">
+                <p:childTnLst>
+                  <p:par>
+                    <p:cTn id="3" fill="hold">
+                      <p:stCondLst>
+                        <p:cond delay="indefinite"/>
+                        <p:cond evt="onBegin" delay="0">
+                          <p:tn val="2"/>
+                        </p:cond>
+                      </p:stCondLst>
+                      <p:childTnLst>
+                        <p:par>
+                          <p:cTn id="4" fill="hold">
+                            <p:stCondLst>
+                              <p:cond delay="0"/>
+                            </p:stCondLst>
+                            <p:childTnLst>
+                              <p:par>
+                                <p:cTn id="5" presetID="1" presetClass="entr" presetSubtype="0" fill="hold" grpId="0" nodeType="withEffect">
+                                  <p:stCondLst>
+                                    <p:cond delay="0"/>
+                                  </p:stCondLst>
+                                  <p:childTnLst>
+                                    <p:set>
+                                      <p:cBhvr>
+                                        <p:cTn id="6" dur="1" fill="hold">
+                                          <p:stCondLst>
+                                            <p:cond delay="0"/>
+                                          </p:stCondLst>
+                                        </p:cTn>
+                                        <p:tgtEl>
+                                          <p:spTgt spid="5"/>
+                                        </p:tgtEl>
+                                        <p:attrNameLst>
+                                          <p:attrName>style.visibility</p:attrName>
+                                        </p:attrNameLst>
+                                      </p:cBhvr>
+                                      <p:to>
+                                        <p:strVal val="visible"/>
+                                      </p:to>
+                                    </p:set>
+                                  </p:childTnLst>
+                                </p:cTn>
+                              </p:par>
+                            </p:childTnLst>
+                          </p:cTn>
+                        </p:par>
+                      </p:childTnLst>
+                    </p:cTn>
+                  </p:par>
+                </p:childTnLst>
+              </p:cTn>
+              <p:prevCondLst>
+                <p:cond evt="onPrev" delay="0">
+                  <p:tgtEl>
+                    <p:sldTgt/>
+                  </p:tgtEl>
+                </p:cond>
+              </p:prevCondLst>
+              <p:nextCondLst>
+                <p:cond evt="onNext" delay="0">
+                  <p:tgtEl>
+                    <p:sldTgt/>
+                  </p:tgtEl>
+                </p:cond>
+              </p:nextCondLst>
+            </p:seq>
+          </p:childTnLst>
+        </p:cTn>
+      </p:par>
+    </p:tnLst>
+    <p:bldLst>
+      <p:bldP spid="5" grpId="0"/>
     </p:bldLst>
   </p:timing>
 </p:sld>
@@ -7567,30 +8959,6 @@
       </p:grpSpPr>
       <p:sp>
         <p:nvSpPr>
-          <p:cNvPr id="4" name="Slide Number Placeholder 3"/>
-          <p:cNvSpPr>
-            <a:spLocks noGrp="1"/>
-          </p:cNvSpPr>
-          <p:nvPr>
-            <p:ph type="sldNum" sz="quarter" idx="12"/>
-          </p:nvPr>
-        </p:nvSpPr>
-        <p:spPr/>
-        <p:txBody>
-          <a:bodyPr/>
-          <a:lstStyle/>
-          <a:p>
-            <a:fld id="{631FC4A0-0520-44E0-B489-E0DB3391F3AE}" type="slidenum">
-              <a:rPr lang="de-CH" smtClean="0"/>
-              <a:pPr/>
-              <a:t>8</a:t>
-            </a:fld>
-            <a:endParaRPr lang="de-CH"/>
-          </a:p>
-        </p:txBody>
-      </p:sp>
-      <p:sp>
-        <p:nvSpPr>
           <p:cNvPr id="5" name="Title 4"/>
           <p:cNvSpPr>
             <a:spLocks noGrp="1"/>
@@ -7601,7 +8969,7 @@
         </p:nvSpPr>
         <p:spPr>
           <a:xfrm>
-            <a:off x="628650" y="5030788"/>
+            <a:off x="628650" y="4104861"/>
             <a:ext cx="7886700" cy="1325563"/>
           </a:xfrm>
         </p:spPr>
@@ -7610,7 +8978,7 @@
           <a:lstStyle/>
           <a:p>
             <a:r>
-              <a:rPr lang="en-US" dirty="0" smtClean="0"/>
+              <a:rPr lang="en-US" dirty="0"/>
               <a:t>Thank you for your attention</a:t>
             </a:r>
             <a:endParaRPr lang="de-CH" dirty="0"/>
@@ -7620,20 +8988,13 @@
     </p:spTree>
     <p:extLst>
       <p:ext uri="{BB962C8B-B14F-4D97-AF65-F5344CB8AC3E}">
-        <p14:creationId xmlns:p14="http://schemas.microsoft.com/office/powerpoint/2010/main" xmlns="" val="2342700096"/>
+        <p14:creationId xmlns:p14="http://schemas.microsoft.com/office/powerpoint/2010/main" val="2342700096"/>
       </p:ext>
     </p:extLst>
   </p:cSld>
   <p:clrMapOvr>
     <a:masterClrMapping/>
   </p:clrMapOvr>
-  <p:timing>
-    <p:tnLst>
-      <p:par>
-        <p:cTn id="1" dur="indefinite" restart="never" nodeType="tmRoot"/>
-      </p:par>
-    </p:tnLst>
-  </p:timing>
 </p:sld>
 </file>
 
@@ -7892,7 +9253,7 @@
   <a:extraClrSchemeLst/>
   <a:extLst>
     <a:ext uri="{05A4C25C-085E-4340-85A3-A5531E510DB2}">
-      <thm15:themeFamily xmlns:thm15="http://schemas.microsoft.com/office/thememl/2012/main" xmlns="" name="Office Theme" id="{62F939B6-93AF-4DB8-9C6B-D6C7DFDC589F}" vid="{4A3C46E8-61CC-4603-A589-7422A47A8E4A}"/>
+      <thm15:themeFamily xmlns:thm15="http://schemas.microsoft.com/office/thememl/2012/main" name="Office Theme" id="{62F939B6-93AF-4DB8-9C6B-D6C7DFDC589F}" vid="{4A3C46E8-61CC-4603-A589-7422A47A8E4A}"/>
     </a:ext>
   </a:extLst>
 </a:theme>
@@ -8153,7 +9514,7 @@
   <a:extraClrSchemeLst/>
   <a:extLst>
     <a:ext uri="{05A4C25C-085E-4340-85A3-A5531E510DB2}">
-      <thm15:themeFamily xmlns:thm15="http://schemas.microsoft.com/office/thememl/2012/main" xmlns="" name="Office Theme" id="{62F939B6-93AF-4DB8-9C6B-D6C7DFDC589F}" vid="{4A3C46E8-61CC-4603-A589-7422A47A8E4A}"/>
+      <thm15:themeFamily xmlns:thm15="http://schemas.microsoft.com/office/thememl/2012/main" name="Office Theme" id="{62F939B6-93AF-4DB8-9C6B-D6C7DFDC589F}" vid="{4A3C46E8-61CC-4603-A589-7422A47A8E4A}"/>
     </a:ext>
   </a:extLst>
 </a:theme>
@@ -8414,7 +9775,7 @@
   <a:extraClrSchemeLst/>
   <a:extLst>
     <a:ext uri="{05A4C25C-085E-4340-85A3-A5531E510DB2}">
-      <thm15:themeFamily xmlns:thm15="http://schemas.microsoft.com/office/thememl/2012/main" xmlns="" name="Office Theme" id="{62F939B6-93AF-4DB8-9C6B-D6C7DFDC589F}" vid="{4A3C46E8-61CC-4603-A589-7422A47A8E4A}"/>
+      <thm15:themeFamily xmlns:thm15="http://schemas.microsoft.com/office/thememl/2012/main" name="Office Theme" id="{62F939B6-93AF-4DB8-9C6B-D6C7DFDC589F}" vid="{4A3C46E8-61CC-4603-A589-7422A47A8E4A}"/>
     </a:ext>
   </a:extLst>
 </a:theme>

</xml_diff>